<commit_message>
[LAM] 1. Two cases & 4 controls were excluded (regarded as ouliers based on the MDS plot with 1000G) - Method 2
</commit_message>
<xml_diff>
--- a/LAM/Revision_20181012.pptx
+++ b/LAM/Revision_20181012.pptx
@@ -7,10 +7,12 @@
   <p:sldIdLst>
     <p:sldId id="258" r:id="rId2"/>
     <p:sldId id="257" r:id="rId3"/>
-    <p:sldId id="259" r:id="rId4"/>
-    <p:sldId id="260" r:id="rId5"/>
-    <p:sldId id="261" r:id="rId6"/>
-    <p:sldId id="262" r:id="rId7"/>
+    <p:sldId id="264" r:id="rId4"/>
+    <p:sldId id="265" r:id="rId5"/>
+    <p:sldId id="259" r:id="rId6"/>
+    <p:sldId id="260" r:id="rId7"/>
+    <p:sldId id="261" r:id="rId8"/>
+    <p:sldId id="262" r:id="rId9"/>
   </p:sldIdLst>
   <p:sldSz cx="9144000" cy="6858000" type="screen4x3"/>
   <p:notesSz cx="6858000" cy="9144000"/>
@@ -109,6 +111,22 @@
       </a:defRPr>
     </a:lvl9pPr>
   </p:defaultTextStyle>
+  <p:extLst>
+    <p:ext uri="{EFAFB233-063F-42B5-8137-9DF3F51BA10A}">
+      <p15:sldGuideLst xmlns:p15="http://schemas.microsoft.com/office/powerpoint/2012/main">
+        <p15:guide id="1" orient="horz" pos="2160">
+          <p15:clr>
+            <a:srgbClr val="A4A3A4"/>
+          </p15:clr>
+        </p15:guide>
+        <p15:guide id="2" pos="2880">
+          <p15:clr>
+            <a:srgbClr val="A4A3A4"/>
+          </p15:clr>
+        </p15:guide>
+      </p15:sldGuideLst>
+    </p:ext>
+  </p:extLst>
 </p:presentation>
 </file>
 
@@ -3443,7 +3461,9 @@
           </a:xfrm>
         </p:spPr>
         <p:txBody>
-          <a:bodyPr/>
+          <a:bodyPr>
+            <a:normAutofit/>
+          </a:bodyPr>
           <a:lstStyle/>
           <a:p>
             <a:pPr marL="514350" indent="-514350">
@@ -3501,71 +3521,91 @@
           </a:p>
           <a:p>
             <a:r>
-              <a:rPr lang="ko-KR" altLang="en-US" sz="2000" dirty="0" smtClean="0"/>
+              <a:rPr lang="ko-KR" altLang="en-US" sz="1800" dirty="0" smtClean="0"/>
               <a:t>회색 </a:t>
             </a:r>
             <a:r>
-              <a:rPr lang="en-US" altLang="ko-KR" sz="2000" dirty="0" smtClean="0"/>
+              <a:rPr lang="en-US" altLang="ko-KR" sz="1800" dirty="0" smtClean="0"/>
               <a:t>:  1000G, </a:t>
             </a:r>
             <a:r>
-              <a:rPr lang="ko-KR" altLang="en-US" sz="2000" dirty="0" smtClean="0"/>
+              <a:rPr lang="ko-KR" altLang="en-US" sz="1800" dirty="0" smtClean="0"/>
               <a:t>붉은색 </a:t>
             </a:r>
             <a:r>
-              <a:rPr lang="en-US" altLang="ko-KR" sz="2000" dirty="0" smtClean="0"/>
+              <a:rPr lang="en-US" altLang="ko-KR" sz="1800" dirty="0" smtClean="0"/>
               <a:t>: case, </a:t>
             </a:r>
             <a:r>
-              <a:rPr lang="ko-KR" altLang="en-US" sz="2000" dirty="0" smtClean="0"/>
+              <a:rPr lang="ko-KR" altLang="en-US" sz="1800" dirty="0" smtClean="0"/>
               <a:t>푸른색 </a:t>
             </a:r>
             <a:r>
-              <a:rPr lang="en-US" altLang="ko-KR" sz="2000" dirty="0" smtClean="0"/>
+              <a:rPr lang="en-US" altLang="ko-KR" sz="1800" dirty="0" smtClean="0"/>
               <a:t>: control</a:t>
             </a:r>
           </a:p>
           <a:p>
             <a:r>
-              <a:rPr lang="en-US" altLang="ko-KR" sz="2000" dirty="0" smtClean="0"/>
+              <a:rPr lang="en-US" altLang="ko-KR" sz="1800" dirty="0" smtClean="0"/>
               <a:t>matching </a:t>
             </a:r>
             <a:r>
-              <a:rPr lang="ko-KR" altLang="en-US" sz="2000" dirty="0" smtClean="0"/>
+              <a:rPr lang="ko-KR" altLang="en-US" sz="1800" dirty="0" smtClean="0"/>
               <a:t>후의 </a:t>
             </a:r>
             <a:r>
-              <a:rPr lang="en-US" altLang="ko-KR" sz="2000" dirty="0" smtClean="0"/>
+              <a:rPr lang="en-US" altLang="ko-KR" sz="1800" dirty="0" smtClean="0"/>
               <a:t>case, control + 1000G </a:t>
             </a:r>
             <a:r>
-              <a:rPr lang="ko-KR" altLang="en-US" sz="2000" dirty="0" smtClean="0"/>
+              <a:rPr lang="ko-KR" altLang="en-US" sz="1800" dirty="0" smtClean="0"/>
               <a:t>이용하여 </a:t>
             </a:r>
             <a:r>
-              <a:rPr lang="en-US" altLang="ko-KR" sz="2000" dirty="0" smtClean="0"/>
+              <a:rPr lang="en-US" altLang="ko-KR" sz="1800" dirty="0" smtClean="0"/>
               <a:t>PC score</a:t>
             </a:r>
             <a:r>
-              <a:rPr lang="ko-KR" altLang="en-US" sz="2000" dirty="0" smtClean="0"/>
+              <a:rPr lang="ko-KR" altLang="en-US" sz="1800" dirty="0" smtClean="0"/>
               <a:t>계산</a:t>
             </a:r>
-            <a:endParaRPr lang="en-US" altLang="ko-KR" sz="2000" dirty="0" smtClean="0"/>
+            <a:endParaRPr lang="en-US" altLang="ko-KR" sz="1800" dirty="0" smtClean="0"/>
           </a:p>
           <a:p>
             <a:r>
-              <a:rPr lang="ko-KR" altLang="en-US" sz="2000" dirty="0" smtClean="0"/>
+              <a:rPr lang="ko-KR" altLang="en-US" sz="1800" dirty="0" smtClean="0"/>
               <a:t>이 그림 상에서는 두 개의 </a:t>
             </a:r>
             <a:r>
-              <a:rPr lang="en-US" altLang="ko-KR" sz="2000" dirty="0" smtClean="0"/>
+              <a:rPr lang="en-US" altLang="ko-KR" sz="1800" dirty="0" smtClean="0"/>
               <a:t>case</a:t>
             </a:r>
             <a:r>
-              <a:rPr lang="ko-KR" altLang="en-US" sz="2000" dirty="0" smtClean="0"/>
-              <a:t>가 다른 값에 비하여 동떨어져 있음</a:t>
+              <a:rPr lang="ko-KR" altLang="en-US" sz="1800" dirty="0" smtClean="0"/>
+              <a:t>가 다른 값에 비하여 동떨어져 </a:t>
             </a:r>
-            <a:endParaRPr lang="ko-KR" altLang="en-US" sz="2000" dirty="0"/>
+            <a:r>
+              <a:rPr lang="ko-KR" altLang="en-US" sz="1800" dirty="0" smtClean="0"/>
+              <a:t>있음 </a:t>
+            </a:r>
+            <a:r>
+              <a:rPr lang="en-US" altLang="ko-KR" sz="1800" dirty="0" smtClean="0"/>
+              <a:t>-&gt; </a:t>
+            </a:r>
+            <a:r>
+              <a:rPr lang="ko-KR" altLang="en-US" sz="1800" dirty="0" smtClean="0">
+                <a:solidFill>
+                  <a:srgbClr val="FF0000"/>
+                </a:solidFill>
+              </a:rPr>
+              <a:t>제거</a:t>
+            </a:r>
+            <a:endParaRPr lang="ko-KR" altLang="en-US" sz="1800" dirty="0">
+              <a:solidFill>
+                <a:srgbClr val="FF0000"/>
+              </a:solidFill>
+            </a:endParaRPr>
           </a:p>
         </p:txBody>
       </p:sp>
@@ -3613,6 +3653,387 @@
 </file>
 
 <file path=ppt/slides/slide3.xml><?xml version="1.0" encoding="utf-8"?>
+<p:sld xmlns:a="http://schemas.openxmlformats.org/drawingml/2006/main" xmlns:r="http://schemas.openxmlformats.org/officeDocument/2006/relationships" xmlns:p="http://schemas.openxmlformats.org/presentationml/2006/main">
+  <p:cSld>
+    <p:spTree>
+      <p:nvGrpSpPr>
+        <p:cNvPr id="1" name=""/>
+        <p:cNvGrpSpPr/>
+        <p:nvPr/>
+      </p:nvGrpSpPr>
+      <p:grpSpPr>
+        <a:xfrm>
+          <a:off x="0" y="0"/>
+          <a:ext cx="0" cy="0"/>
+          <a:chOff x="0" y="0"/>
+          <a:chExt cx="0" cy="0"/>
+        </a:xfrm>
+      </p:grpSpPr>
+      <p:sp>
+        <p:nvSpPr>
+          <p:cNvPr id="2" name="제목 1"/>
+          <p:cNvSpPr>
+            <a:spLocks noGrp="1"/>
+          </p:cNvSpPr>
+          <p:nvPr>
+            <p:ph type="title"/>
+          </p:nvPr>
+        </p:nvSpPr>
+        <p:spPr/>
+        <p:txBody>
+          <a:bodyPr/>
+          <a:lstStyle/>
+          <a:p>
+            <a:r>
+              <a:rPr lang="en-US" altLang="ko-KR" dirty="0" smtClean="0"/>
+              <a:t>MDS plot</a:t>
+            </a:r>
+            <a:endParaRPr lang="ko-KR" altLang="en-US" dirty="0"/>
+          </a:p>
+        </p:txBody>
+      </p:sp>
+      <p:sp>
+        <p:nvSpPr>
+          <p:cNvPr id="3" name="내용 개체 틀 2"/>
+          <p:cNvSpPr>
+            <a:spLocks noGrp="1"/>
+          </p:cNvSpPr>
+          <p:nvPr>
+            <p:ph idx="1"/>
+          </p:nvPr>
+        </p:nvSpPr>
+        <p:spPr>
+          <a:xfrm>
+            <a:off x="457200" y="1600200"/>
+            <a:ext cx="8229600" cy="5069160"/>
+          </a:xfrm>
+        </p:spPr>
+        <p:txBody>
+          <a:bodyPr>
+            <a:normAutofit/>
+          </a:bodyPr>
+          <a:lstStyle/>
+          <a:p>
+            <a:pPr marL="0" indent="0">
+              <a:buNone/>
+            </a:pPr>
+            <a:r>
+              <a:rPr lang="en-US" altLang="ko-KR" dirty="0"/>
+              <a:t>3. 2</a:t>
+            </a:r>
+            <a:r>
+              <a:rPr lang="ko-KR" altLang="en-US" dirty="0"/>
+              <a:t>개 </a:t>
+            </a:r>
+            <a:r>
+              <a:rPr lang="en-US" altLang="ko-KR" dirty="0"/>
+              <a:t>subject </a:t>
+            </a:r>
+            <a:r>
+              <a:rPr lang="ko-KR" altLang="en-US" dirty="0"/>
+              <a:t>제거 한 후</a:t>
+            </a:r>
+          </a:p>
+          <a:p>
+            <a:pPr marL="514350" indent="-514350">
+              <a:buAutoNum type="arabicPeriod" startAt="2"/>
+            </a:pPr>
+            <a:endParaRPr lang="en-US" altLang="ko-KR" dirty="0"/>
+          </a:p>
+          <a:p>
+            <a:pPr marL="514350" indent="-514350">
+              <a:buAutoNum type="arabicPeriod" startAt="2"/>
+            </a:pPr>
+            <a:endParaRPr lang="en-US" altLang="ko-KR" dirty="0" smtClean="0"/>
+          </a:p>
+          <a:p>
+            <a:pPr marL="514350" indent="-514350">
+              <a:buAutoNum type="arabicPeriod" startAt="2"/>
+            </a:pPr>
+            <a:endParaRPr lang="en-US" altLang="ko-KR" dirty="0"/>
+          </a:p>
+          <a:p>
+            <a:pPr marL="514350" indent="-514350">
+              <a:buAutoNum type="arabicPeriod" startAt="2"/>
+            </a:pPr>
+            <a:endParaRPr lang="en-US" altLang="ko-KR" dirty="0" smtClean="0"/>
+          </a:p>
+          <a:p>
+            <a:pPr marL="514350" indent="-514350">
+              <a:buAutoNum type="arabicPeriod" startAt="2"/>
+            </a:pPr>
+            <a:endParaRPr lang="en-US" altLang="ko-KR" dirty="0"/>
+          </a:p>
+          <a:p>
+            <a:pPr marL="514350" indent="-514350">
+              <a:buAutoNum type="arabicPeriod" startAt="2"/>
+            </a:pPr>
+            <a:endParaRPr lang="en-US" altLang="ko-KR" sz="2000" dirty="0" smtClean="0"/>
+          </a:p>
+        </p:txBody>
+      </p:sp>
+      <p:pic>
+        <p:nvPicPr>
+          <p:cNvPr id="8" name="그림 7"/>
+          <p:cNvPicPr>
+            <a:picLocks noChangeAspect="1"/>
+          </p:cNvPicPr>
+          <p:nvPr/>
+        </p:nvPicPr>
+        <p:blipFill>
+          <a:blip r:embed="rId2">
+            <a:extLst>
+              <a:ext uri="{28A0092B-C50C-407E-A947-70E740481C1C}">
+                <a14:useLocalDpi xmlns:a14="http://schemas.microsoft.com/office/drawing/2010/main" val="0"/>
+              </a:ext>
+            </a:extLst>
+          </a:blip>
+          <a:stretch>
+            <a:fillRect/>
+          </a:stretch>
+        </p:blipFill>
+        <p:spPr>
+          <a:xfrm>
+            <a:off x="457192" y="2276872"/>
+            <a:ext cx="8229616" cy="2971806"/>
+          </a:xfrm>
+          <a:prstGeom prst="rect">
+            <a:avLst/>
+          </a:prstGeom>
+        </p:spPr>
+      </p:pic>
+    </p:spTree>
+    <p:extLst>
+      <p:ext uri="{BB962C8B-B14F-4D97-AF65-F5344CB8AC3E}">
+        <p14:creationId xmlns:p14="http://schemas.microsoft.com/office/powerpoint/2010/main" val="1097474279"/>
+      </p:ext>
+    </p:extLst>
+  </p:cSld>
+  <p:clrMapOvr>
+    <a:masterClrMapping/>
+  </p:clrMapOvr>
+</p:sld>
+</file>
+
+<file path=ppt/slides/slide4.xml><?xml version="1.0" encoding="utf-8"?>
+<p:sld xmlns:a="http://schemas.openxmlformats.org/drawingml/2006/main" xmlns:r="http://schemas.openxmlformats.org/officeDocument/2006/relationships" xmlns:p="http://schemas.openxmlformats.org/presentationml/2006/main">
+  <p:cSld>
+    <p:spTree>
+      <p:nvGrpSpPr>
+        <p:cNvPr id="1" name=""/>
+        <p:cNvGrpSpPr/>
+        <p:nvPr/>
+      </p:nvGrpSpPr>
+      <p:grpSpPr>
+        <a:xfrm>
+          <a:off x="0" y="0"/>
+          <a:ext cx="0" cy="0"/>
+          <a:chOff x="0" y="0"/>
+          <a:chExt cx="0" cy="0"/>
+        </a:xfrm>
+      </p:grpSpPr>
+      <p:sp>
+        <p:nvSpPr>
+          <p:cNvPr id="2" name="제목 1"/>
+          <p:cNvSpPr>
+            <a:spLocks noGrp="1"/>
+          </p:cNvSpPr>
+          <p:nvPr>
+            <p:ph type="title"/>
+          </p:nvPr>
+        </p:nvSpPr>
+        <p:spPr/>
+        <p:txBody>
+          <a:bodyPr/>
+          <a:lstStyle/>
+          <a:p>
+            <a:r>
+              <a:rPr lang="en-US" altLang="ko-KR" dirty="0" smtClean="0"/>
+              <a:t>MDS plot</a:t>
+            </a:r>
+            <a:endParaRPr lang="ko-KR" altLang="en-US" dirty="0"/>
+          </a:p>
+        </p:txBody>
+      </p:sp>
+      <p:sp>
+        <p:nvSpPr>
+          <p:cNvPr id="3" name="내용 개체 틀 2"/>
+          <p:cNvSpPr>
+            <a:spLocks noGrp="1"/>
+          </p:cNvSpPr>
+          <p:nvPr>
+            <p:ph idx="1"/>
+          </p:nvPr>
+        </p:nvSpPr>
+        <p:spPr>
+          <a:xfrm>
+            <a:off x="457200" y="1600200"/>
+            <a:ext cx="8229600" cy="5069160"/>
+          </a:xfrm>
+        </p:spPr>
+        <p:txBody>
+          <a:bodyPr>
+            <a:normAutofit/>
+          </a:bodyPr>
+          <a:lstStyle/>
+          <a:p>
+            <a:pPr marL="0" indent="0">
+              <a:buNone/>
+            </a:pPr>
+            <a:r>
+              <a:rPr lang="en-US" altLang="ko-KR" dirty="0" smtClean="0"/>
+              <a:t>4. Conditional logistic</a:t>
+            </a:r>
+            <a:r>
+              <a:rPr lang="ko-KR" altLang="en-US" dirty="0" smtClean="0"/>
+              <a:t>에 사용된 </a:t>
+            </a:r>
+            <a:r>
+              <a:rPr lang="en-US" altLang="ko-KR" dirty="0" smtClean="0"/>
+              <a:t>sample</a:t>
+            </a:r>
+          </a:p>
+          <a:p>
+            <a:pPr marL="0" indent="0">
+              <a:buNone/>
+            </a:pPr>
+            <a:endParaRPr lang="en-US" altLang="ko-KR" dirty="0"/>
+          </a:p>
+          <a:p>
+            <a:pPr marL="0" indent="0">
+              <a:buNone/>
+            </a:pPr>
+            <a:endParaRPr lang="en-US" altLang="ko-KR" dirty="0" smtClean="0"/>
+          </a:p>
+          <a:p>
+            <a:pPr marL="0" indent="0">
+              <a:buNone/>
+            </a:pPr>
+            <a:endParaRPr lang="en-US" altLang="ko-KR" dirty="0"/>
+          </a:p>
+          <a:p>
+            <a:pPr marL="0" indent="0">
+              <a:buNone/>
+            </a:pPr>
+            <a:endParaRPr lang="en-US" altLang="ko-KR" dirty="0" smtClean="0"/>
+          </a:p>
+          <a:p>
+            <a:pPr marL="0" indent="0">
+              <a:buNone/>
+            </a:pPr>
+            <a:endParaRPr lang="en-US" altLang="ko-KR" dirty="0" smtClean="0"/>
+          </a:p>
+          <a:p>
+            <a:pPr lvl="1"/>
+            <a:r>
+              <a:rPr lang="en-US" altLang="ko-KR" sz="2400" dirty="0" smtClean="0"/>
+              <a:t>Case 426, control 852</a:t>
+            </a:r>
+          </a:p>
+          <a:p>
+            <a:pPr lvl="1"/>
+            <a:r>
+              <a:rPr lang="en-US" altLang="ko-KR" sz="2400" dirty="0" smtClean="0"/>
+              <a:t>1000G </a:t>
+            </a:r>
+            <a:r>
+              <a:rPr lang="ko-KR" altLang="en-US" sz="2400" dirty="0" smtClean="0"/>
+              <a:t>제외하고 </a:t>
+            </a:r>
+            <a:r>
+              <a:rPr lang="en-US" altLang="ko-KR" sz="2400" dirty="0" smtClean="0"/>
+              <a:t>discovery</a:t>
+            </a:r>
+            <a:r>
+              <a:rPr lang="ko-KR" altLang="en-US" sz="2400" dirty="0" smtClean="0"/>
+              <a:t>로만  </a:t>
+            </a:r>
+            <a:r>
+              <a:rPr lang="en-US" altLang="ko-KR" sz="2400" dirty="0" smtClean="0"/>
+              <a:t>PC score </a:t>
+            </a:r>
+            <a:r>
+              <a:rPr lang="ko-KR" altLang="en-US" sz="2400" dirty="0" smtClean="0"/>
+              <a:t>계산</a:t>
+            </a:r>
+            <a:endParaRPr lang="en-US" altLang="ko-KR" sz="2400" dirty="0"/>
+          </a:p>
+          <a:p>
+            <a:pPr marL="514350" indent="-514350">
+              <a:buAutoNum type="arabicPeriod" startAt="2"/>
+            </a:pPr>
+            <a:endParaRPr lang="en-US" altLang="ko-KR" dirty="0" smtClean="0"/>
+          </a:p>
+          <a:p>
+            <a:pPr marL="514350" indent="-514350">
+              <a:buAutoNum type="arabicPeriod" startAt="2"/>
+            </a:pPr>
+            <a:endParaRPr lang="en-US" altLang="ko-KR" dirty="0"/>
+          </a:p>
+          <a:p>
+            <a:pPr marL="514350" indent="-514350">
+              <a:buAutoNum type="arabicPeriod" startAt="2"/>
+            </a:pPr>
+            <a:endParaRPr lang="en-US" altLang="ko-KR" dirty="0" smtClean="0"/>
+          </a:p>
+          <a:p>
+            <a:pPr marL="514350" indent="-514350">
+              <a:buAutoNum type="arabicPeriod" startAt="2"/>
+            </a:pPr>
+            <a:endParaRPr lang="en-US" altLang="ko-KR" dirty="0"/>
+          </a:p>
+          <a:p>
+            <a:pPr marL="514350" indent="-514350">
+              <a:buAutoNum type="arabicPeriod" startAt="2"/>
+            </a:pPr>
+            <a:endParaRPr lang="en-US" altLang="ko-KR" sz="2000" dirty="0" smtClean="0"/>
+          </a:p>
+        </p:txBody>
+      </p:sp>
+      <p:pic>
+        <p:nvPicPr>
+          <p:cNvPr id="8" name="그림 7"/>
+          <p:cNvPicPr>
+            <a:picLocks noChangeAspect="1"/>
+          </p:cNvPicPr>
+          <p:nvPr/>
+        </p:nvPicPr>
+        <p:blipFill>
+          <a:blip r:embed="rId2">
+            <a:extLst>
+              <a:ext uri="{28A0092B-C50C-407E-A947-70E740481C1C}">
+                <a14:useLocalDpi xmlns:a14="http://schemas.microsoft.com/office/drawing/2010/main" val="0"/>
+              </a:ext>
+            </a:extLst>
+          </a:blip>
+          <a:stretch>
+            <a:fillRect/>
+          </a:stretch>
+        </p:blipFill>
+        <p:spPr>
+          <a:xfrm>
+            <a:off x="457192" y="2132856"/>
+            <a:ext cx="8229616" cy="2971806"/>
+          </a:xfrm>
+          <a:prstGeom prst="rect">
+            <a:avLst/>
+          </a:prstGeom>
+        </p:spPr>
+      </p:pic>
+    </p:spTree>
+    <p:extLst>
+      <p:ext uri="{BB962C8B-B14F-4D97-AF65-F5344CB8AC3E}">
+        <p14:creationId xmlns:p14="http://schemas.microsoft.com/office/powerpoint/2010/main" val="390198267"/>
+      </p:ext>
+    </p:extLst>
+  </p:cSld>
+  <p:clrMapOvr>
+    <a:masterClrMapping/>
+  </p:clrMapOvr>
+</p:sld>
+</file>
+
+<file path=ppt/slides/slide5.xml><?xml version="1.0" encoding="utf-8"?>
 <p:sld xmlns:a="http://schemas.openxmlformats.org/drawingml/2006/main" xmlns:r="http://schemas.openxmlformats.org/officeDocument/2006/relationships" xmlns:p="http://schemas.openxmlformats.org/presentationml/2006/main">
   <p:cSld>
     <p:spTree>
@@ -3823,7 +4244,7 @@
 </p:sld>
 </file>
 
-<file path=ppt/slides/slide4.xml><?xml version="1.0" encoding="utf-8"?>
+<file path=ppt/slides/slide6.xml><?xml version="1.0" encoding="utf-8"?>
 <p:sld xmlns:a="http://schemas.openxmlformats.org/drawingml/2006/main" xmlns:r="http://schemas.openxmlformats.org/officeDocument/2006/relationships" xmlns:p="http://schemas.openxmlformats.org/presentationml/2006/main">
   <p:cSld>
     <p:spTree>
@@ -3915,7 +4336,7 @@
           <p:nvPr>
             <p:extLst>
               <p:ext uri="{D42A27DB-BD31-4B8C-83A1-F6EECF244321}">
-                <p14:modId xmlns:p14="http://schemas.microsoft.com/office/powerpoint/2010/main" val="1766307890"/>
+                <p14:modId xmlns:p14="http://schemas.microsoft.com/office/powerpoint/2010/main" val="1766826793"/>
               </p:ext>
             </p:extLst>
           </p:nvPr>
@@ -3931,9 +4352,27 @@
                 <a:tableStyleId>{9D7B26C5-4107-4FEC-AEDC-1716B250A1EF}</a:tableStyleId>
               </a:tblPr>
               <a:tblGrid>
-                <a:gridCol w="1112921"/>
-                <a:gridCol w="1462712"/>
-                <a:gridCol w="1221121"/>
+                <a:gridCol w="1112921">
+                  <a:extLst>
+                    <a:ext uri="{9D8B030D-6E8A-4147-A177-3AD203B41FA5}">
+                      <a16:colId xmlns:a16="http://schemas.microsoft.com/office/drawing/2014/main" val="20000"/>
+                    </a:ext>
+                  </a:extLst>
+                </a:gridCol>
+                <a:gridCol w="1462712">
+                  <a:extLst>
+                    <a:ext uri="{9D8B030D-6E8A-4147-A177-3AD203B41FA5}">
+                      <a16:colId xmlns:a16="http://schemas.microsoft.com/office/drawing/2014/main" val="20001"/>
+                    </a:ext>
+                  </a:extLst>
+                </a:gridCol>
+                <a:gridCol w="1221121">
+                  <a:extLst>
+                    <a:ext uri="{9D8B030D-6E8A-4147-A177-3AD203B41FA5}">
+                      <a16:colId xmlns:a16="http://schemas.microsoft.com/office/drawing/2014/main" val="20002"/>
+                    </a:ext>
+                  </a:extLst>
+                </a:gridCol>
               </a:tblGrid>
               <a:tr h="309634">
                 <a:tc>
@@ -4035,6 +4474,11 @@
                     </a:lnB>
                   </a:tcPr>
                 </a:tc>
+                <a:extLst>
+                  <a:ext uri="{0D108BD9-81ED-4DB2-BD59-A6C34878D82A}">
+                    <a16:rowId xmlns:a16="http://schemas.microsoft.com/office/drawing/2014/main" val="10000"/>
+                  </a:ext>
+                </a:extLst>
               </a:tr>
               <a:tr h="309634">
                 <a:tc>
@@ -4110,10 +4554,126 @@
                     <a:p>
                       <a:pPr algn="ctr" fontAlgn="ctr"/>
                       <a:r>
+                        <a:rPr lang="en-US" altLang="ko-KR" sz="1600" u="none" strike="noStrike" dirty="0" smtClean="0">
+                          <a:effectLst/>
+                        </a:rPr>
+                        <a:t>0.4885</a:t>
+                      </a:r>
+                      <a:endParaRPr lang="en-US" altLang="ko-KR" sz="1600" b="0" i="0" u="none" strike="noStrike" dirty="0">
+                        <a:solidFill>
+                          <a:srgbClr val="000000"/>
+                        </a:solidFill>
+                        <a:effectLst/>
+                        <a:latin typeface="맑은 고딕"/>
+                      </a:endParaRPr>
+                    </a:p>
+                  </a:txBody>
+                  <a:tcPr marL="9525" marR="9525" marT="9525" marB="0" anchor="ctr">
+                    <a:lnT w="12700" cap="flat" cmpd="sng" algn="ctr">
+                      <a:solidFill>
+                        <a:schemeClr val="tx1"/>
+                      </a:solidFill>
+                      <a:prstDash val="solid"/>
+                      <a:round/>
+                      <a:headEnd type="none" w="med" len="med"/>
+                      <a:tailEnd type="none" w="med" len="med"/>
+                    </a:lnT>
+                  </a:tcPr>
+                </a:tc>
+                <a:extLst>
+                  <a:ext uri="{0D108BD9-81ED-4DB2-BD59-A6C34878D82A}">
+                    <a16:rowId xmlns:a16="http://schemas.microsoft.com/office/drawing/2014/main" val="10001"/>
+                  </a:ext>
+                </a:extLst>
+              </a:tr>
+              <a:tr h="309634">
+                <a:tc>
+                  <a:txBody>
+                    <a:bodyPr/>
+                    <a:lstStyle/>
+                    <a:p>
+                      <a:pPr algn="ctr" fontAlgn="ctr"/>
+                      <a:r>
+                        <a:rPr lang="en-US" altLang="ko-KR" sz="1600" u="none" strike="noStrike" dirty="0">
+                          <a:effectLst/>
+                        </a:rPr>
+                        <a:t>6</a:t>
+                      </a:r>
+                      <a:endParaRPr lang="en-US" altLang="ko-KR" sz="1600" b="0" i="0" u="none" strike="noStrike" dirty="0">
+                        <a:solidFill>
+                          <a:srgbClr val="000000"/>
+                        </a:solidFill>
+                        <a:effectLst/>
+                        <a:latin typeface="맑은 고딕"/>
+                      </a:endParaRPr>
+                    </a:p>
+                  </a:txBody>
+                  <a:tcPr marL="9525" marR="9525" marT="9525" marB="0" anchor="ctr"/>
+                </a:tc>
+                <a:tc>
+                  <a:txBody>
+                    <a:bodyPr/>
+                    <a:lstStyle/>
+                    <a:p>
+                      <a:pPr algn="ctr" fontAlgn="ctr"/>
+                      <a:r>
+                        <a:rPr lang="en-US" sz="1600" u="none" strike="noStrike">
+                          <a:effectLst/>
+                        </a:rPr>
+                        <a:t>rs9503551</a:t>
+                      </a:r>
+                      <a:endParaRPr lang="en-US" sz="1600" b="0" i="0" u="none" strike="noStrike">
+                        <a:solidFill>
+                          <a:srgbClr val="000000"/>
+                        </a:solidFill>
+                        <a:effectLst/>
+                        <a:latin typeface="맑은 고딕"/>
+                      </a:endParaRPr>
+                    </a:p>
+                  </a:txBody>
+                  <a:tcPr marL="9525" marR="9525" marT="9525" marB="0" anchor="ctr"/>
+                </a:tc>
+                <a:tc>
+                  <a:txBody>
+                    <a:bodyPr/>
+                    <a:lstStyle/>
+                    <a:p>
+                      <a:pPr algn="ctr" fontAlgn="ctr"/>
+                      <a:r>
+                        <a:rPr lang="en-US" altLang="ko-KR" sz="1600" u="none" strike="noStrike" dirty="0">
+                          <a:effectLst/>
+                        </a:rPr>
+                        <a:t>0.0840</a:t>
+                      </a:r>
+                      <a:endParaRPr lang="en-US" altLang="ko-KR" sz="1600" b="0" i="0" u="none" strike="noStrike" dirty="0">
+                        <a:solidFill>
+                          <a:srgbClr val="000000"/>
+                        </a:solidFill>
+                        <a:effectLst/>
+                        <a:latin typeface="맑은 고딕"/>
+                      </a:endParaRPr>
+                    </a:p>
+                  </a:txBody>
+                  <a:tcPr marL="9525" marR="9525" marT="9525" marB="0" anchor="ctr"/>
+                </a:tc>
+                <a:extLst>
+                  <a:ext uri="{0D108BD9-81ED-4DB2-BD59-A6C34878D82A}">
+                    <a16:rowId xmlns:a16="http://schemas.microsoft.com/office/drawing/2014/main" val="10002"/>
+                  </a:ext>
+                </a:extLst>
+              </a:tr>
+              <a:tr h="309634">
+                <a:tc>
+                  <a:txBody>
+                    <a:bodyPr/>
+                    <a:lstStyle/>
+                    <a:p>
+                      <a:pPr algn="ctr" fontAlgn="ctr"/>
+                      <a:r>
                         <a:rPr lang="en-US" altLang="ko-KR" sz="1600" u="none" strike="noStrike">
                           <a:effectLst/>
                         </a:rPr>
-                        <a:t>0.4892</a:t>
+                        <a:t>7</a:t>
                       </a:r>
                       <a:endParaRPr lang="en-US" altLang="ko-KR" sz="1600" b="0" i="0" u="none" strike="noStrike">
                         <a:solidFill>
@@ -4124,20 +4684,8 @@
                       </a:endParaRPr>
                     </a:p>
                   </a:txBody>
-                  <a:tcPr marL="9525" marR="9525" marT="9525" marB="0" anchor="ctr">
-                    <a:lnT w="12700" cap="flat" cmpd="sng" algn="ctr">
-                      <a:solidFill>
-                        <a:schemeClr val="tx1"/>
-                      </a:solidFill>
-                      <a:prstDash val="solid"/>
-                      <a:round/>
-                      <a:headEnd type="none" w="med" len="med"/>
-                      <a:tailEnd type="none" w="med" len="med"/>
-                    </a:lnT>
-                  </a:tcPr>
+                  <a:tcPr marL="9525" marR="9525" marT="9525" marB="0" anchor="ctr"/>
                 </a:tc>
-              </a:tr>
-              <a:tr h="309634">
                 <a:tc>
                   <a:txBody>
                     <a:bodyPr/>
@@ -4145,10 +4693,33 @@
                     <a:p>
                       <a:pPr algn="ctr" fontAlgn="ctr"/>
                       <a:r>
-                        <a:rPr lang="en-US" altLang="ko-KR" sz="1600" u="none" strike="noStrike" dirty="0">
+                        <a:rPr lang="en-US" sz="1600" u="none" strike="noStrike">
                           <a:effectLst/>
                         </a:rPr>
-                        <a:t>6</a:t>
+                        <a:t>rs4285401</a:t>
+                      </a:r>
+                      <a:endParaRPr lang="en-US" sz="1600" b="0" i="0" u="none" strike="noStrike">
+                        <a:solidFill>
+                          <a:srgbClr val="000000"/>
+                        </a:solidFill>
+                        <a:effectLst/>
+                        <a:latin typeface="맑은 고딕"/>
+                      </a:endParaRPr>
+                    </a:p>
+                  </a:txBody>
+                  <a:tcPr marL="9525" marR="9525" marT="9525" marB="0" anchor="ctr"/>
+                </a:tc>
+                <a:tc>
+                  <a:txBody>
+                    <a:bodyPr/>
+                    <a:lstStyle/>
+                    <a:p>
+                      <a:pPr algn="ctr" fontAlgn="ctr"/>
+                      <a:r>
+                        <a:rPr lang="en-US" altLang="ko-KR" sz="1600" u="none" strike="noStrike" dirty="0" smtClean="0">
+                          <a:effectLst/>
+                        </a:rPr>
+                        <a:t>0.3263</a:t>
                       </a:r>
                       <a:endParaRPr lang="en-US" altLang="ko-KR" sz="1600" b="0" i="0" u="none" strike="noStrike" dirty="0">
                         <a:solidFill>
@@ -4161,6 +4732,13 @@
                   </a:txBody>
                   <a:tcPr marL="9525" marR="9525" marT="9525" marB="0" anchor="ctr"/>
                 </a:tc>
+                <a:extLst>
+                  <a:ext uri="{0D108BD9-81ED-4DB2-BD59-A6C34878D82A}">
+                    <a16:rowId xmlns:a16="http://schemas.microsoft.com/office/drawing/2014/main" val="10003"/>
+                  </a:ext>
+                </a:extLst>
+              </a:tr>
+              <a:tr h="309634">
                 <a:tc>
                   <a:txBody>
                     <a:bodyPr/>
@@ -4168,10 +4746,33 @@
                     <a:p>
                       <a:pPr algn="ctr" fontAlgn="ctr"/>
                       <a:r>
+                        <a:rPr lang="en-US" altLang="ko-KR" sz="1600" u="none" strike="noStrike">
+                          <a:effectLst/>
+                        </a:rPr>
+                        <a:t>8</a:t>
+                      </a:r>
+                      <a:endParaRPr lang="en-US" altLang="ko-KR" sz="1600" b="0" i="0" u="none" strike="noStrike">
+                        <a:solidFill>
+                          <a:srgbClr val="000000"/>
+                        </a:solidFill>
+                        <a:effectLst/>
+                        <a:latin typeface="맑은 고딕"/>
+                      </a:endParaRPr>
+                    </a:p>
+                  </a:txBody>
+                  <a:tcPr marL="9525" marR="9525" marT="9525" marB="0" anchor="ctr"/>
+                </a:tc>
+                <a:tc>
+                  <a:txBody>
+                    <a:bodyPr/>
+                    <a:lstStyle/>
+                    <a:p>
+                      <a:pPr algn="ctr" fontAlgn="ctr"/>
+                      <a:r>
                         <a:rPr lang="en-US" sz="1600" u="none" strike="noStrike">
                           <a:effectLst/>
                         </a:rPr>
-                        <a:t>rs9503551</a:t>
+                        <a:t>rs804292</a:t>
                       </a:r>
                       <a:endParaRPr lang="en-US" sz="1600" b="0" i="0" u="none" strike="noStrike">
                         <a:solidFill>
@@ -4191,10 +4792,40 @@
                     <a:p>
                       <a:pPr algn="ctr" fontAlgn="ctr"/>
                       <a:r>
+                        <a:rPr lang="en-US" altLang="ko-KR" sz="1600" u="none" strike="noStrike" dirty="0" smtClean="0">
+                          <a:effectLst/>
+                        </a:rPr>
+                        <a:t>0.8145</a:t>
+                      </a:r>
+                      <a:endParaRPr lang="en-US" altLang="ko-KR" sz="1600" b="0" i="0" u="none" strike="noStrike" dirty="0">
+                        <a:solidFill>
+                          <a:srgbClr val="000000"/>
+                        </a:solidFill>
+                        <a:effectLst/>
+                        <a:latin typeface="맑은 고딕"/>
+                      </a:endParaRPr>
+                    </a:p>
+                  </a:txBody>
+                  <a:tcPr marL="9525" marR="9525" marT="9525" marB="0" anchor="ctr"/>
+                </a:tc>
+                <a:extLst>
+                  <a:ext uri="{0D108BD9-81ED-4DB2-BD59-A6C34878D82A}">
+                    <a16:rowId xmlns:a16="http://schemas.microsoft.com/office/drawing/2014/main" val="10004"/>
+                  </a:ext>
+                </a:extLst>
+              </a:tr>
+              <a:tr h="309634">
+                <a:tc>
+                  <a:txBody>
+                    <a:bodyPr/>
+                    <a:lstStyle/>
+                    <a:p>
+                      <a:pPr algn="ctr" fontAlgn="ctr"/>
+                      <a:r>
                         <a:rPr lang="en-US" altLang="ko-KR" sz="1600" u="none" strike="noStrike">
                           <a:effectLst/>
                         </a:rPr>
-                        <a:t>0.0840</a:t>
+                        <a:t>8</a:t>
                       </a:r>
                       <a:endParaRPr lang="en-US" altLang="ko-KR" sz="1600" b="0" i="0" u="none" strike="noStrike">
                         <a:solidFill>
@@ -4207,6 +4838,57 @@
                   </a:txBody>
                   <a:tcPr marL="9525" marR="9525" marT="9525" marB="0" anchor="ctr"/>
                 </a:tc>
+                <a:tc>
+                  <a:txBody>
+                    <a:bodyPr/>
+                    <a:lstStyle/>
+                    <a:p>
+                      <a:pPr algn="ctr" fontAlgn="ctr"/>
+                      <a:r>
+                        <a:rPr lang="en-US" sz="1600" u="none" strike="noStrike">
+                          <a:effectLst/>
+                        </a:rPr>
+                        <a:t>rs6470120</a:t>
+                      </a:r>
+                      <a:endParaRPr lang="en-US" sz="1600" b="0" i="0" u="none" strike="noStrike">
+                        <a:solidFill>
+                          <a:srgbClr val="000000"/>
+                        </a:solidFill>
+                        <a:effectLst/>
+                        <a:latin typeface="맑은 고딕"/>
+                      </a:endParaRPr>
+                    </a:p>
+                  </a:txBody>
+                  <a:tcPr marL="9525" marR="9525" marT="9525" marB="0" anchor="ctr"/>
+                </a:tc>
+                <a:tc>
+                  <a:txBody>
+                    <a:bodyPr/>
+                    <a:lstStyle/>
+                    <a:p>
+                      <a:pPr algn="ctr" fontAlgn="ctr"/>
+                      <a:r>
+                        <a:rPr lang="en-US" altLang="ko-KR" sz="1600" u="none" strike="noStrike" dirty="0" smtClean="0">
+                          <a:effectLst/>
+                        </a:rPr>
+                        <a:t>0.1152</a:t>
+                      </a:r>
+                      <a:endParaRPr lang="en-US" altLang="ko-KR" sz="1600" b="0" i="0" u="none" strike="noStrike" dirty="0">
+                        <a:solidFill>
+                          <a:srgbClr val="000000"/>
+                        </a:solidFill>
+                        <a:effectLst/>
+                        <a:latin typeface="맑은 고딕"/>
+                      </a:endParaRPr>
+                    </a:p>
+                  </a:txBody>
+                  <a:tcPr marL="9525" marR="9525" marT="9525" marB="0" anchor="ctr"/>
+                </a:tc>
+                <a:extLst>
+                  <a:ext uri="{0D108BD9-81ED-4DB2-BD59-A6C34878D82A}">
+                    <a16:rowId xmlns:a16="http://schemas.microsoft.com/office/drawing/2014/main" val="10005"/>
+                  </a:ext>
+                </a:extLst>
               </a:tr>
               <a:tr h="309634">
                 <a:tc>
@@ -4219,7 +4901,7 @@
                         <a:rPr lang="en-US" altLang="ko-KR" sz="1600" u="none" strike="noStrike">
                           <a:effectLst/>
                         </a:rPr>
-                        <a:t>7</a:t>
+                        <a:t>9</a:t>
                       </a:r>
                       <a:endParaRPr lang="en-US" altLang="ko-KR" sz="1600" b="0" i="0" u="none" strike="noStrike">
                         <a:solidFill>
@@ -4242,7 +4924,7 @@
                         <a:rPr lang="en-US" sz="1600" u="none" strike="noStrike">
                           <a:effectLst/>
                         </a:rPr>
-                        <a:t>rs4285401</a:t>
+                        <a:t>rs10491551</a:t>
                       </a:r>
                       <a:endParaRPr lang="en-US" sz="1600" b="0" i="0" u="none" strike="noStrike">
                         <a:solidFill>
@@ -4262,10 +4944,40 @@
                     <a:p>
                       <a:pPr algn="ctr" fontAlgn="ctr"/>
                       <a:r>
+                        <a:rPr lang="en-US" altLang="ko-KR" sz="1600" u="none" strike="noStrike" dirty="0" smtClean="0">
+                          <a:effectLst/>
+                        </a:rPr>
+                        <a:t>0.7217</a:t>
+                      </a:r>
+                      <a:endParaRPr lang="en-US" altLang="ko-KR" sz="1600" b="0" i="0" u="none" strike="noStrike" dirty="0">
+                        <a:solidFill>
+                          <a:srgbClr val="000000"/>
+                        </a:solidFill>
+                        <a:effectLst/>
+                        <a:latin typeface="맑은 고딕"/>
+                      </a:endParaRPr>
+                    </a:p>
+                  </a:txBody>
+                  <a:tcPr marL="9525" marR="9525" marT="9525" marB="0" anchor="ctr"/>
+                </a:tc>
+                <a:extLst>
+                  <a:ext uri="{0D108BD9-81ED-4DB2-BD59-A6C34878D82A}">
+                    <a16:rowId xmlns:a16="http://schemas.microsoft.com/office/drawing/2014/main" val="10006"/>
+                  </a:ext>
+                </a:extLst>
+              </a:tr>
+              <a:tr h="309634">
+                <a:tc>
+                  <a:txBody>
+                    <a:bodyPr/>
+                    <a:lstStyle/>
+                    <a:p>
+                      <a:pPr algn="ctr" fontAlgn="ctr"/>
+                      <a:r>
                         <a:rPr lang="en-US" altLang="ko-KR" sz="1600" u="none" strike="noStrike">
                           <a:effectLst/>
                         </a:rPr>
-                        <a:t>0.3283</a:t>
+                        <a:t>4</a:t>
                       </a:r>
                       <a:endParaRPr lang="en-US" altLang="ko-KR" sz="1600" b="0" i="0" u="none" strike="noStrike">
                         <a:solidFill>
@@ -4278,6 +4990,57 @@
                   </a:txBody>
                   <a:tcPr marL="9525" marR="9525" marT="9525" marB="0" anchor="ctr"/>
                 </a:tc>
+                <a:tc>
+                  <a:txBody>
+                    <a:bodyPr/>
+                    <a:lstStyle/>
+                    <a:p>
+                      <a:pPr algn="ctr" fontAlgn="ctr"/>
+                      <a:r>
+                        <a:rPr lang="en-US" sz="1600" u="none" strike="noStrike">
+                          <a:effectLst/>
+                        </a:rPr>
+                        <a:t>rs10517300</a:t>
+                      </a:r>
+                      <a:endParaRPr lang="en-US" sz="1600" b="0" i="0" u="none" strike="noStrike">
+                        <a:solidFill>
+                          <a:srgbClr val="000000"/>
+                        </a:solidFill>
+                        <a:effectLst/>
+                        <a:latin typeface="맑은 고딕"/>
+                      </a:endParaRPr>
+                    </a:p>
+                  </a:txBody>
+                  <a:tcPr marL="9525" marR="9525" marT="9525" marB="0" anchor="ctr"/>
+                </a:tc>
+                <a:tc>
+                  <a:txBody>
+                    <a:bodyPr/>
+                    <a:lstStyle/>
+                    <a:p>
+                      <a:pPr algn="ctr" fontAlgn="ctr"/>
+                      <a:r>
+                        <a:rPr lang="en-US" altLang="ko-KR" sz="1600" u="none" strike="noStrike" dirty="0" smtClean="0">
+                          <a:effectLst/>
+                        </a:rPr>
+                        <a:t>0.6066</a:t>
+                      </a:r>
+                      <a:endParaRPr lang="en-US" altLang="ko-KR" sz="1600" b="0" i="0" u="none" strike="noStrike" dirty="0">
+                        <a:solidFill>
+                          <a:srgbClr val="000000"/>
+                        </a:solidFill>
+                        <a:effectLst/>
+                        <a:latin typeface="맑은 고딕"/>
+                      </a:endParaRPr>
+                    </a:p>
+                  </a:txBody>
+                  <a:tcPr marL="9525" marR="9525" marT="9525" marB="0" anchor="ctr"/>
+                </a:tc>
+                <a:extLst>
+                  <a:ext uri="{0D108BD9-81ED-4DB2-BD59-A6C34878D82A}">
+                    <a16:rowId xmlns:a16="http://schemas.microsoft.com/office/drawing/2014/main" val="10007"/>
+                  </a:ext>
+                </a:extLst>
               </a:tr>
               <a:tr h="309634">
                 <a:tc>
@@ -4290,7 +5053,7 @@
                         <a:rPr lang="en-US" altLang="ko-KR" sz="1600" u="none" strike="noStrike">
                           <a:effectLst/>
                         </a:rPr>
-                        <a:t>8</a:t>
+                        <a:t>15</a:t>
                       </a:r>
                       <a:endParaRPr lang="en-US" altLang="ko-KR" sz="1600" b="0" i="0" u="none" strike="noStrike">
                         <a:solidFill>
@@ -4313,7 +5076,7 @@
                         <a:rPr lang="en-US" sz="1600" u="none" strike="noStrike">
                           <a:effectLst/>
                         </a:rPr>
-                        <a:t>rs804292</a:t>
+                        <a:t>rs1051730</a:t>
                       </a:r>
                       <a:endParaRPr lang="en-US" sz="1600" b="0" i="0" u="none" strike="noStrike">
                         <a:solidFill>
@@ -4333,12 +5096,16 @@
                     <a:p>
                       <a:pPr algn="ctr" fontAlgn="ctr"/>
                       <a:r>
-                        <a:rPr lang="en-US" altLang="ko-KR" sz="1600" u="none" strike="noStrike">
+                        <a:rPr lang="en-US" altLang="ko-KR" sz="1600" b="0" i="0" u="none" strike="noStrike" dirty="0" smtClean="0">
+                          <a:solidFill>
+                            <a:schemeClr val="tx1"/>
+                          </a:solidFill>
                           <a:effectLst/>
+                          <a:latin typeface="+mn-lt"/>
                         </a:rPr>
-                        <a:t>0.8408</a:t>
-                      </a:r>
-                      <a:endParaRPr lang="en-US" altLang="ko-KR" sz="1600" b="0" i="0" u="none" strike="noStrike">
+                        <a:t>0.9759</a:t>
+                      </a:r>
+                      <a:endParaRPr lang="en-US" altLang="ko-KR" sz="1600" b="0" i="0" u="none" strike="noStrike" dirty="0">
                         <a:solidFill>
                           <a:srgbClr val="000000"/>
                         </a:solidFill>
@@ -4349,6 +5116,11 @@
                   </a:txBody>
                   <a:tcPr marL="9525" marR="9525" marT="9525" marB="0" anchor="ctr"/>
                 </a:tc>
+                <a:extLst>
+                  <a:ext uri="{0D108BD9-81ED-4DB2-BD59-A6C34878D82A}">
+                    <a16:rowId xmlns:a16="http://schemas.microsoft.com/office/drawing/2014/main" val="10008"/>
+                  </a:ext>
+                </a:extLst>
               </a:tr>
               <a:tr h="309634">
                 <a:tc>
@@ -4358,12 +5130,12 @@
                     <a:p>
                       <a:pPr algn="ctr" fontAlgn="ctr"/>
                       <a:r>
-                        <a:rPr lang="en-US" altLang="ko-KR" sz="1600" u="none" strike="noStrike">
+                        <a:rPr lang="en-US" altLang="ko-KR" sz="1600" u="none" strike="noStrike" dirty="0">
                           <a:effectLst/>
                         </a:rPr>
-                        <a:t>8</a:t>
-                      </a:r>
-                      <a:endParaRPr lang="en-US" altLang="ko-KR" sz="1600" b="0" i="0" u="none" strike="noStrike">
+                        <a:t>21</a:t>
+                      </a:r>
+                      <a:endParaRPr lang="en-US" altLang="ko-KR" sz="1600" b="0" i="0" u="none" strike="noStrike" dirty="0">
                         <a:solidFill>
                           <a:srgbClr val="000000"/>
                         </a:solidFill>
@@ -4384,7 +5156,7 @@
                         <a:rPr lang="en-US" sz="1600" u="none" strike="noStrike">
                           <a:effectLst/>
                         </a:rPr>
-                        <a:t>rs6470120</a:t>
+                        <a:t>rs2836823</a:t>
                       </a:r>
                       <a:endParaRPr lang="en-US" sz="1600" b="0" i="0" u="none" strike="noStrike">
                         <a:solidFill>
@@ -4404,248 +5176,10 @@
                     <a:p>
                       <a:pPr algn="ctr" fontAlgn="ctr"/>
                       <a:r>
-                        <a:rPr lang="en-US" altLang="ko-KR" sz="1600" u="none" strike="noStrike">
+                        <a:rPr lang="en-US" altLang="ko-KR" sz="1600" u="none" strike="noStrike" dirty="0" smtClean="0">
                           <a:effectLst/>
                         </a:rPr>
-                        <a:t>0.1035</a:t>
-                      </a:r>
-                      <a:endParaRPr lang="en-US" altLang="ko-KR" sz="1600" b="0" i="0" u="none" strike="noStrike">
-                        <a:solidFill>
-                          <a:srgbClr val="000000"/>
-                        </a:solidFill>
-                        <a:effectLst/>
-                        <a:latin typeface="맑은 고딕"/>
-                      </a:endParaRPr>
-                    </a:p>
-                  </a:txBody>
-                  <a:tcPr marL="9525" marR="9525" marT="9525" marB="0" anchor="ctr"/>
-                </a:tc>
-              </a:tr>
-              <a:tr h="309634">
-                <a:tc>
-                  <a:txBody>
-                    <a:bodyPr/>
-                    <a:lstStyle/>
-                    <a:p>
-                      <a:pPr algn="ctr" fontAlgn="ctr"/>
-                      <a:r>
-                        <a:rPr lang="en-US" altLang="ko-KR" sz="1600" u="none" strike="noStrike">
-                          <a:effectLst/>
-                        </a:rPr>
-                        <a:t>9</a:t>
-                      </a:r>
-                      <a:endParaRPr lang="en-US" altLang="ko-KR" sz="1600" b="0" i="0" u="none" strike="noStrike">
-                        <a:solidFill>
-                          <a:srgbClr val="000000"/>
-                        </a:solidFill>
-                        <a:effectLst/>
-                        <a:latin typeface="맑은 고딕"/>
-                      </a:endParaRPr>
-                    </a:p>
-                  </a:txBody>
-                  <a:tcPr marL="9525" marR="9525" marT="9525" marB="0" anchor="ctr"/>
-                </a:tc>
-                <a:tc>
-                  <a:txBody>
-                    <a:bodyPr/>
-                    <a:lstStyle/>
-                    <a:p>
-                      <a:pPr algn="ctr" fontAlgn="ctr"/>
-                      <a:r>
-                        <a:rPr lang="en-US" sz="1600" u="none" strike="noStrike">
-                          <a:effectLst/>
-                        </a:rPr>
-                        <a:t>rs10491551</a:t>
-                      </a:r>
-                      <a:endParaRPr lang="en-US" sz="1600" b="0" i="0" u="none" strike="noStrike">
-                        <a:solidFill>
-                          <a:srgbClr val="000000"/>
-                        </a:solidFill>
-                        <a:effectLst/>
-                        <a:latin typeface="맑은 고딕"/>
-                      </a:endParaRPr>
-                    </a:p>
-                  </a:txBody>
-                  <a:tcPr marL="9525" marR="9525" marT="9525" marB="0" anchor="ctr"/>
-                </a:tc>
-                <a:tc>
-                  <a:txBody>
-                    <a:bodyPr/>
-                    <a:lstStyle/>
-                    <a:p>
-                      <a:pPr algn="ctr" fontAlgn="ctr"/>
-                      <a:r>
-                        <a:rPr lang="en-US" altLang="ko-KR" sz="1600" u="none" strike="noStrike">
-                          <a:effectLst/>
-                        </a:rPr>
-                        <a:t>0.7607</a:t>
-                      </a:r>
-                      <a:endParaRPr lang="en-US" altLang="ko-KR" sz="1600" b="0" i="0" u="none" strike="noStrike">
-                        <a:solidFill>
-                          <a:srgbClr val="000000"/>
-                        </a:solidFill>
-                        <a:effectLst/>
-                        <a:latin typeface="맑은 고딕"/>
-                      </a:endParaRPr>
-                    </a:p>
-                  </a:txBody>
-                  <a:tcPr marL="9525" marR="9525" marT="9525" marB="0" anchor="ctr"/>
-                </a:tc>
-              </a:tr>
-              <a:tr h="309634">
-                <a:tc>
-                  <a:txBody>
-                    <a:bodyPr/>
-                    <a:lstStyle/>
-                    <a:p>
-                      <a:pPr algn="ctr" fontAlgn="ctr"/>
-                      <a:r>
-                        <a:rPr lang="en-US" altLang="ko-KR" sz="1600" u="none" strike="noStrike">
-                          <a:effectLst/>
-                        </a:rPr>
-                        <a:t>4</a:t>
-                      </a:r>
-                      <a:endParaRPr lang="en-US" altLang="ko-KR" sz="1600" b="0" i="0" u="none" strike="noStrike">
-                        <a:solidFill>
-                          <a:srgbClr val="000000"/>
-                        </a:solidFill>
-                        <a:effectLst/>
-                        <a:latin typeface="맑은 고딕"/>
-                      </a:endParaRPr>
-                    </a:p>
-                  </a:txBody>
-                  <a:tcPr marL="9525" marR="9525" marT="9525" marB="0" anchor="ctr"/>
-                </a:tc>
-                <a:tc>
-                  <a:txBody>
-                    <a:bodyPr/>
-                    <a:lstStyle/>
-                    <a:p>
-                      <a:pPr algn="ctr" fontAlgn="ctr"/>
-                      <a:r>
-                        <a:rPr lang="en-US" sz="1600" u="none" strike="noStrike">
-                          <a:effectLst/>
-                        </a:rPr>
-                        <a:t>rs10517300</a:t>
-                      </a:r>
-                      <a:endParaRPr lang="en-US" sz="1600" b="0" i="0" u="none" strike="noStrike">
-                        <a:solidFill>
-                          <a:srgbClr val="000000"/>
-                        </a:solidFill>
-                        <a:effectLst/>
-                        <a:latin typeface="맑은 고딕"/>
-                      </a:endParaRPr>
-                    </a:p>
-                  </a:txBody>
-                  <a:tcPr marL="9525" marR="9525" marT="9525" marB="0" anchor="ctr"/>
-                </a:tc>
-                <a:tc>
-                  <a:txBody>
-                    <a:bodyPr/>
-                    <a:lstStyle/>
-                    <a:p>
-                      <a:pPr algn="ctr" fontAlgn="ctr"/>
-                      <a:r>
-                        <a:rPr lang="en-US" altLang="ko-KR" sz="1600" u="none" strike="noStrike">
-                          <a:effectLst/>
-                        </a:rPr>
-                        <a:t>0.6404</a:t>
-                      </a:r>
-                      <a:endParaRPr lang="en-US" altLang="ko-KR" sz="1600" b="0" i="0" u="none" strike="noStrike">
-                        <a:solidFill>
-                          <a:srgbClr val="000000"/>
-                        </a:solidFill>
-                        <a:effectLst/>
-                        <a:latin typeface="맑은 고딕"/>
-                      </a:endParaRPr>
-                    </a:p>
-                  </a:txBody>
-                  <a:tcPr marL="9525" marR="9525" marT="9525" marB="0" anchor="ctr"/>
-                </a:tc>
-              </a:tr>
-              <a:tr h="309634">
-                <a:tc>
-                  <a:txBody>
-                    <a:bodyPr/>
-                    <a:lstStyle/>
-                    <a:p>
-                      <a:pPr algn="ctr" fontAlgn="ctr"/>
-                      <a:r>
-                        <a:rPr lang="en-US" altLang="ko-KR" sz="1600" u="none" strike="noStrike">
-                          <a:effectLst/>
-                        </a:rPr>
-                        <a:t>15</a:t>
-                      </a:r>
-                      <a:endParaRPr lang="en-US" altLang="ko-KR" sz="1600" b="0" i="0" u="none" strike="noStrike">
-                        <a:solidFill>
-                          <a:srgbClr val="000000"/>
-                        </a:solidFill>
-                        <a:effectLst/>
-                        <a:latin typeface="맑은 고딕"/>
-                      </a:endParaRPr>
-                    </a:p>
-                  </a:txBody>
-                  <a:tcPr marL="9525" marR="9525" marT="9525" marB="0" anchor="ctr"/>
-                </a:tc>
-                <a:tc>
-                  <a:txBody>
-                    <a:bodyPr/>
-                    <a:lstStyle/>
-                    <a:p>
-                      <a:pPr algn="ctr" fontAlgn="ctr"/>
-                      <a:r>
-                        <a:rPr lang="en-US" sz="1600" u="none" strike="noStrike">
-                          <a:effectLst/>
-                        </a:rPr>
-                        <a:t>rs1051730</a:t>
-                      </a:r>
-                      <a:endParaRPr lang="en-US" sz="1600" b="0" i="0" u="none" strike="noStrike">
-                        <a:solidFill>
-                          <a:srgbClr val="000000"/>
-                        </a:solidFill>
-                        <a:effectLst/>
-                        <a:latin typeface="맑은 고딕"/>
-                      </a:endParaRPr>
-                    </a:p>
-                  </a:txBody>
-                  <a:tcPr marL="9525" marR="9525" marT="9525" marB="0" anchor="ctr"/>
-                </a:tc>
-                <a:tc>
-                  <a:txBody>
-                    <a:bodyPr/>
-                    <a:lstStyle/>
-                    <a:p>
-                      <a:pPr algn="ctr" fontAlgn="ctr"/>
-                      <a:r>
-                        <a:rPr lang="en-US" altLang="ko-KR" sz="1600" u="none" strike="noStrike">
-                          <a:effectLst/>
-                        </a:rPr>
-                        <a:t>1.0000</a:t>
-                      </a:r>
-                      <a:endParaRPr lang="en-US" altLang="ko-KR" sz="1600" b="0" i="0" u="none" strike="noStrike">
-                        <a:solidFill>
-                          <a:srgbClr val="000000"/>
-                        </a:solidFill>
-                        <a:effectLst/>
-                        <a:latin typeface="맑은 고딕"/>
-                      </a:endParaRPr>
-                    </a:p>
-                  </a:txBody>
-                  <a:tcPr marL="9525" marR="9525" marT="9525" marB="0" anchor="ctr"/>
-                </a:tc>
-              </a:tr>
-              <a:tr h="309634">
-                <a:tc>
-                  <a:txBody>
-                    <a:bodyPr/>
-                    <a:lstStyle/>
-                    <a:p>
-                      <a:pPr algn="ctr" fontAlgn="ctr"/>
-                      <a:r>
-                        <a:rPr lang="en-US" altLang="ko-KR" sz="1600" u="none" strike="noStrike" dirty="0">
-                          <a:effectLst/>
-                        </a:rPr>
-                        <a:t>21</a:t>
+                        <a:t>0.1560</a:t>
                       </a:r>
                       <a:endParaRPr lang="en-US" altLang="ko-KR" sz="1600" b="0" i="0" u="none" strike="noStrike" dirty="0">
                         <a:solidFill>
@@ -4658,52 +5192,11 @@
                   </a:txBody>
                   <a:tcPr marL="9525" marR="9525" marT="9525" marB="0" anchor="ctr"/>
                 </a:tc>
-                <a:tc>
-                  <a:txBody>
-                    <a:bodyPr/>
-                    <a:lstStyle/>
-                    <a:p>
-                      <a:pPr algn="ctr" fontAlgn="ctr"/>
-                      <a:r>
-                        <a:rPr lang="en-US" sz="1600" u="none" strike="noStrike">
-                          <a:effectLst/>
-                        </a:rPr>
-                        <a:t>rs2836823</a:t>
-                      </a:r>
-                      <a:endParaRPr lang="en-US" sz="1600" b="0" i="0" u="none" strike="noStrike">
-                        <a:solidFill>
-                          <a:srgbClr val="000000"/>
-                        </a:solidFill>
-                        <a:effectLst/>
-                        <a:latin typeface="맑은 고딕"/>
-                      </a:endParaRPr>
-                    </a:p>
-                  </a:txBody>
-                  <a:tcPr marL="9525" marR="9525" marT="9525" marB="0" anchor="ctr"/>
-                </a:tc>
-                <a:tc>
-                  <a:txBody>
-                    <a:bodyPr/>
-                    <a:lstStyle/>
-                    <a:p>
-                      <a:pPr algn="ctr" fontAlgn="ctr"/>
-                      <a:r>
-                        <a:rPr lang="en-US" altLang="ko-KR" sz="1600" u="none" strike="noStrike" dirty="0">
-                          <a:effectLst/>
-                        </a:rPr>
-                        <a:t>0.1648</a:t>
-                      </a:r>
-                      <a:endParaRPr lang="en-US" altLang="ko-KR" sz="1600" b="0" i="0" u="none" strike="noStrike" dirty="0">
-                        <a:solidFill>
-                          <a:srgbClr val="000000"/>
-                        </a:solidFill>
-                        <a:effectLst/>
-                        <a:latin typeface="맑은 고딕"/>
-                      </a:endParaRPr>
-                    </a:p>
-                  </a:txBody>
-                  <a:tcPr marL="9525" marR="9525" marT="9525" marB="0" anchor="ctr"/>
-                </a:tc>
+                <a:extLst>
+                  <a:ext uri="{0D108BD9-81ED-4DB2-BD59-A6C34878D82A}">
+                    <a16:rowId xmlns:a16="http://schemas.microsoft.com/office/drawing/2014/main" val="10009"/>
+                  </a:ext>
+                </a:extLst>
               </a:tr>
             </a:tbl>
           </a:graphicData>
@@ -4722,7 +5215,7 @@
 </p:sld>
 </file>
 
-<file path=ppt/slides/slide5.xml><?xml version="1.0" encoding="utf-8"?>
+<file path=ppt/slides/slide7.xml><?xml version="1.0" encoding="utf-8"?>
 <p:sld xmlns:a="http://schemas.openxmlformats.org/drawingml/2006/main" xmlns:r="http://schemas.openxmlformats.org/officeDocument/2006/relationships" xmlns:p="http://schemas.openxmlformats.org/presentationml/2006/main">
   <p:cSld>
     <p:spTree>
@@ -4785,7 +5278,7 @@
         </p:nvGraphicFramePr>
         <p:xfrm>
           <a:off x="683568" y="836712"/>
-          <a:ext cx="7712073" cy="5907957"/>
+          <a:ext cx="7712073" cy="6045745"/>
         </p:xfrm>
         <a:graphic>
           <a:graphicData uri="http://schemas.openxmlformats.org/drawingml/2006/table">
@@ -4795,56 +5288,56 @@
                 <a:gridCol w="934680">
                   <a:extLst>
                     <a:ext uri="{9D8B030D-6E8A-4147-A177-3AD203B41FA5}">
-                      <a16:colId xmlns:a16="http://schemas.microsoft.com/office/drawing/2014/main" xmlns="" val="306847010"/>
+                      <a16:colId xmlns:a16="http://schemas.microsoft.com/office/drawing/2014/main" val="306847010"/>
                     </a:ext>
                   </a:extLst>
                 </a:gridCol>
                 <a:gridCol w="934680">
                   <a:extLst>
                     <a:ext uri="{9D8B030D-6E8A-4147-A177-3AD203B41FA5}">
-                      <a16:colId xmlns:a16="http://schemas.microsoft.com/office/drawing/2014/main" xmlns="" val="2366364053"/>
+                      <a16:colId xmlns:a16="http://schemas.microsoft.com/office/drawing/2014/main" val="2366364053"/>
                     </a:ext>
                   </a:extLst>
                 </a:gridCol>
                 <a:gridCol w="679767">
                   <a:extLst>
                     <a:ext uri="{9D8B030D-6E8A-4147-A177-3AD203B41FA5}">
-                      <a16:colId xmlns:a16="http://schemas.microsoft.com/office/drawing/2014/main" xmlns="" val="3755844721"/>
+                      <a16:colId xmlns:a16="http://schemas.microsoft.com/office/drawing/2014/main" val="3755844721"/>
                     </a:ext>
                   </a:extLst>
                 </a:gridCol>
                 <a:gridCol w="1189593">
                   <a:extLst>
                     <a:ext uri="{9D8B030D-6E8A-4147-A177-3AD203B41FA5}">
-                      <a16:colId xmlns:a16="http://schemas.microsoft.com/office/drawing/2014/main" xmlns="" val="564739949"/>
+                      <a16:colId xmlns:a16="http://schemas.microsoft.com/office/drawing/2014/main" val="564739949"/>
                     </a:ext>
                   </a:extLst>
                 </a:gridCol>
                 <a:gridCol w="1189593">
                   <a:extLst>
                     <a:ext uri="{9D8B030D-6E8A-4147-A177-3AD203B41FA5}">
-                      <a16:colId xmlns:a16="http://schemas.microsoft.com/office/drawing/2014/main" xmlns="" val="1235457501"/>
+                      <a16:colId xmlns:a16="http://schemas.microsoft.com/office/drawing/2014/main" val="1235457501"/>
                     </a:ext>
                   </a:extLst>
                 </a:gridCol>
                 <a:gridCol w="679767">
                   <a:extLst>
                     <a:ext uri="{9D8B030D-6E8A-4147-A177-3AD203B41FA5}">
-                      <a16:colId xmlns:a16="http://schemas.microsoft.com/office/drawing/2014/main" xmlns="" val="921992363"/>
+                      <a16:colId xmlns:a16="http://schemas.microsoft.com/office/drawing/2014/main" val="921992363"/>
                     </a:ext>
                   </a:extLst>
                 </a:gridCol>
                 <a:gridCol w="1189593">
                   <a:extLst>
                     <a:ext uri="{9D8B030D-6E8A-4147-A177-3AD203B41FA5}">
-                      <a16:colId xmlns:a16="http://schemas.microsoft.com/office/drawing/2014/main" xmlns="" val="1616714432"/>
+                      <a16:colId xmlns:a16="http://schemas.microsoft.com/office/drawing/2014/main" val="1616714432"/>
                     </a:ext>
                   </a:extLst>
                 </a:gridCol>
                 <a:gridCol w="914400">
                   <a:extLst>
                     <a:ext uri="{9D8B030D-6E8A-4147-A177-3AD203B41FA5}">
-                      <a16:colId xmlns:a16="http://schemas.microsoft.com/office/drawing/2014/main" xmlns="" val="673316080"/>
+                      <a16:colId xmlns:a16="http://schemas.microsoft.com/office/drawing/2014/main" val="673316080"/>
                     </a:ext>
                   </a:extLst>
                 </a:gridCol>
@@ -5503,7 +5996,7 @@
                 </a:tc>
                 <a:extLst>
                   <a:ext uri="{0D108BD9-81ED-4DB2-BD59-A6C34878D82A}">
-                    <a16:rowId xmlns:a16="http://schemas.microsoft.com/office/drawing/2014/main" xmlns="" val="337799944"/>
+                    <a16:rowId xmlns:a16="http://schemas.microsoft.com/office/drawing/2014/main" val="337799944"/>
                   </a:ext>
                 </a:extLst>
               </a:tr>
@@ -6454,7 +6947,7 @@
                 </a:tc>
                 <a:extLst>
                   <a:ext uri="{0D108BD9-81ED-4DB2-BD59-A6C34878D82A}">
-                    <a16:rowId xmlns:a16="http://schemas.microsoft.com/office/drawing/2014/main" xmlns="" val="552318667"/>
+                    <a16:rowId xmlns:a16="http://schemas.microsoft.com/office/drawing/2014/main" val="552318667"/>
                   </a:ext>
                 </a:extLst>
               </a:tr>
@@ -7738,7 +8231,7 @@
                 </a:tc>
                 <a:extLst>
                   <a:ext uri="{0D108BD9-81ED-4DB2-BD59-A6C34878D82A}">
-                    <a16:rowId xmlns:a16="http://schemas.microsoft.com/office/drawing/2014/main" xmlns="" val="3154322294"/>
+                    <a16:rowId xmlns:a16="http://schemas.microsoft.com/office/drawing/2014/main" val="3154322294"/>
                   </a:ext>
                 </a:extLst>
               </a:tr>
@@ -8392,7 +8885,7 @@
                 </a:tc>
                 <a:extLst>
                   <a:ext uri="{0D108BD9-81ED-4DB2-BD59-A6C34878D82A}">
-                    <a16:rowId xmlns:a16="http://schemas.microsoft.com/office/drawing/2014/main" xmlns="" val="3824680710"/>
+                    <a16:rowId xmlns:a16="http://schemas.microsoft.com/office/drawing/2014/main" val="3824680710"/>
                   </a:ext>
                 </a:extLst>
               </a:tr>
@@ -9050,7 +9543,7 @@
                 </a:tc>
                 <a:extLst>
                   <a:ext uri="{0D108BD9-81ED-4DB2-BD59-A6C34878D82A}">
-                    <a16:rowId xmlns:a16="http://schemas.microsoft.com/office/drawing/2014/main" xmlns="" val="2949066572"/>
+                    <a16:rowId xmlns:a16="http://schemas.microsoft.com/office/drawing/2014/main" val="2949066572"/>
                   </a:ext>
                 </a:extLst>
               </a:tr>
@@ -9704,7 +10197,7 @@
                 </a:tc>
                 <a:extLst>
                   <a:ext uri="{0D108BD9-81ED-4DB2-BD59-A6C34878D82A}">
-                    <a16:rowId xmlns:a16="http://schemas.microsoft.com/office/drawing/2014/main" xmlns="" val="762562684"/>
+                    <a16:rowId xmlns:a16="http://schemas.microsoft.com/office/drawing/2014/main" val="762562684"/>
                   </a:ext>
                 </a:extLst>
               </a:tr>
@@ -10257,7 +10750,7 @@
                 </a:tc>
                 <a:extLst>
                   <a:ext uri="{0D108BD9-81ED-4DB2-BD59-A6C34878D82A}">
-                    <a16:rowId xmlns:a16="http://schemas.microsoft.com/office/drawing/2014/main" xmlns="" val="2336757687"/>
+                    <a16:rowId xmlns:a16="http://schemas.microsoft.com/office/drawing/2014/main" val="2336757687"/>
                   </a:ext>
                 </a:extLst>
               </a:tr>
@@ -10935,7 +11428,7 @@
                 </a:tc>
                 <a:extLst>
                   <a:ext uri="{0D108BD9-81ED-4DB2-BD59-A6C34878D82A}">
-                    <a16:rowId xmlns:a16="http://schemas.microsoft.com/office/drawing/2014/main" xmlns="" val="739462245"/>
+                    <a16:rowId xmlns:a16="http://schemas.microsoft.com/office/drawing/2014/main" val="739462245"/>
                   </a:ext>
                 </a:extLst>
               </a:tr>
@@ -12219,7 +12712,7 @@
                 </a:tc>
                 <a:extLst>
                   <a:ext uri="{0D108BD9-81ED-4DB2-BD59-A6C34878D82A}">
-                    <a16:rowId xmlns:a16="http://schemas.microsoft.com/office/drawing/2014/main" xmlns="" val="2285249298"/>
+                    <a16:rowId xmlns:a16="http://schemas.microsoft.com/office/drawing/2014/main" val="2285249298"/>
                   </a:ext>
                 </a:extLst>
               </a:tr>
@@ -12873,7 +13366,7 @@
                 </a:tc>
                 <a:extLst>
                   <a:ext uri="{0D108BD9-81ED-4DB2-BD59-A6C34878D82A}">
-                    <a16:rowId xmlns:a16="http://schemas.microsoft.com/office/drawing/2014/main" xmlns="" val="605521000"/>
+                    <a16:rowId xmlns:a16="http://schemas.microsoft.com/office/drawing/2014/main" val="605521000"/>
                   </a:ext>
                 </a:extLst>
               </a:tr>
@@ -13519,7 +14012,7 @@
                 </a:tc>
                 <a:extLst>
                   <a:ext uri="{0D108BD9-81ED-4DB2-BD59-A6C34878D82A}">
-                    <a16:rowId xmlns:a16="http://schemas.microsoft.com/office/drawing/2014/main" xmlns="" val="3873839538"/>
+                    <a16:rowId xmlns:a16="http://schemas.microsoft.com/office/drawing/2014/main" val="3873839538"/>
                   </a:ext>
                 </a:extLst>
               </a:tr>
@@ -14173,7 +14666,7 @@
                 </a:tc>
                 <a:extLst>
                   <a:ext uri="{0D108BD9-81ED-4DB2-BD59-A6C34878D82A}">
-                    <a16:rowId xmlns:a16="http://schemas.microsoft.com/office/drawing/2014/main" xmlns="" val="121681536"/>
+                    <a16:rowId xmlns:a16="http://schemas.microsoft.com/office/drawing/2014/main" val="121681536"/>
                   </a:ext>
                 </a:extLst>
               </a:tr>
@@ -14726,7 +15219,7 @@
                 </a:tc>
                 <a:extLst>
                   <a:ext uri="{0D108BD9-81ED-4DB2-BD59-A6C34878D82A}">
-                    <a16:rowId xmlns:a16="http://schemas.microsoft.com/office/drawing/2014/main" xmlns="" val="71002534"/>
+                    <a16:rowId xmlns:a16="http://schemas.microsoft.com/office/drawing/2014/main" val="71002534"/>
                   </a:ext>
                 </a:extLst>
               </a:tr>
@@ -15404,7 +15897,7 @@
                 </a:tc>
                 <a:extLst>
                   <a:ext uri="{0D108BD9-81ED-4DB2-BD59-A6C34878D82A}">
-                    <a16:rowId xmlns:a16="http://schemas.microsoft.com/office/drawing/2014/main" xmlns="" val="273795730"/>
+                    <a16:rowId xmlns:a16="http://schemas.microsoft.com/office/drawing/2014/main" val="273795730"/>
                   </a:ext>
                 </a:extLst>
               </a:tr>
@@ -15425,7 +15918,7 @@
 </p:sld>
 </file>
 
-<file path=ppt/slides/slide6.xml><?xml version="1.0" encoding="utf-8"?>
+<file path=ppt/slides/slide8.xml><?xml version="1.0" encoding="utf-8"?>
 <p:sld xmlns:a="http://schemas.openxmlformats.org/drawingml/2006/main" xmlns:r="http://schemas.openxmlformats.org/officeDocument/2006/relationships" xmlns:p="http://schemas.openxmlformats.org/presentationml/2006/main">
   <p:cSld>
     <p:spTree>
@@ -15474,7 +15967,7 @@
           <p:nvPr>
             <p:extLst>
               <p:ext uri="{D42A27DB-BD31-4B8C-83A1-F6EECF244321}">
-                <p14:modId xmlns:p14="http://schemas.microsoft.com/office/powerpoint/2010/main" val="4109698924"/>
+                <p14:modId xmlns:p14="http://schemas.microsoft.com/office/powerpoint/2010/main" val="1551720770"/>
               </p:ext>
             </p:extLst>
           </p:nvPr>
@@ -15493,39 +15986,45 @@
                 <a:gridCol w="900000">
                   <a:extLst>
                     <a:ext uri="{9D8B030D-6E8A-4147-A177-3AD203B41FA5}">
-                      <a16:colId xmlns:a16="http://schemas.microsoft.com/office/drawing/2014/main" xmlns="" val="4272160771"/>
+                      <a16:colId xmlns:a16="http://schemas.microsoft.com/office/drawing/2014/main" val="4272160771"/>
                     </a:ext>
                   </a:extLst>
                 </a:gridCol>
                 <a:gridCol w="768085">
                   <a:extLst>
                     <a:ext uri="{9D8B030D-6E8A-4147-A177-3AD203B41FA5}">
-                      <a16:colId xmlns:a16="http://schemas.microsoft.com/office/drawing/2014/main" xmlns="" val="309721779"/>
+                      <a16:colId xmlns:a16="http://schemas.microsoft.com/office/drawing/2014/main" val="309721779"/>
                     </a:ext>
                   </a:extLst>
                 </a:gridCol>
                 <a:gridCol w="1440000">
                   <a:extLst>
                     <a:ext uri="{9D8B030D-6E8A-4147-A177-3AD203B41FA5}">
-                      <a16:colId xmlns:a16="http://schemas.microsoft.com/office/drawing/2014/main" xmlns="" val="373633616"/>
+                      <a16:colId xmlns:a16="http://schemas.microsoft.com/office/drawing/2014/main" val="373633616"/>
                     </a:ext>
                   </a:extLst>
                 </a:gridCol>
                 <a:gridCol w="768085">
                   <a:extLst>
                     <a:ext uri="{9D8B030D-6E8A-4147-A177-3AD203B41FA5}">
-                      <a16:colId xmlns:a16="http://schemas.microsoft.com/office/drawing/2014/main" xmlns="" val="2540930814"/>
+                      <a16:colId xmlns:a16="http://schemas.microsoft.com/office/drawing/2014/main" val="2540930814"/>
                     </a:ext>
                   </a:extLst>
                 </a:gridCol>
                 <a:gridCol w="1440000">
                   <a:extLst>
                     <a:ext uri="{9D8B030D-6E8A-4147-A177-3AD203B41FA5}">
-                      <a16:colId xmlns:a16="http://schemas.microsoft.com/office/drawing/2014/main" xmlns="" val="1660113903"/>
+                      <a16:colId xmlns:a16="http://schemas.microsoft.com/office/drawing/2014/main" val="1660113903"/>
                     </a:ext>
                   </a:extLst>
                 </a:gridCol>
-                <a:gridCol w="768085"/>
+                <a:gridCol w="768085">
+                  <a:extLst>
+                    <a:ext uri="{9D8B030D-6E8A-4147-A177-3AD203B41FA5}">
+                      <a16:colId xmlns:a16="http://schemas.microsoft.com/office/drawing/2014/main" val="20005"/>
+                    </a:ext>
+                  </a:extLst>
+                </a:gridCol>
               </a:tblGrid>
               <a:tr h="252028">
                 <a:tc rowSpan="2">
@@ -15714,7 +16213,7 @@
                 </a:tc>
                 <a:extLst>
                   <a:ext uri="{0D108BD9-81ED-4DB2-BD59-A6C34878D82A}">
-                    <a16:rowId xmlns:a16="http://schemas.microsoft.com/office/drawing/2014/main" xmlns="" val="369884696"/>
+                    <a16:rowId xmlns:a16="http://schemas.microsoft.com/office/drawing/2014/main" val="369884696"/>
                   </a:ext>
                 </a:extLst>
               </a:tr>
@@ -15932,7 +16431,7 @@
                 </a:tc>
                 <a:extLst>
                   <a:ext uri="{0D108BD9-81ED-4DB2-BD59-A6C34878D82A}">
-                    <a16:rowId xmlns:a16="http://schemas.microsoft.com/office/drawing/2014/main" xmlns="" val="1095125848"/>
+                    <a16:rowId xmlns:a16="http://schemas.microsoft.com/office/drawing/2014/main" val="1095125848"/>
                   </a:ext>
                 </a:extLst>
               </a:tr>
@@ -15973,7 +16472,7 @@
                       <a:pPr algn="ctr"/>
                       <a:r>
                         <a:rPr lang="en-US" sz="1100" dirty="0" smtClean="0"/>
-                        <a:t>191</a:t>
+                        <a:t>190</a:t>
                       </a:r>
                       <a:endParaRPr lang="en-US" sz="1100" dirty="0">
                         <a:latin typeface="Arial" panose="020B0604020202020204" pitchFamily="34" charset="0"/>
@@ -16001,8 +16500,9 @@
                       <a:pPr algn="ctr"/>
                       <a:r>
                         <a:rPr lang="en-US" sz="1100" dirty="0" smtClean="0"/>
-                        <a:t>0.1702</a:t>
-                      </a:r>
+                        <a:t>0.1684</a:t>
+                      </a:r>
+                      <a:endParaRPr lang="en-US" sz="1100" dirty="0" smtClean="0"/>
                     </a:p>
                     <a:p>
                       <a:pPr algn="ctr"/>
@@ -16011,7 +16511,28 @@
                           <a:latin typeface="Arial" panose="020B0604020202020204" pitchFamily="34" charset="0"/>
                           <a:cs typeface="Arial" panose="020B0604020202020204" pitchFamily="34" charset="0"/>
                         </a:rPr>
-                        <a:t>(0.133 - 0.208)</a:t>
+                        <a:t>(</a:t>
+                      </a:r>
+                      <a:r>
+                        <a:rPr lang="en-US" sz="1100" dirty="0" smtClean="0">
+                          <a:latin typeface="Arial" panose="020B0604020202020204" pitchFamily="34" charset="0"/>
+                          <a:cs typeface="Arial" panose="020B0604020202020204" pitchFamily="34" charset="0"/>
+                        </a:rPr>
+                        <a:t>0.131 </a:t>
+                      </a:r>
+                      <a:r>
+                        <a:rPr lang="en-US" sz="1100" dirty="0" smtClean="0">
+                          <a:latin typeface="Arial" panose="020B0604020202020204" pitchFamily="34" charset="0"/>
+                          <a:cs typeface="Arial" panose="020B0604020202020204" pitchFamily="34" charset="0"/>
+                        </a:rPr>
+                        <a:t>- </a:t>
+                      </a:r>
+                      <a:r>
+                        <a:rPr lang="en-US" sz="1100" dirty="0" smtClean="0">
+                          <a:latin typeface="Arial" panose="020B0604020202020204" pitchFamily="34" charset="0"/>
+                          <a:cs typeface="Arial" panose="020B0604020202020204" pitchFamily="34" charset="0"/>
+                        </a:rPr>
+                        <a:t>0.206)</a:t>
                       </a:r>
                       <a:endParaRPr lang="en-US" sz="1100" dirty="0">
                         <a:latin typeface="Arial" panose="020B0604020202020204" pitchFamily="34" charset="0"/>
@@ -16039,7 +16560,7 @@
                       <a:pPr algn="ctr"/>
                       <a:r>
                         <a:rPr lang="en-US" sz="1100" dirty="0" smtClean="0"/>
-                        <a:t>234</a:t>
+                        <a:t>233</a:t>
                       </a:r>
                       <a:endParaRPr lang="en-US" sz="1100" dirty="0">
                         <a:latin typeface="Arial" panose="020B0604020202020204" pitchFamily="34" charset="0"/>
@@ -16067,8 +16588,9 @@
                       <a:pPr algn="ctr"/>
                       <a:r>
                         <a:rPr lang="en-US" sz="1100" dirty="0" smtClean="0"/>
-                        <a:t>0.1624</a:t>
-                      </a:r>
+                        <a:t>0.1631</a:t>
+                      </a:r>
+                      <a:endParaRPr lang="en-US" sz="1100" dirty="0" smtClean="0"/>
                     </a:p>
                     <a:p>
                       <a:pPr algn="ctr"/>
@@ -16077,7 +16599,28 @@
                           <a:latin typeface="Arial" panose="020B0604020202020204" pitchFamily="34" charset="0"/>
                           <a:cs typeface="Arial" panose="020B0604020202020204" pitchFamily="34" charset="0"/>
                         </a:rPr>
-                        <a:t>(0.129 - 0.196)</a:t>
+                        <a:t>(</a:t>
+                      </a:r>
+                      <a:r>
+                        <a:rPr lang="en-US" sz="1100" dirty="0" smtClean="0">
+                          <a:latin typeface="Arial" panose="020B0604020202020204" pitchFamily="34" charset="0"/>
+                          <a:cs typeface="Arial" panose="020B0604020202020204" pitchFamily="34" charset="0"/>
+                        </a:rPr>
+                        <a:t>0.130 </a:t>
+                      </a:r>
+                      <a:r>
+                        <a:rPr lang="en-US" sz="1100" dirty="0" smtClean="0">
+                          <a:latin typeface="Arial" panose="020B0604020202020204" pitchFamily="34" charset="0"/>
+                          <a:cs typeface="Arial" panose="020B0604020202020204" pitchFamily="34" charset="0"/>
+                        </a:rPr>
+                        <a:t>- </a:t>
+                      </a:r>
+                      <a:r>
+                        <a:rPr lang="en-US" sz="1100" dirty="0" smtClean="0">
+                          <a:latin typeface="Arial" panose="020B0604020202020204" pitchFamily="34" charset="0"/>
+                          <a:cs typeface="Arial" panose="020B0604020202020204" pitchFamily="34" charset="0"/>
+                        </a:rPr>
+                        <a:t>0.197)</a:t>
                       </a:r>
                       <a:endParaRPr lang="en-US" sz="1100" dirty="0">
                         <a:latin typeface="Arial" panose="020B0604020202020204" pitchFamily="34" charset="0"/>
@@ -16108,7 +16651,7 @@
                           <a:latin typeface="Arial" panose="020B0604020202020204" pitchFamily="34" charset="0"/>
                           <a:cs typeface="Arial" panose="020B0604020202020204" pitchFamily="34" charset="0"/>
                         </a:rPr>
-                        <a:t>0.7615</a:t>
+                        <a:t>0.8367</a:t>
                       </a:r>
                       <a:endParaRPr lang="en-US" sz="1100" dirty="0">
                         <a:latin typeface="Arial" panose="020B0604020202020204" pitchFamily="34" charset="0"/>
@@ -16130,7 +16673,7 @@
                 </a:tc>
                 <a:extLst>
                   <a:ext uri="{0D108BD9-81ED-4DB2-BD59-A6C34878D82A}">
-                    <a16:rowId xmlns:a16="http://schemas.microsoft.com/office/drawing/2014/main" xmlns="" val="3552934910"/>
+                    <a16:rowId xmlns:a16="http://schemas.microsoft.com/office/drawing/2014/main" val="3552934910"/>
                   </a:ext>
                 </a:extLst>
               </a:tr>
@@ -16171,7 +16714,7 @@
                       <a:pPr algn="ctr"/>
                       <a:r>
                         <a:rPr lang="en-US" sz="1100" dirty="0" smtClean="0"/>
-                        <a:t>191</a:t>
+                        <a:t>190</a:t>
                       </a:r>
                       <a:endParaRPr lang="en-US" sz="1100" dirty="0">
                         <a:latin typeface="Arial" panose="020B0604020202020204" pitchFamily="34" charset="0"/>
@@ -16199,8 +16742,9 @@
                       <a:pPr algn="ctr"/>
                       <a:r>
                         <a:rPr lang="en-US" sz="1100" dirty="0" smtClean="0"/>
-                        <a:t>0.1492</a:t>
-                      </a:r>
+                        <a:t>0.1474</a:t>
+                      </a:r>
+                      <a:endParaRPr lang="en-US" sz="1100" dirty="0" smtClean="0"/>
                     </a:p>
                     <a:p>
                       <a:pPr algn="ctr"/>
@@ -16209,7 +16753,28 @@
                           <a:latin typeface="Arial" panose="020B0604020202020204" pitchFamily="34" charset="0"/>
                           <a:cs typeface="Arial" panose="020B0604020202020204" pitchFamily="34" charset="0"/>
                         </a:rPr>
-                        <a:t>(0.113 - 0.185)</a:t>
+                        <a:t>(</a:t>
+                      </a:r>
+                      <a:r>
+                        <a:rPr lang="en-US" sz="1100" dirty="0" smtClean="0">
+                          <a:latin typeface="Arial" panose="020B0604020202020204" pitchFamily="34" charset="0"/>
+                          <a:cs typeface="Arial" panose="020B0604020202020204" pitchFamily="34" charset="0"/>
+                        </a:rPr>
+                        <a:t>0.112 </a:t>
+                      </a:r>
+                      <a:r>
+                        <a:rPr lang="en-US" sz="1100" dirty="0" smtClean="0">
+                          <a:latin typeface="Arial" panose="020B0604020202020204" pitchFamily="34" charset="0"/>
+                          <a:cs typeface="Arial" panose="020B0604020202020204" pitchFamily="34" charset="0"/>
+                        </a:rPr>
+                        <a:t>- </a:t>
+                      </a:r>
+                      <a:r>
+                        <a:rPr lang="en-US" sz="1100" dirty="0" smtClean="0">
+                          <a:latin typeface="Arial" panose="020B0604020202020204" pitchFamily="34" charset="0"/>
+                          <a:cs typeface="Arial" panose="020B0604020202020204" pitchFamily="34" charset="0"/>
+                        </a:rPr>
+                        <a:t>0.183)</a:t>
                       </a:r>
                       <a:endParaRPr lang="en-US" sz="1100" dirty="0">
                         <a:latin typeface="Arial" panose="020B0604020202020204" pitchFamily="34" charset="0"/>
@@ -16237,7 +16802,7 @@
                       <a:pPr algn="ctr"/>
                       <a:r>
                         <a:rPr lang="en-US" sz="1100" dirty="0" smtClean="0"/>
-                        <a:t>237</a:t>
+                        <a:t>236</a:t>
                       </a:r>
                       <a:endParaRPr lang="en-US" sz="1100" dirty="0">
                         <a:latin typeface="Arial" panose="020B0604020202020204" pitchFamily="34" charset="0"/>
@@ -16265,8 +16830,9 @@
                       <a:pPr algn="ctr"/>
                       <a:r>
                         <a:rPr lang="en-US" sz="1100" dirty="0" smtClean="0"/>
-                        <a:t>0.1371</a:t>
-                      </a:r>
+                        <a:t>0.1377</a:t>
+                      </a:r>
+                      <a:endParaRPr lang="en-US" sz="1100" dirty="0" smtClean="0"/>
                     </a:p>
                     <a:p>
                       <a:pPr algn="ctr"/>
@@ -16275,7 +16841,28 @@
                           <a:latin typeface="Arial" panose="020B0604020202020204" pitchFamily="34" charset="0"/>
                           <a:cs typeface="Arial" panose="020B0604020202020204" pitchFamily="34" charset="0"/>
                         </a:rPr>
-                        <a:t>(0.106 - 0.168)</a:t>
+                        <a:t>(</a:t>
+                      </a:r>
+                      <a:r>
+                        <a:rPr lang="en-US" sz="1100" dirty="0" smtClean="0">
+                          <a:latin typeface="Arial" panose="020B0604020202020204" pitchFamily="34" charset="0"/>
+                          <a:cs typeface="Arial" panose="020B0604020202020204" pitchFamily="34" charset="0"/>
+                        </a:rPr>
+                        <a:t>0.107 </a:t>
+                      </a:r>
+                      <a:r>
+                        <a:rPr lang="en-US" sz="1100" dirty="0" smtClean="0">
+                          <a:latin typeface="Arial" panose="020B0604020202020204" pitchFamily="34" charset="0"/>
+                          <a:cs typeface="Arial" panose="020B0604020202020204" pitchFamily="34" charset="0"/>
+                        </a:rPr>
+                        <a:t>- </a:t>
+                      </a:r>
+                      <a:r>
+                        <a:rPr lang="en-US" sz="1100" dirty="0" smtClean="0">
+                          <a:latin typeface="Arial" panose="020B0604020202020204" pitchFamily="34" charset="0"/>
+                          <a:cs typeface="Arial" panose="020B0604020202020204" pitchFamily="34" charset="0"/>
+                        </a:rPr>
+                        <a:t>0.169)</a:t>
                       </a:r>
                       <a:endParaRPr lang="en-US" sz="1100" dirty="0">
                         <a:latin typeface="Arial" panose="020B0604020202020204" pitchFamily="34" charset="0"/>
@@ -16306,7 +16893,7 @@
                           <a:latin typeface="Arial" panose="020B0604020202020204" pitchFamily="34" charset="0"/>
                           <a:cs typeface="Arial" panose="020B0604020202020204" pitchFamily="34" charset="0"/>
                         </a:rPr>
-                        <a:t>0.6159</a:t>
+                        <a:t>0.6877</a:t>
                       </a:r>
                       <a:endParaRPr lang="en-US" sz="1100" dirty="0">
                         <a:latin typeface="Arial" panose="020B0604020202020204" pitchFamily="34" charset="0"/>
@@ -16328,7 +16915,7 @@
                 </a:tc>
                 <a:extLst>
                   <a:ext uri="{0D108BD9-81ED-4DB2-BD59-A6C34878D82A}">
-                    <a16:rowId xmlns:a16="http://schemas.microsoft.com/office/drawing/2014/main" xmlns="" val="2393445760"/>
+                    <a16:rowId xmlns:a16="http://schemas.microsoft.com/office/drawing/2014/main" val="2393445760"/>
                   </a:ext>
                 </a:extLst>
               </a:tr>

</xml_diff>

<commit_message>
[LAM] 1. Updat in this weekend
</commit_message>
<xml_diff>
--- a/LAM/Revision_20181012.pptx
+++ b/LAM/Revision_20181012.pptx
@@ -113,7 +113,7 @@
   </p:defaultTextStyle>
   <p:extLst>
     <p:ext uri="{EFAFB233-063F-42B5-8137-9DF3F51BA10A}">
-      <p15:sldGuideLst xmlns:p15="http://schemas.microsoft.com/office/powerpoint/2012/main">
+      <p15:sldGuideLst xmlns:p15="http://schemas.microsoft.com/office/powerpoint/2012/main" xmlns="">
         <p15:guide id="1" orient="horz" pos="2160">
           <p15:clr>
             <a:srgbClr val="A4A3A4"/>
@@ -311,7 +311,7 @@
           <a:p>
             <a:fld id="{77C75E63-A34A-4FB8-8C0B-76C384431191}" type="datetimeFigureOut">
               <a:rPr lang="ko-KR" altLang="en-US" smtClean="0"/>
-              <a:t>2018-10-12</a:t>
+              <a:t>2018-10-13</a:t>
             </a:fld>
             <a:endParaRPr lang="ko-KR" altLang="en-US"/>
           </a:p>
@@ -481,7 +481,7 @@
           <a:p>
             <a:fld id="{77C75E63-A34A-4FB8-8C0B-76C384431191}" type="datetimeFigureOut">
               <a:rPr lang="ko-KR" altLang="en-US" smtClean="0"/>
-              <a:t>2018-10-12</a:t>
+              <a:t>2018-10-13</a:t>
             </a:fld>
             <a:endParaRPr lang="ko-KR" altLang="en-US"/>
           </a:p>
@@ -661,7 +661,7 @@
           <a:p>
             <a:fld id="{77C75E63-A34A-4FB8-8C0B-76C384431191}" type="datetimeFigureOut">
               <a:rPr lang="ko-KR" altLang="en-US" smtClean="0"/>
-              <a:t>2018-10-12</a:t>
+              <a:t>2018-10-13</a:t>
             </a:fld>
             <a:endParaRPr lang="ko-KR" altLang="en-US"/>
           </a:p>
@@ -831,7 +831,7 @@
           <a:p>
             <a:fld id="{77C75E63-A34A-4FB8-8C0B-76C384431191}" type="datetimeFigureOut">
               <a:rPr lang="ko-KR" altLang="en-US" smtClean="0"/>
-              <a:t>2018-10-12</a:t>
+              <a:t>2018-10-13</a:t>
             </a:fld>
             <a:endParaRPr lang="ko-KR" altLang="en-US"/>
           </a:p>
@@ -1077,7 +1077,7 @@
           <a:p>
             <a:fld id="{77C75E63-A34A-4FB8-8C0B-76C384431191}" type="datetimeFigureOut">
               <a:rPr lang="ko-KR" altLang="en-US" smtClean="0"/>
-              <a:t>2018-10-12</a:t>
+              <a:t>2018-10-13</a:t>
             </a:fld>
             <a:endParaRPr lang="ko-KR" altLang="en-US"/>
           </a:p>
@@ -1365,7 +1365,7 @@
           <a:p>
             <a:fld id="{77C75E63-A34A-4FB8-8C0B-76C384431191}" type="datetimeFigureOut">
               <a:rPr lang="ko-KR" altLang="en-US" smtClean="0"/>
-              <a:t>2018-10-12</a:t>
+              <a:t>2018-10-13</a:t>
             </a:fld>
             <a:endParaRPr lang="ko-KR" altLang="en-US"/>
           </a:p>
@@ -1787,7 +1787,7 @@
           <a:p>
             <a:fld id="{77C75E63-A34A-4FB8-8C0B-76C384431191}" type="datetimeFigureOut">
               <a:rPr lang="ko-KR" altLang="en-US" smtClean="0"/>
-              <a:t>2018-10-12</a:t>
+              <a:t>2018-10-13</a:t>
             </a:fld>
             <a:endParaRPr lang="ko-KR" altLang="en-US"/>
           </a:p>
@@ -1905,7 +1905,7 @@
           <a:p>
             <a:fld id="{77C75E63-A34A-4FB8-8C0B-76C384431191}" type="datetimeFigureOut">
               <a:rPr lang="ko-KR" altLang="en-US" smtClean="0"/>
-              <a:t>2018-10-12</a:t>
+              <a:t>2018-10-13</a:t>
             </a:fld>
             <a:endParaRPr lang="ko-KR" altLang="en-US"/>
           </a:p>
@@ -2000,7 +2000,7 @@
           <a:p>
             <a:fld id="{77C75E63-A34A-4FB8-8C0B-76C384431191}" type="datetimeFigureOut">
               <a:rPr lang="ko-KR" altLang="en-US" smtClean="0"/>
-              <a:t>2018-10-12</a:t>
+              <a:t>2018-10-13</a:t>
             </a:fld>
             <a:endParaRPr lang="ko-KR" altLang="en-US"/>
           </a:p>
@@ -2277,7 +2277,7 @@
           <a:p>
             <a:fld id="{77C75E63-A34A-4FB8-8C0B-76C384431191}" type="datetimeFigureOut">
               <a:rPr lang="ko-KR" altLang="en-US" smtClean="0"/>
-              <a:t>2018-10-12</a:t>
+              <a:t>2018-10-13</a:t>
             </a:fld>
             <a:endParaRPr lang="ko-KR" altLang="en-US"/>
           </a:p>
@@ -2530,7 +2530,7 @@
           <a:p>
             <a:fld id="{77C75E63-A34A-4FB8-8C0B-76C384431191}" type="datetimeFigureOut">
               <a:rPr lang="ko-KR" altLang="en-US" smtClean="0"/>
-              <a:t>2018-10-12</a:t>
+              <a:t>2018-10-13</a:t>
             </a:fld>
             <a:endParaRPr lang="ko-KR" altLang="en-US"/>
           </a:p>
@@ -2743,7 +2743,7 @@
           <a:p>
             <a:fld id="{77C75E63-A34A-4FB8-8C0B-76C384431191}" type="datetimeFigureOut">
               <a:rPr lang="ko-KR" altLang="en-US" smtClean="0"/>
-              <a:t>2018-10-12</a:t>
+              <a:t>2018-10-13</a:t>
             </a:fld>
             <a:endParaRPr lang="ko-KR" altLang="en-US"/>
           </a:p>
@@ -3583,11 +3583,7 @@
             </a:r>
             <a:r>
               <a:rPr lang="ko-KR" altLang="en-US" sz="1800" dirty="0" smtClean="0"/>
-              <a:t>가 다른 값에 비하여 동떨어져 </a:t>
-            </a:r>
-            <a:r>
-              <a:rPr lang="ko-KR" altLang="en-US" sz="1800" dirty="0" smtClean="0"/>
-              <a:t>있음 </a:t>
+              <a:t>가 다른 값에 비하여 동떨어져 있음 </a:t>
             </a:r>
             <a:r>
               <a:rPr lang="en-US" altLang="ko-KR" sz="1800" dirty="0" smtClean="0"/>
@@ -4355,21 +4351,21 @@
                 <a:gridCol w="1112921">
                   <a:extLst>
                     <a:ext uri="{9D8B030D-6E8A-4147-A177-3AD203B41FA5}">
-                      <a16:colId xmlns:a16="http://schemas.microsoft.com/office/drawing/2014/main" val="20000"/>
+                      <a16:colId xmlns:a16="http://schemas.microsoft.com/office/drawing/2014/main" xmlns="" val="20000"/>
                     </a:ext>
                   </a:extLst>
                 </a:gridCol>
                 <a:gridCol w="1462712">
                   <a:extLst>
                     <a:ext uri="{9D8B030D-6E8A-4147-A177-3AD203B41FA5}">
-                      <a16:colId xmlns:a16="http://schemas.microsoft.com/office/drawing/2014/main" val="20001"/>
+                      <a16:colId xmlns:a16="http://schemas.microsoft.com/office/drawing/2014/main" xmlns="" val="20001"/>
                     </a:ext>
                   </a:extLst>
                 </a:gridCol>
                 <a:gridCol w="1221121">
                   <a:extLst>
                     <a:ext uri="{9D8B030D-6E8A-4147-A177-3AD203B41FA5}">
-                      <a16:colId xmlns:a16="http://schemas.microsoft.com/office/drawing/2014/main" val="20002"/>
+                      <a16:colId xmlns:a16="http://schemas.microsoft.com/office/drawing/2014/main" xmlns="" val="20002"/>
                     </a:ext>
                   </a:extLst>
                 </a:gridCol>
@@ -4476,7 +4472,7 @@
                 </a:tc>
                 <a:extLst>
                   <a:ext uri="{0D108BD9-81ED-4DB2-BD59-A6C34878D82A}">
-                    <a16:rowId xmlns:a16="http://schemas.microsoft.com/office/drawing/2014/main" val="10000"/>
+                    <a16:rowId xmlns:a16="http://schemas.microsoft.com/office/drawing/2014/main" xmlns="" val="10000"/>
                   </a:ext>
                 </a:extLst>
               </a:tr>
@@ -4582,7 +4578,7 @@
                 </a:tc>
                 <a:extLst>
                   <a:ext uri="{0D108BD9-81ED-4DB2-BD59-A6C34878D82A}">
-                    <a16:rowId xmlns:a16="http://schemas.microsoft.com/office/drawing/2014/main" val="10001"/>
+                    <a16:rowId xmlns:a16="http://schemas.microsoft.com/office/drawing/2014/main" xmlns="" val="10001"/>
                   </a:ext>
                 </a:extLst>
               </a:tr>
@@ -4658,7 +4654,7 @@
                 </a:tc>
                 <a:extLst>
                   <a:ext uri="{0D108BD9-81ED-4DB2-BD59-A6C34878D82A}">
-                    <a16:rowId xmlns:a16="http://schemas.microsoft.com/office/drawing/2014/main" val="10002"/>
+                    <a16:rowId xmlns:a16="http://schemas.microsoft.com/office/drawing/2014/main" xmlns="" val="10002"/>
                   </a:ext>
                 </a:extLst>
               </a:tr>
@@ -4734,7 +4730,7 @@
                 </a:tc>
                 <a:extLst>
                   <a:ext uri="{0D108BD9-81ED-4DB2-BD59-A6C34878D82A}">
-                    <a16:rowId xmlns:a16="http://schemas.microsoft.com/office/drawing/2014/main" val="10003"/>
+                    <a16:rowId xmlns:a16="http://schemas.microsoft.com/office/drawing/2014/main" xmlns="" val="10003"/>
                   </a:ext>
                 </a:extLst>
               </a:tr>
@@ -4810,7 +4806,7 @@
                 </a:tc>
                 <a:extLst>
                   <a:ext uri="{0D108BD9-81ED-4DB2-BD59-A6C34878D82A}">
-                    <a16:rowId xmlns:a16="http://schemas.microsoft.com/office/drawing/2014/main" val="10004"/>
+                    <a16:rowId xmlns:a16="http://schemas.microsoft.com/office/drawing/2014/main" xmlns="" val="10004"/>
                   </a:ext>
                 </a:extLst>
               </a:tr>
@@ -4886,7 +4882,7 @@
                 </a:tc>
                 <a:extLst>
                   <a:ext uri="{0D108BD9-81ED-4DB2-BD59-A6C34878D82A}">
-                    <a16:rowId xmlns:a16="http://schemas.microsoft.com/office/drawing/2014/main" val="10005"/>
+                    <a16:rowId xmlns:a16="http://schemas.microsoft.com/office/drawing/2014/main" xmlns="" val="10005"/>
                   </a:ext>
                 </a:extLst>
               </a:tr>
@@ -4962,7 +4958,7 @@
                 </a:tc>
                 <a:extLst>
                   <a:ext uri="{0D108BD9-81ED-4DB2-BD59-A6C34878D82A}">
-                    <a16:rowId xmlns:a16="http://schemas.microsoft.com/office/drawing/2014/main" val="10006"/>
+                    <a16:rowId xmlns:a16="http://schemas.microsoft.com/office/drawing/2014/main" xmlns="" val="10006"/>
                   </a:ext>
                 </a:extLst>
               </a:tr>
@@ -5038,7 +5034,7 @@
                 </a:tc>
                 <a:extLst>
                   <a:ext uri="{0D108BD9-81ED-4DB2-BD59-A6C34878D82A}">
-                    <a16:rowId xmlns:a16="http://schemas.microsoft.com/office/drawing/2014/main" val="10007"/>
+                    <a16:rowId xmlns:a16="http://schemas.microsoft.com/office/drawing/2014/main" xmlns="" val="10007"/>
                   </a:ext>
                 </a:extLst>
               </a:tr>
@@ -5118,7 +5114,7 @@
                 </a:tc>
                 <a:extLst>
                   <a:ext uri="{0D108BD9-81ED-4DB2-BD59-A6C34878D82A}">
-                    <a16:rowId xmlns:a16="http://schemas.microsoft.com/office/drawing/2014/main" val="10008"/>
+                    <a16:rowId xmlns:a16="http://schemas.microsoft.com/office/drawing/2014/main" xmlns="" val="10008"/>
                   </a:ext>
                 </a:extLst>
               </a:tr>
@@ -5194,7 +5190,7 @@
                 </a:tc>
                 <a:extLst>
                   <a:ext uri="{0D108BD9-81ED-4DB2-BD59-A6C34878D82A}">
-                    <a16:rowId xmlns:a16="http://schemas.microsoft.com/office/drawing/2014/main" val="10009"/>
+                    <a16:rowId xmlns:a16="http://schemas.microsoft.com/office/drawing/2014/main" xmlns="" val="10009"/>
                   </a:ext>
                 </a:extLst>
               </a:tr>
@@ -5271,14 +5267,14 @@
           <p:nvPr>
             <p:extLst>
               <p:ext uri="{D42A27DB-BD31-4B8C-83A1-F6EECF244321}">
-                <p14:modId xmlns:p14="http://schemas.microsoft.com/office/powerpoint/2010/main" val="3023779514"/>
+                <p14:modId xmlns:p14="http://schemas.microsoft.com/office/powerpoint/2010/main" val="2629455907"/>
               </p:ext>
             </p:extLst>
           </p:nvPr>
         </p:nvGraphicFramePr>
         <p:xfrm>
           <a:off x="683568" y="836712"/>
-          <a:ext cx="7712073" cy="6045745"/>
+          <a:ext cx="7712073" cy="5847505"/>
         </p:xfrm>
         <a:graphic>
           <a:graphicData uri="http://schemas.openxmlformats.org/drawingml/2006/table">
@@ -5288,56 +5284,56 @@
                 <a:gridCol w="934680">
                   <a:extLst>
                     <a:ext uri="{9D8B030D-6E8A-4147-A177-3AD203B41FA5}">
-                      <a16:colId xmlns:a16="http://schemas.microsoft.com/office/drawing/2014/main" val="306847010"/>
+                      <a16:colId xmlns:a16="http://schemas.microsoft.com/office/drawing/2014/main" xmlns="" val="306847010"/>
                     </a:ext>
                   </a:extLst>
                 </a:gridCol>
                 <a:gridCol w="934680">
                   <a:extLst>
                     <a:ext uri="{9D8B030D-6E8A-4147-A177-3AD203B41FA5}">
-                      <a16:colId xmlns:a16="http://schemas.microsoft.com/office/drawing/2014/main" val="2366364053"/>
+                      <a16:colId xmlns:a16="http://schemas.microsoft.com/office/drawing/2014/main" xmlns="" val="2366364053"/>
                     </a:ext>
                   </a:extLst>
                 </a:gridCol>
                 <a:gridCol w="679767">
                   <a:extLst>
                     <a:ext uri="{9D8B030D-6E8A-4147-A177-3AD203B41FA5}">
-                      <a16:colId xmlns:a16="http://schemas.microsoft.com/office/drawing/2014/main" val="3755844721"/>
+                      <a16:colId xmlns:a16="http://schemas.microsoft.com/office/drawing/2014/main" xmlns="" val="3755844721"/>
                     </a:ext>
                   </a:extLst>
                 </a:gridCol>
                 <a:gridCol w="1189593">
                   <a:extLst>
                     <a:ext uri="{9D8B030D-6E8A-4147-A177-3AD203B41FA5}">
-                      <a16:colId xmlns:a16="http://schemas.microsoft.com/office/drawing/2014/main" val="564739949"/>
+                      <a16:colId xmlns:a16="http://schemas.microsoft.com/office/drawing/2014/main" xmlns="" val="564739949"/>
                     </a:ext>
                   </a:extLst>
                 </a:gridCol>
                 <a:gridCol w="1189593">
                   <a:extLst>
                     <a:ext uri="{9D8B030D-6E8A-4147-A177-3AD203B41FA5}">
-                      <a16:colId xmlns:a16="http://schemas.microsoft.com/office/drawing/2014/main" val="1235457501"/>
+                      <a16:colId xmlns:a16="http://schemas.microsoft.com/office/drawing/2014/main" xmlns="" val="1235457501"/>
                     </a:ext>
                   </a:extLst>
                 </a:gridCol>
                 <a:gridCol w="679767">
                   <a:extLst>
                     <a:ext uri="{9D8B030D-6E8A-4147-A177-3AD203B41FA5}">
-                      <a16:colId xmlns:a16="http://schemas.microsoft.com/office/drawing/2014/main" val="921992363"/>
+                      <a16:colId xmlns:a16="http://schemas.microsoft.com/office/drawing/2014/main" xmlns="" val="921992363"/>
                     </a:ext>
                   </a:extLst>
                 </a:gridCol>
                 <a:gridCol w="1189593">
                   <a:extLst>
                     <a:ext uri="{9D8B030D-6E8A-4147-A177-3AD203B41FA5}">
-                      <a16:colId xmlns:a16="http://schemas.microsoft.com/office/drawing/2014/main" val="1616714432"/>
+                      <a16:colId xmlns:a16="http://schemas.microsoft.com/office/drawing/2014/main" xmlns="" val="1616714432"/>
                     </a:ext>
                   </a:extLst>
                 </a:gridCol>
                 <a:gridCol w="914400">
                   <a:extLst>
                     <a:ext uri="{9D8B030D-6E8A-4147-A177-3AD203B41FA5}">
-                      <a16:colId xmlns:a16="http://schemas.microsoft.com/office/drawing/2014/main" val="673316080"/>
+                      <a16:colId xmlns:a16="http://schemas.microsoft.com/office/drawing/2014/main" xmlns="" val="673316080"/>
                     </a:ext>
                   </a:extLst>
                 </a:gridCol>
@@ -5440,15 +5436,15 @@
                           <a:effectLst/>
                           <a:latin typeface="Arial" panose="020B0604020202020204" pitchFamily="34" charset="0"/>
                           <a:ea typeface="Gulim" panose="020B0600000101010101" pitchFamily="34" charset="-127"/>
-                          <a:cs typeface="Times New Roman" panose="02020603050405020304" pitchFamily="18" charset="0"/>
+                          <a:cs typeface="Arial" panose="020B0604020202020204" pitchFamily="34" charset="0"/>
                         </a:rPr>
                         <a:t>SNP</a:t>
                       </a:r>
                       <a:endParaRPr lang="en-US" sz="1200" dirty="0">
                         <a:effectLst/>
-                        <a:latin typeface="Calibri" panose="020F0502020204030204" pitchFamily="34" charset="0"/>
+                        <a:latin typeface="Arial" panose="020B0604020202020204" pitchFamily="34" charset="0"/>
                         <a:ea typeface="Malgun Gothic" panose="020B0503020000020004" pitchFamily="34" charset="-127"/>
-                        <a:cs typeface="Times New Roman" panose="02020603050405020304" pitchFamily="18" charset="0"/>
+                        <a:cs typeface="Arial" panose="020B0604020202020204" pitchFamily="34" charset="0"/>
                       </a:endParaRPr>
                     </a:p>
                   </a:txBody>
@@ -5585,15 +5581,15 @@
                           <a:effectLst/>
                           <a:latin typeface="Arial" panose="020B0604020202020204" pitchFamily="34" charset="0"/>
                           <a:ea typeface="Gulim" panose="020B0600000101010101" pitchFamily="34" charset="-127"/>
-                          <a:cs typeface="Times New Roman" panose="02020603050405020304" pitchFamily="18" charset="0"/>
+                          <a:cs typeface="Arial" panose="020B0604020202020204" pitchFamily="34" charset="0"/>
                         </a:rPr>
                         <a:t>Case</a:t>
                       </a:r>
                       <a:endParaRPr lang="en-US" sz="1200">
                         <a:effectLst/>
-                        <a:latin typeface="Calibri" panose="020F0502020204030204" pitchFamily="34" charset="0"/>
+                        <a:latin typeface="Arial" panose="020B0604020202020204" pitchFamily="34" charset="0"/>
                         <a:ea typeface="Malgun Gothic" panose="020B0503020000020004" pitchFamily="34" charset="-127"/>
-                        <a:cs typeface="Times New Roman" panose="02020603050405020304" pitchFamily="18" charset="0"/>
+                        <a:cs typeface="Arial" panose="020B0604020202020204" pitchFamily="34" charset="0"/>
                       </a:endParaRPr>
                     </a:p>
                   </a:txBody>
@@ -5750,15 +5746,15 @@
                           <a:effectLst/>
                           <a:latin typeface="Arial" panose="020B0604020202020204" pitchFamily="34" charset="0"/>
                           <a:ea typeface="Gulim" panose="020B0600000101010101" pitchFamily="34" charset="-127"/>
-                          <a:cs typeface="Times New Roman" panose="02020603050405020304" pitchFamily="18" charset="0"/>
+                          <a:cs typeface="Arial" panose="020B0604020202020204" pitchFamily="34" charset="0"/>
                         </a:rPr>
                         <a:t>Control</a:t>
                       </a:r>
                       <a:endParaRPr lang="en-US" sz="1200" dirty="0">
                         <a:effectLst/>
-                        <a:latin typeface="Calibri" panose="020F0502020204030204" pitchFamily="34" charset="0"/>
+                        <a:latin typeface="Arial" panose="020B0604020202020204" pitchFamily="34" charset="0"/>
                         <a:ea typeface="Malgun Gothic" panose="020B0503020000020004" pitchFamily="34" charset="-127"/>
-                        <a:cs typeface="Times New Roman" panose="02020603050405020304" pitchFamily="18" charset="0"/>
+                        <a:cs typeface="Arial" panose="020B0604020202020204" pitchFamily="34" charset="0"/>
                       </a:endParaRPr>
                     </a:p>
                   </a:txBody>
@@ -5915,15 +5911,15 @@
                           <a:effectLst/>
                           <a:latin typeface="Arial" panose="020B0604020202020204" pitchFamily="34" charset="0"/>
                           <a:ea typeface="Gulim" panose="020B0600000101010101" pitchFamily="34" charset="-127"/>
-                          <a:cs typeface="Times New Roman" panose="02020603050405020304" pitchFamily="18" charset="0"/>
+                          <a:cs typeface="Arial" panose="020B0604020202020204" pitchFamily="34" charset="0"/>
                         </a:rPr>
                         <a:t>P-value </a:t>
                       </a:r>
                       <a:endParaRPr lang="en-US" sz="1200">
                         <a:effectLst/>
-                        <a:latin typeface="Calibri" panose="020F0502020204030204" pitchFamily="34" charset="0"/>
+                        <a:latin typeface="Arial" panose="020B0604020202020204" pitchFamily="34" charset="0"/>
                         <a:ea typeface="Malgun Gothic" panose="020B0503020000020004" pitchFamily="34" charset="-127"/>
-                        <a:cs typeface="Times New Roman" panose="02020603050405020304" pitchFamily="18" charset="0"/>
+                        <a:cs typeface="Arial" panose="020B0604020202020204" pitchFamily="34" charset="0"/>
                       </a:endParaRPr>
                     </a:p>
                     <a:p>
@@ -5946,15 +5942,15 @@
                           <a:effectLst/>
                           <a:latin typeface="Arial" panose="020B0604020202020204" pitchFamily="34" charset="0"/>
                           <a:ea typeface="Gulim" panose="020B0600000101010101" pitchFamily="34" charset="-127"/>
-                          <a:cs typeface="Times New Roman" panose="02020603050405020304" pitchFamily="18" charset="0"/>
+                          <a:cs typeface="Arial" panose="020B0604020202020204" pitchFamily="34" charset="0"/>
                         </a:rPr>
                         <a:t>(CA Test)</a:t>
                       </a:r>
                       <a:endParaRPr lang="en-US" sz="1200">
                         <a:effectLst/>
-                        <a:latin typeface="Calibri" panose="020F0502020204030204" pitchFamily="34" charset="0"/>
+                        <a:latin typeface="Arial" panose="020B0604020202020204" pitchFamily="34" charset="0"/>
                         <a:ea typeface="Malgun Gothic" panose="020B0503020000020004" pitchFamily="34" charset="-127"/>
-                        <a:cs typeface="Times New Roman" panose="02020603050405020304" pitchFamily="18" charset="0"/>
+                        <a:cs typeface="Arial" panose="020B0604020202020204" pitchFamily="34" charset="0"/>
                       </a:endParaRPr>
                     </a:p>
                   </a:txBody>
@@ -5996,7 +5992,7 @@
                 </a:tc>
                 <a:extLst>
                   <a:ext uri="{0D108BD9-81ED-4DB2-BD59-A6C34878D82A}">
-                    <a16:rowId xmlns:a16="http://schemas.microsoft.com/office/drawing/2014/main" val="337799944"/>
+                    <a16:rowId xmlns:a16="http://schemas.microsoft.com/office/drawing/2014/main" xmlns="" val="337799944"/>
                   </a:ext>
                 </a:extLst>
               </a:tr>
@@ -6108,15 +6104,15 @@
                           <a:effectLst/>
                           <a:latin typeface="Arial" panose="020B0604020202020204" pitchFamily="34" charset="0"/>
                           <a:ea typeface="Gulim" panose="020B0600000101010101" pitchFamily="34" charset="-127"/>
-                          <a:cs typeface="Times New Roman" panose="02020603050405020304" pitchFamily="18" charset="0"/>
+                          <a:cs typeface="Arial" panose="020B0604020202020204" pitchFamily="34" charset="0"/>
                         </a:rPr>
                         <a:t>Data</a:t>
                       </a:r>
                       <a:endParaRPr lang="en-US" sz="1200" dirty="0">
                         <a:effectLst/>
-                        <a:latin typeface="Calibri" panose="020F0502020204030204" pitchFamily="34" charset="0"/>
+                        <a:latin typeface="Arial" panose="020B0604020202020204" pitchFamily="34" charset="0"/>
                         <a:ea typeface="Malgun Gothic" panose="020B0503020000020004" pitchFamily="34" charset="-127"/>
-                        <a:cs typeface="Times New Roman" panose="02020603050405020304" pitchFamily="18" charset="0"/>
+                        <a:cs typeface="Arial" panose="020B0604020202020204" pitchFamily="34" charset="0"/>
                       </a:endParaRPr>
                     </a:p>
                   </a:txBody>
@@ -6253,15 +6249,15 @@
                           <a:effectLst/>
                           <a:latin typeface="Arial" panose="020B0604020202020204" pitchFamily="34" charset="0"/>
                           <a:ea typeface="Gulim" panose="020B0600000101010101" pitchFamily="34" charset="-127"/>
-                          <a:cs typeface="Times New Roman" panose="02020603050405020304" pitchFamily="18" charset="0"/>
+                          <a:cs typeface="Arial" panose="020B0604020202020204" pitchFamily="34" charset="0"/>
                         </a:rPr>
                         <a:t>N</a:t>
                       </a:r>
                       <a:endParaRPr lang="en-US" sz="1200" dirty="0">
                         <a:effectLst/>
-                        <a:latin typeface="Calibri" panose="020F0502020204030204" pitchFamily="34" charset="0"/>
+                        <a:latin typeface="Arial" panose="020B0604020202020204" pitchFamily="34" charset="0"/>
                         <a:ea typeface="Malgun Gothic" panose="020B0503020000020004" pitchFamily="34" charset="-127"/>
-                        <a:cs typeface="Times New Roman" panose="02020603050405020304" pitchFamily="18" charset="0"/>
+                        <a:cs typeface="Arial" panose="020B0604020202020204" pitchFamily="34" charset="0"/>
                       </a:endParaRPr>
                     </a:p>
                   </a:txBody>
@@ -6398,7 +6394,7 @@
                           <a:effectLst/>
                           <a:latin typeface="Arial" panose="020B0604020202020204" pitchFamily="34" charset="0"/>
                           <a:ea typeface="Gulim" panose="020B0600000101010101" pitchFamily="34" charset="-127"/>
-                          <a:cs typeface="Times New Roman" panose="02020603050405020304" pitchFamily="18" charset="0"/>
+                          <a:cs typeface="Arial" panose="020B0604020202020204" pitchFamily="34" charset="0"/>
                         </a:rPr>
                         <a:t>MAF</a:t>
                       </a:r>
@@ -6410,7 +6406,7 @@
                           <a:effectLst/>
                           <a:latin typeface="Arial" panose="020B0604020202020204" pitchFamily="34" charset="0"/>
                           <a:ea typeface="Gulim" panose="020B0600000101010101" pitchFamily="34" charset="-127"/>
-                          <a:cs typeface="Times New Roman" panose="02020603050405020304" pitchFamily="18" charset="0"/>
+                          <a:cs typeface="Arial" panose="020B0604020202020204" pitchFamily="34" charset="0"/>
                         </a:rPr>
                       </a:br>
                       <a:r>
@@ -6421,15 +6417,15 @@
                           <a:effectLst/>
                           <a:latin typeface="Arial" panose="020B0604020202020204" pitchFamily="34" charset="0"/>
                           <a:ea typeface="Gulim" panose="020B0600000101010101" pitchFamily="34" charset="-127"/>
-                          <a:cs typeface="Times New Roman" panose="02020603050405020304" pitchFamily="18" charset="0"/>
+                          <a:cs typeface="Arial" panose="020B0604020202020204" pitchFamily="34" charset="0"/>
                         </a:rPr>
                         <a:t>(95% CI)</a:t>
                       </a:r>
                       <a:endParaRPr lang="en-US" sz="1200" dirty="0">
                         <a:effectLst/>
-                        <a:latin typeface="Calibri" panose="020F0502020204030204" pitchFamily="34" charset="0"/>
+                        <a:latin typeface="Arial" panose="020B0604020202020204" pitchFamily="34" charset="0"/>
                         <a:ea typeface="Malgun Gothic" panose="020B0503020000020004" pitchFamily="34" charset="-127"/>
-                        <a:cs typeface="Times New Roman" panose="02020603050405020304" pitchFamily="18" charset="0"/>
+                        <a:cs typeface="Arial" panose="020B0604020202020204" pitchFamily="34" charset="0"/>
                       </a:endParaRPr>
                     </a:p>
                   </a:txBody>
@@ -6566,15 +6562,15 @@
                           <a:effectLst/>
                           <a:latin typeface="Arial" panose="020B0604020202020204" pitchFamily="34" charset="0"/>
                           <a:ea typeface="Gulim" panose="020B0600000101010101" pitchFamily="34" charset="-127"/>
-                          <a:cs typeface="Times New Roman" panose="02020603050405020304" pitchFamily="18" charset="0"/>
+                          <a:cs typeface="Arial" panose="020B0604020202020204" pitchFamily="34" charset="0"/>
                         </a:rPr>
                         <a:t>Data</a:t>
                       </a:r>
                       <a:endParaRPr lang="en-US" sz="1200" dirty="0">
                         <a:effectLst/>
-                        <a:latin typeface="Calibri" panose="020F0502020204030204" pitchFamily="34" charset="0"/>
+                        <a:latin typeface="Arial" panose="020B0604020202020204" pitchFamily="34" charset="0"/>
                         <a:ea typeface="Malgun Gothic" panose="020B0503020000020004" pitchFamily="34" charset="-127"/>
-                        <a:cs typeface="Times New Roman" panose="02020603050405020304" pitchFamily="18" charset="0"/>
+                        <a:cs typeface="Arial" panose="020B0604020202020204" pitchFamily="34" charset="0"/>
                       </a:endParaRPr>
                     </a:p>
                   </a:txBody>
@@ -6711,15 +6707,15 @@
                           <a:effectLst/>
                           <a:latin typeface="Arial" panose="020B0604020202020204" pitchFamily="34" charset="0"/>
                           <a:ea typeface="Gulim" panose="020B0600000101010101" pitchFamily="34" charset="-127"/>
-                          <a:cs typeface="Times New Roman" panose="02020603050405020304" pitchFamily="18" charset="0"/>
+                          <a:cs typeface="Arial" panose="020B0604020202020204" pitchFamily="34" charset="0"/>
                         </a:rPr>
                         <a:t>N</a:t>
                       </a:r>
                       <a:endParaRPr lang="en-US" sz="1200" dirty="0">
                         <a:effectLst/>
-                        <a:latin typeface="Calibri" panose="020F0502020204030204" pitchFamily="34" charset="0"/>
+                        <a:latin typeface="Arial" panose="020B0604020202020204" pitchFamily="34" charset="0"/>
                         <a:ea typeface="Malgun Gothic" panose="020B0503020000020004" pitchFamily="34" charset="-127"/>
-                        <a:cs typeface="Times New Roman" panose="02020603050405020304" pitchFamily="18" charset="0"/>
+                        <a:cs typeface="Arial" panose="020B0604020202020204" pitchFamily="34" charset="0"/>
                       </a:endParaRPr>
                     </a:p>
                   </a:txBody>
@@ -6856,15 +6852,15 @@
                           <a:effectLst/>
                           <a:latin typeface="Arial" panose="020B0604020202020204" pitchFamily="34" charset="0"/>
                           <a:ea typeface="Gulim" panose="020B0600000101010101" pitchFamily="34" charset="-127"/>
-                          <a:cs typeface="Times New Roman" panose="02020603050405020304" pitchFamily="18" charset="0"/>
+                          <a:cs typeface="Arial" panose="020B0604020202020204" pitchFamily="34" charset="0"/>
                         </a:rPr>
                         <a:t>MAF</a:t>
                       </a:r>
                       <a:endParaRPr lang="en-US" sz="1200" dirty="0">
                         <a:effectLst/>
-                        <a:latin typeface="Calibri" panose="020F0502020204030204" pitchFamily="34" charset="0"/>
+                        <a:latin typeface="Arial" panose="020B0604020202020204" pitchFamily="34" charset="0"/>
                         <a:ea typeface="Malgun Gothic" panose="020B0503020000020004" pitchFamily="34" charset="-127"/>
-                        <a:cs typeface="Times New Roman" panose="02020603050405020304" pitchFamily="18" charset="0"/>
+                        <a:cs typeface="Arial" panose="020B0604020202020204" pitchFamily="34" charset="0"/>
                       </a:endParaRPr>
                     </a:p>
                     <a:p>
@@ -6887,15 +6883,15 @@
                           <a:effectLst/>
                           <a:latin typeface="Arial" panose="020B0604020202020204" pitchFamily="34" charset="0"/>
                           <a:ea typeface="Gulim" panose="020B0600000101010101" pitchFamily="34" charset="-127"/>
-                          <a:cs typeface="Times New Roman" panose="02020603050405020304" pitchFamily="18" charset="0"/>
+                          <a:cs typeface="Arial" panose="020B0604020202020204" pitchFamily="34" charset="0"/>
                         </a:rPr>
                         <a:t>(95% CI)</a:t>
                       </a:r>
                       <a:endParaRPr lang="en-US" sz="1200" dirty="0">
                         <a:effectLst/>
-                        <a:latin typeface="Calibri" panose="020F0502020204030204" pitchFamily="34" charset="0"/>
+                        <a:latin typeface="Arial" panose="020B0604020202020204" pitchFamily="34" charset="0"/>
                         <a:ea typeface="Malgun Gothic" panose="020B0503020000020004" pitchFamily="34" charset="-127"/>
-                        <a:cs typeface="Times New Roman" panose="02020603050405020304" pitchFamily="18" charset="0"/>
+                        <a:cs typeface="Arial" panose="020B0604020202020204" pitchFamily="34" charset="0"/>
                       </a:endParaRPr>
                     </a:p>
                   </a:txBody>
@@ -6947,7 +6943,7 @@
                 </a:tc>
                 <a:extLst>
                   <a:ext uri="{0D108BD9-81ED-4DB2-BD59-A6C34878D82A}">
-                    <a16:rowId xmlns:a16="http://schemas.microsoft.com/office/drawing/2014/main" val="552318667"/>
+                    <a16:rowId xmlns:a16="http://schemas.microsoft.com/office/drawing/2014/main" xmlns="" val="552318667"/>
                   </a:ext>
                 </a:extLst>
               </a:tr>
@@ -7049,15 +7045,15 @@
                           <a:effectLst/>
                           <a:latin typeface="Arial" panose="020B0604020202020204" pitchFamily="34" charset="0"/>
                           <a:ea typeface="Gulim" panose="020B0600000101010101" pitchFamily="34" charset="-127"/>
-                          <a:cs typeface="Times New Roman" panose="02020603050405020304" pitchFamily="18" charset="0"/>
+                          <a:cs typeface="Arial" panose="020B0604020202020204" pitchFamily="34" charset="0"/>
                         </a:rPr>
                         <a:t>rs4544201</a:t>
                       </a:r>
                       <a:endParaRPr lang="en-US" sz="1200" dirty="0">
                         <a:effectLst/>
-                        <a:latin typeface="Calibri" panose="020F0502020204030204" pitchFamily="34" charset="0"/>
+                        <a:latin typeface="Arial" panose="020B0604020202020204" pitchFamily="34" charset="0"/>
                         <a:ea typeface="Malgun Gothic" panose="020B0503020000020004" pitchFamily="34" charset="-127"/>
-                        <a:cs typeface="Times New Roman" panose="02020603050405020304" pitchFamily="18" charset="0"/>
+                        <a:cs typeface="Arial" panose="020B0604020202020204" pitchFamily="34" charset="0"/>
                       </a:endParaRPr>
                     </a:p>
                   </a:txBody>
@@ -7194,7 +7190,7 @@
                           <a:effectLst/>
                           <a:latin typeface="Arial" panose="020B0604020202020204" pitchFamily="34" charset="0"/>
                           <a:ea typeface="Gulim" panose="020B0600000101010101" pitchFamily="34" charset="-127"/>
-                          <a:cs typeface="Times New Roman" panose="02020603050405020304" pitchFamily="18" charset="0"/>
+                          <a:cs typeface="Arial" panose="020B0604020202020204" pitchFamily="34" charset="0"/>
                         </a:rPr>
                         <a:t>LAM </a:t>
                       </a:r>
@@ -7206,7 +7202,7 @@
                           <a:effectLst/>
                           <a:latin typeface="Arial" panose="020B0604020202020204" pitchFamily="34" charset="0"/>
                           <a:ea typeface="Gulim" panose="020B0600000101010101" pitchFamily="34" charset="-127"/>
-                          <a:cs typeface="Times New Roman" panose="02020603050405020304" pitchFamily="18" charset="0"/>
+                          <a:cs typeface="Arial" panose="020B0604020202020204" pitchFamily="34" charset="0"/>
                         </a:rPr>
                         <a:t/>
                       </a:r>
@@ -7218,7 +7214,7 @@
                           <a:effectLst/>
                           <a:latin typeface="Arial" panose="020B0604020202020204" pitchFamily="34" charset="0"/>
                           <a:ea typeface="Gulim" panose="020B0600000101010101" pitchFamily="34" charset="-127"/>
-                          <a:cs typeface="Times New Roman" panose="02020603050405020304" pitchFamily="18" charset="0"/>
+                          <a:cs typeface="Arial" panose="020B0604020202020204" pitchFamily="34" charset="0"/>
                         </a:rPr>
                       </a:br>
                       <a:r>
@@ -7229,15 +7225,15 @@
                           <a:effectLst/>
                           <a:latin typeface="Arial" panose="020B0604020202020204" pitchFamily="34" charset="0"/>
                           <a:ea typeface="Gulim" panose="020B0600000101010101" pitchFamily="34" charset="-127"/>
-                          <a:cs typeface="Times New Roman" panose="02020603050405020304" pitchFamily="18" charset="0"/>
+                          <a:cs typeface="Arial" panose="020B0604020202020204" pitchFamily="34" charset="0"/>
                         </a:rPr>
                         <a:t>Replication</a:t>
                       </a:r>
                       <a:endParaRPr lang="en-US" sz="1200" dirty="0">
                         <a:effectLst/>
-                        <a:latin typeface="Calibri" panose="020F0502020204030204" pitchFamily="34" charset="0"/>
+                        <a:latin typeface="Arial" panose="020B0604020202020204" pitchFamily="34" charset="0"/>
                         <a:ea typeface="Malgun Gothic" panose="020B0503020000020004" pitchFamily="34" charset="-127"/>
-                        <a:cs typeface="Times New Roman" panose="02020603050405020304" pitchFamily="18" charset="0"/>
+                        <a:cs typeface="Arial" panose="020B0604020202020204" pitchFamily="34" charset="0"/>
                       </a:endParaRPr>
                     </a:p>
                   </a:txBody>
@@ -7374,15 +7370,15 @@
                           <a:effectLst/>
                           <a:latin typeface="Arial" panose="020B0604020202020204" pitchFamily="34" charset="0"/>
                           <a:ea typeface="Gulim" panose="020B0600000101010101" pitchFamily="34" charset="-127"/>
-                          <a:cs typeface="Times New Roman" panose="02020603050405020304" pitchFamily="18" charset="0"/>
+                          <a:cs typeface="Arial" panose="020B0604020202020204" pitchFamily="34" charset="0"/>
                         </a:rPr>
                         <a:t>186</a:t>
                       </a:r>
                       <a:endParaRPr lang="en-US" sz="1200" dirty="0">
                         <a:effectLst/>
-                        <a:latin typeface="Calibri" panose="020F0502020204030204" pitchFamily="34" charset="0"/>
+                        <a:latin typeface="Arial" panose="020B0604020202020204" pitchFamily="34" charset="0"/>
                         <a:ea typeface="Malgun Gothic" panose="020B0503020000020004" pitchFamily="34" charset="-127"/>
-                        <a:cs typeface="Times New Roman" panose="02020603050405020304" pitchFamily="18" charset="0"/>
+                        <a:cs typeface="Arial" panose="020B0604020202020204" pitchFamily="34" charset="0"/>
                       </a:endParaRPr>
                     </a:p>
                   </a:txBody>
@@ -7519,15 +7515,15 @@
                           <a:effectLst/>
                           <a:latin typeface="Arial" panose="020B0604020202020204" pitchFamily="34" charset="0"/>
                           <a:ea typeface="Gulim" panose="020B0600000101010101" pitchFamily="34" charset="-127"/>
-                          <a:cs typeface="Times New Roman" panose="02020603050405020304" pitchFamily="18" charset="0"/>
+                          <a:cs typeface="Arial" panose="020B0604020202020204" pitchFamily="34" charset="0"/>
                         </a:rPr>
                         <a:t>0.1429</a:t>
                       </a:r>
                       <a:endParaRPr lang="en-US" sz="1200" dirty="0">
                         <a:effectLst/>
-                        <a:latin typeface="Calibri" panose="020F0502020204030204" pitchFamily="34" charset="0"/>
+                        <a:latin typeface="Arial" panose="020B0604020202020204" pitchFamily="34" charset="0"/>
                         <a:ea typeface="Malgun Gothic" panose="020B0503020000020004" pitchFamily="34" charset="-127"/>
-                        <a:cs typeface="Times New Roman" panose="02020603050405020304" pitchFamily="18" charset="0"/>
+                        <a:cs typeface="Arial" panose="020B0604020202020204" pitchFamily="34" charset="0"/>
                       </a:endParaRPr>
                     </a:p>
                     <a:p>
@@ -7550,15 +7546,15 @@
                           <a:effectLst/>
                           <a:latin typeface="Arial" panose="020B0604020202020204" pitchFamily="34" charset="0"/>
                           <a:ea typeface="Gulim" panose="020B0600000101010101" pitchFamily="34" charset="-127"/>
-                          <a:cs typeface="Times New Roman" panose="02020603050405020304" pitchFamily="18" charset="0"/>
+                          <a:cs typeface="Arial" panose="020B0604020202020204" pitchFamily="34" charset="0"/>
                         </a:rPr>
                         <a:t>(0.107 – 0.178)</a:t>
                       </a:r>
                       <a:endParaRPr lang="en-US" sz="1200" dirty="0">
                         <a:effectLst/>
-                        <a:latin typeface="Calibri" panose="020F0502020204030204" pitchFamily="34" charset="0"/>
+                        <a:latin typeface="Arial" panose="020B0604020202020204" pitchFamily="34" charset="0"/>
                         <a:ea typeface="Malgun Gothic" panose="020B0503020000020004" pitchFamily="34" charset="-127"/>
-                        <a:cs typeface="Times New Roman" panose="02020603050405020304" pitchFamily="18" charset="0"/>
+                        <a:cs typeface="Arial" panose="020B0604020202020204" pitchFamily="34" charset="0"/>
                       </a:endParaRPr>
                     </a:p>
                   </a:txBody>
@@ -7695,15 +7691,15 @@
                           <a:effectLst/>
                           <a:latin typeface="Arial" panose="020B0604020202020204" pitchFamily="34" charset="0"/>
                           <a:ea typeface="Gulim" panose="020B0600000101010101" pitchFamily="34" charset="-127"/>
-                          <a:cs typeface="Times New Roman" panose="02020603050405020304" pitchFamily="18" charset="0"/>
+                          <a:cs typeface="Arial" panose="020B0604020202020204" pitchFamily="34" charset="0"/>
                         </a:rPr>
                         <a:t>COPDGene</a:t>
                       </a:r>
                       <a:endParaRPr lang="en-US" sz="1200" dirty="0" smtClean="0">
                         <a:effectLst/>
-                        <a:latin typeface="Calibri" panose="020F0502020204030204" pitchFamily="34" charset="0"/>
+                        <a:latin typeface="Arial" panose="020B0604020202020204" pitchFamily="34" charset="0"/>
                         <a:ea typeface="Malgun Gothic" panose="020B0503020000020004" pitchFamily="34" charset="-127"/>
-                        <a:cs typeface="Times New Roman" panose="02020603050405020304" pitchFamily="18" charset="0"/>
+                        <a:cs typeface="Arial" panose="020B0604020202020204" pitchFamily="34" charset="0"/>
                       </a:endParaRPr>
                     </a:p>
                     <a:p>
@@ -7726,15 +7722,15 @@
                           <a:effectLst/>
                           <a:latin typeface="Arial" panose="020B0604020202020204" pitchFamily="34" charset="0"/>
                           <a:ea typeface="Gulim" panose="020B0600000101010101" pitchFamily="34" charset="-127"/>
-                          <a:cs typeface="Times New Roman" panose="02020603050405020304" pitchFamily="18" charset="0"/>
+                          <a:cs typeface="Arial" panose="020B0604020202020204" pitchFamily="34" charset="0"/>
                         </a:rPr>
                         <a:t>(NHW Male)</a:t>
                       </a:r>
                       <a:endParaRPr lang="en-US" sz="1200" dirty="0">
                         <a:effectLst/>
-                        <a:latin typeface="Calibri" panose="020F0502020204030204" pitchFamily="34" charset="0"/>
+                        <a:latin typeface="Arial" panose="020B0604020202020204" pitchFamily="34" charset="0"/>
                         <a:ea typeface="Malgun Gothic" panose="020B0503020000020004" pitchFamily="34" charset="-127"/>
-                        <a:cs typeface="Times New Roman" panose="02020603050405020304" pitchFamily="18" charset="0"/>
+                        <a:cs typeface="Arial" panose="020B0604020202020204" pitchFamily="34" charset="0"/>
                       </a:endParaRPr>
                     </a:p>
                   </a:txBody>
@@ -7865,15 +7861,15 @@
                           <a:effectLst/>
                           <a:latin typeface="Arial" panose="020B0604020202020204" pitchFamily="34" charset="0"/>
                           <a:ea typeface="Gulim" panose="020B0600000101010101" pitchFamily="34" charset="-127"/>
-                          <a:cs typeface="Times New Roman" panose="02020603050405020304" pitchFamily="18" charset="0"/>
+                          <a:cs typeface="Arial" panose="020B0604020202020204" pitchFamily="34" charset="0"/>
                         </a:rPr>
                         <a:t>1,224</a:t>
                       </a:r>
                       <a:endParaRPr lang="en-US" sz="1200">
                         <a:effectLst/>
-                        <a:latin typeface="Calibri" panose="020F0502020204030204" pitchFamily="34" charset="0"/>
+                        <a:latin typeface="Arial" panose="020B0604020202020204" pitchFamily="34" charset="0"/>
                         <a:ea typeface="Malgun Gothic" panose="020B0503020000020004" pitchFamily="34" charset="-127"/>
-                        <a:cs typeface="Times New Roman" panose="02020603050405020304" pitchFamily="18" charset="0"/>
+                        <a:cs typeface="Arial" panose="020B0604020202020204" pitchFamily="34" charset="0"/>
                       </a:endParaRPr>
                     </a:p>
                   </a:txBody>
@@ -8231,7 +8227,7 @@
                 </a:tc>
                 <a:extLst>
                   <a:ext uri="{0D108BD9-81ED-4DB2-BD59-A6C34878D82A}">
-                    <a16:rowId xmlns:a16="http://schemas.microsoft.com/office/drawing/2014/main" val="3154322294"/>
+                    <a16:rowId xmlns:a16="http://schemas.microsoft.com/office/drawing/2014/main" xmlns="" val="3154322294"/>
                   </a:ext>
                 </a:extLst>
               </a:tr>
@@ -8373,15 +8369,15 @@
                           <a:effectLst/>
                           <a:latin typeface="Arial" panose="020B0604020202020204" pitchFamily="34" charset="0"/>
                           <a:ea typeface="Gulim" panose="020B0600000101010101" pitchFamily="34" charset="-127"/>
-                          <a:cs typeface="Times New Roman" panose="02020603050405020304" pitchFamily="18" charset="0"/>
+                          <a:cs typeface="Arial" panose="020B0604020202020204" pitchFamily="34" charset="0"/>
                         </a:rPr>
                         <a:t>MESA</a:t>
                       </a:r>
                       <a:endParaRPr lang="en-US" sz="1200" dirty="0" smtClean="0">
                         <a:effectLst/>
-                        <a:latin typeface="Calibri" panose="020F0502020204030204" pitchFamily="34" charset="0"/>
+                        <a:latin typeface="Arial" panose="020B0604020202020204" pitchFamily="34" charset="0"/>
                         <a:ea typeface="Malgun Gothic" panose="020B0503020000020004" pitchFamily="34" charset="-127"/>
-                        <a:cs typeface="Times New Roman" panose="02020603050405020304" pitchFamily="18" charset="0"/>
+                        <a:cs typeface="Arial" panose="020B0604020202020204" pitchFamily="34" charset="0"/>
                       </a:endParaRPr>
                     </a:p>
                     <a:p>
@@ -8404,15 +8400,15 @@
                           <a:effectLst/>
                           <a:latin typeface="Arial" panose="020B0604020202020204" pitchFamily="34" charset="0"/>
                           <a:ea typeface="Gulim" panose="020B0600000101010101" pitchFamily="34" charset="-127"/>
-                          <a:cs typeface="Times New Roman" panose="02020603050405020304" pitchFamily="18" charset="0"/>
+                          <a:cs typeface="Arial" panose="020B0604020202020204" pitchFamily="34" charset="0"/>
                         </a:rPr>
                         <a:t>(EUR Female)</a:t>
                       </a:r>
                       <a:endParaRPr lang="en-US" sz="1200" dirty="0">
                         <a:effectLst/>
-                        <a:latin typeface="Calibri" panose="020F0502020204030204" pitchFamily="34" charset="0"/>
+                        <a:latin typeface="Arial" panose="020B0604020202020204" pitchFamily="34" charset="0"/>
                         <a:ea typeface="Malgun Gothic" panose="020B0503020000020004" pitchFamily="34" charset="-127"/>
-                        <a:cs typeface="Times New Roman" panose="02020603050405020304" pitchFamily="18" charset="0"/>
+                        <a:cs typeface="Arial" panose="020B0604020202020204" pitchFamily="34" charset="0"/>
                       </a:endParaRPr>
                     </a:p>
                   </a:txBody>
@@ -8530,22 +8526,22 @@
                         </a:spcAft>
                       </a:pPr>
                       <a:r>
-                        <a:rPr lang="en-US" sz="1200" kern="1200">
+                        <a:rPr lang="en-US" sz="1200" kern="1200" dirty="0">
                           <a:solidFill>
                             <a:srgbClr val="000000"/>
                           </a:solidFill>
                           <a:effectLst/>
                           <a:latin typeface="Arial" panose="020B0604020202020204" pitchFamily="34" charset="0"/>
                           <a:ea typeface="Gulim" panose="020B0600000101010101" pitchFamily="34" charset="-127"/>
-                          <a:cs typeface="Times New Roman" panose="02020603050405020304" pitchFamily="18" charset="0"/>
+                          <a:cs typeface="Arial" panose="020B0604020202020204" pitchFamily="34" charset="0"/>
                         </a:rPr>
                         <a:t>1,153</a:t>
                       </a:r>
-                      <a:endParaRPr lang="en-US" sz="1200">
+                      <a:endParaRPr lang="en-US" sz="1200" dirty="0">
                         <a:effectLst/>
-                        <a:latin typeface="Calibri" panose="020F0502020204030204" pitchFamily="34" charset="0"/>
+                        <a:latin typeface="Arial" panose="020B0604020202020204" pitchFamily="34" charset="0"/>
                         <a:ea typeface="Malgun Gothic" panose="020B0503020000020004" pitchFamily="34" charset="-127"/>
-                        <a:cs typeface="Times New Roman" panose="02020603050405020304" pitchFamily="18" charset="0"/>
+                        <a:cs typeface="Arial" panose="020B0604020202020204" pitchFamily="34" charset="0"/>
                       </a:endParaRPr>
                     </a:p>
                   </a:txBody>
@@ -8670,15 +8666,15 @@
                           <a:effectLst/>
                           <a:latin typeface="Arial" panose="020B0604020202020204" pitchFamily="34" charset="0"/>
                           <a:ea typeface="Gulim" panose="020B0600000101010101" pitchFamily="34" charset="-127"/>
-                          <a:cs typeface="Times New Roman" panose="02020603050405020304" pitchFamily="18" charset="0"/>
+                          <a:cs typeface="Arial" panose="020B0604020202020204" pitchFamily="34" charset="0"/>
                         </a:rPr>
                         <a:t>0.2563</a:t>
                       </a:r>
                       <a:endParaRPr lang="en-US" sz="1200">
                         <a:effectLst/>
-                        <a:latin typeface="Calibri" panose="020F0502020204030204" pitchFamily="34" charset="0"/>
+                        <a:latin typeface="Arial" panose="020B0604020202020204" pitchFamily="34" charset="0"/>
                         <a:ea typeface="Malgun Gothic" panose="020B0503020000020004" pitchFamily="34" charset="-127"/>
-                        <a:cs typeface="Times New Roman" panose="02020603050405020304" pitchFamily="18" charset="0"/>
+                        <a:cs typeface="Arial" panose="020B0604020202020204" pitchFamily="34" charset="0"/>
                       </a:endParaRPr>
                     </a:p>
                     <a:p>
@@ -8701,15 +8697,15 @@
                           <a:effectLst/>
                           <a:latin typeface="Arial" panose="020B0604020202020204" pitchFamily="34" charset="0"/>
                           <a:ea typeface="Gulim" panose="020B0600000101010101" pitchFamily="34" charset="-127"/>
-                          <a:cs typeface="Times New Roman" panose="02020603050405020304" pitchFamily="18" charset="0"/>
+                          <a:cs typeface="Arial" panose="020B0604020202020204" pitchFamily="34" charset="0"/>
                         </a:rPr>
                         <a:t>(0.238 – 0.274)</a:t>
                       </a:r>
                       <a:endParaRPr lang="en-US" sz="1200">
                         <a:effectLst/>
-                        <a:latin typeface="Calibri" panose="020F0502020204030204" pitchFamily="34" charset="0"/>
+                        <a:latin typeface="Arial" panose="020B0604020202020204" pitchFamily="34" charset="0"/>
                         <a:ea typeface="Malgun Gothic" panose="020B0503020000020004" pitchFamily="34" charset="-127"/>
-                        <a:cs typeface="Times New Roman" panose="02020603050405020304" pitchFamily="18" charset="0"/>
+                        <a:cs typeface="Arial" panose="020B0604020202020204" pitchFamily="34" charset="0"/>
                       </a:endParaRPr>
                     </a:p>
                   </a:txBody>
@@ -8885,7 +8881,7 @@
                 </a:tc>
                 <a:extLst>
                   <a:ext uri="{0D108BD9-81ED-4DB2-BD59-A6C34878D82A}">
-                    <a16:rowId xmlns:a16="http://schemas.microsoft.com/office/drawing/2014/main" val="3824680710"/>
+                    <a16:rowId xmlns:a16="http://schemas.microsoft.com/office/drawing/2014/main" xmlns="" val="3824680710"/>
                   </a:ext>
                 </a:extLst>
               </a:tr>
@@ -9027,7 +9023,7 @@
                           <a:effectLst/>
                           <a:latin typeface="Arial" panose="020B0604020202020204" pitchFamily="34" charset="0"/>
                           <a:ea typeface="Gulim" panose="020B0600000101010101" pitchFamily="34" charset="-127"/>
-                          <a:cs typeface="Times New Roman" panose="02020603050405020304" pitchFamily="18" charset="0"/>
+                          <a:cs typeface="Arial" panose="020B0604020202020204" pitchFamily="34" charset="0"/>
                         </a:rPr>
                         <a:t>1000GP</a:t>
                       </a:r>
@@ -9039,7 +9035,7 @@
                           <a:effectLst/>
                           <a:latin typeface="Arial" panose="020B0604020202020204" pitchFamily="34" charset="0"/>
                           <a:ea typeface="Gulim" panose="020B0600000101010101" pitchFamily="34" charset="-127"/>
-                          <a:cs typeface="Times New Roman" panose="02020603050405020304" pitchFamily="18" charset="0"/>
+                          <a:cs typeface="Arial" panose="020B0604020202020204" pitchFamily="34" charset="0"/>
                         </a:rPr>
                       </a:br>
                       <a:r>
@@ -9050,7 +9046,7 @@
                           <a:effectLst/>
                           <a:latin typeface="Arial" panose="020B0604020202020204" pitchFamily="34" charset="0"/>
                           <a:ea typeface="Gulim" panose="020B0600000101010101" pitchFamily="34" charset="-127"/>
-                          <a:cs typeface="Times New Roman" panose="02020603050405020304" pitchFamily="18" charset="0"/>
+                          <a:cs typeface="Arial" panose="020B0604020202020204" pitchFamily="34" charset="0"/>
                         </a:rPr>
                         <a:t>(</a:t>
                       </a:r>
@@ -9062,15 +9058,15 @@
                           <a:effectLst/>
                           <a:latin typeface="Arial" panose="020B0604020202020204" pitchFamily="34" charset="0"/>
                           <a:ea typeface="Gulim" panose="020B0600000101010101" pitchFamily="34" charset="-127"/>
-                          <a:cs typeface="Times New Roman" panose="02020603050405020304" pitchFamily="18" charset="0"/>
+                          <a:cs typeface="Arial" panose="020B0604020202020204" pitchFamily="34" charset="0"/>
                         </a:rPr>
                         <a:t>EUR Female)</a:t>
                       </a:r>
                       <a:endParaRPr lang="en-US" sz="1200" dirty="0">
                         <a:effectLst/>
-                        <a:latin typeface="Calibri" panose="020F0502020204030204" pitchFamily="34" charset="0"/>
+                        <a:latin typeface="Arial" panose="020B0604020202020204" pitchFamily="34" charset="0"/>
                         <a:ea typeface="Malgun Gothic" panose="020B0503020000020004" pitchFamily="34" charset="-127"/>
-                        <a:cs typeface="Times New Roman" panose="02020603050405020304" pitchFamily="18" charset="0"/>
+                        <a:cs typeface="Arial" panose="020B0604020202020204" pitchFamily="34" charset="0"/>
                       </a:endParaRPr>
                     </a:p>
                   </a:txBody>
@@ -9195,15 +9191,15 @@
                           <a:effectLst/>
                           <a:latin typeface="Arial" panose="020B0604020202020204" pitchFamily="34" charset="0"/>
                           <a:ea typeface="Gulim" panose="020B0600000101010101" pitchFamily="34" charset="-127"/>
-                          <a:cs typeface="Times New Roman" panose="02020603050405020304" pitchFamily="18" charset="0"/>
+                          <a:cs typeface="Arial" panose="020B0604020202020204" pitchFamily="34" charset="0"/>
                         </a:rPr>
                         <a:t>263</a:t>
                       </a:r>
                       <a:endParaRPr lang="en-US" sz="1200" dirty="0">
                         <a:effectLst/>
-                        <a:latin typeface="Calibri" panose="020F0502020204030204" pitchFamily="34" charset="0"/>
+                        <a:latin typeface="Arial" panose="020B0604020202020204" pitchFamily="34" charset="0"/>
                         <a:ea typeface="Malgun Gothic" panose="020B0503020000020004" pitchFamily="34" charset="-127"/>
-                        <a:cs typeface="Times New Roman" panose="02020603050405020304" pitchFamily="18" charset="0"/>
+                        <a:cs typeface="Arial" panose="020B0604020202020204" pitchFamily="34" charset="0"/>
                       </a:endParaRPr>
                     </a:p>
                   </a:txBody>
@@ -9328,15 +9324,15 @@
                           <a:effectLst/>
                           <a:latin typeface="Arial" panose="020B0604020202020204" pitchFamily="34" charset="0"/>
                           <a:ea typeface="Gulim" panose="020B0600000101010101" pitchFamily="34" charset="-127"/>
-                          <a:cs typeface="Times New Roman" panose="02020603050405020304" pitchFamily="18" charset="0"/>
+                          <a:cs typeface="Arial" panose="020B0604020202020204" pitchFamily="34" charset="0"/>
                         </a:rPr>
                         <a:t>0.2357</a:t>
                       </a:r>
                       <a:endParaRPr lang="en-US" sz="1200">
                         <a:effectLst/>
-                        <a:latin typeface="Calibri" panose="020F0502020204030204" pitchFamily="34" charset="0"/>
+                        <a:latin typeface="Arial" panose="020B0604020202020204" pitchFamily="34" charset="0"/>
                         <a:ea typeface="Malgun Gothic" panose="020B0503020000020004" pitchFamily="34" charset="-127"/>
-                        <a:cs typeface="Times New Roman" panose="02020603050405020304" pitchFamily="18" charset="0"/>
+                        <a:cs typeface="Arial" panose="020B0604020202020204" pitchFamily="34" charset="0"/>
                       </a:endParaRPr>
                     </a:p>
                     <a:p>
@@ -9359,15 +9355,15 @@
                           <a:effectLst/>
                           <a:latin typeface="Arial" panose="020B0604020202020204" pitchFamily="34" charset="0"/>
                           <a:ea typeface="Gulim" panose="020B0600000101010101" pitchFamily="34" charset="-127"/>
-                          <a:cs typeface="Times New Roman" panose="02020603050405020304" pitchFamily="18" charset="0"/>
+                          <a:cs typeface="Arial" panose="020B0604020202020204" pitchFamily="34" charset="0"/>
                         </a:rPr>
                         <a:t>(0.215 – 0.257)</a:t>
                       </a:r>
                       <a:endParaRPr lang="en-US" sz="1200">
                         <a:effectLst/>
-                        <a:latin typeface="Calibri" panose="020F0502020204030204" pitchFamily="34" charset="0"/>
+                        <a:latin typeface="Arial" panose="020B0604020202020204" pitchFamily="34" charset="0"/>
                         <a:ea typeface="Malgun Gothic" panose="020B0503020000020004" pitchFamily="34" charset="-127"/>
-                        <a:cs typeface="Times New Roman" panose="02020603050405020304" pitchFamily="18" charset="0"/>
+                        <a:cs typeface="Arial" panose="020B0604020202020204" pitchFamily="34" charset="0"/>
                       </a:endParaRPr>
                     </a:p>
                   </a:txBody>
@@ -9543,7 +9539,7 @@
                 </a:tc>
                 <a:extLst>
                   <a:ext uri="{0D108BD9-81ED-4DB2-BD59-A6C34878D82A}">
-                    <a16:rowId xmlns:a16="http://schemas.microsoft.com/office/drawing/2014/main" val="2949066572"/>
+                    <a16:rowId xmlns:a16="http://schemas.microsoft.com/office/drawing/2014/main" xmlns="" val="2949066572"/>
                   </a:ext>
                 </a:extLst>
               </a:tr>
@@ -9685,15 +9681,15 @@
                           <a:effectLst/>
                           <a:latin typeface="Arial" panose="020B0604020202020204" pitchFamily="34" charset="0"/>
                           <a:ea typeface="Gulim" panose="020B0600000101010101" pitchFamily="34" charset="-127"/>
-                          <a:cs typeface="Times New Roman" panose="02020603050405020304" pitchFamily="18" charset="0"/>
+                          <a:cs typeface="Arial" panose="020B0604020202020204" pitchFamily="34" charset="0"/>
                         </a:rPr>
                         <a:t>ECLIPSE</a:t>
                       </a:r>
                       <a:endParaRPr lang="en-US" sz="1200" dirty="0" smtClean="0">
                         <a:effectLst/>
-                        <a:latin typeface="Calibri" panose="020F0502020204030204" pitchFamily="34" charset="0"/>
+                        <a:latin typeface="Arial" panose="020B0604020202020204" pitchFamily="34" charset="0"/>
                         <a:ea typeface="Malgun Gothic" panose="020B0503020000020004" pitchFamily="34" charset="-127"/>
-                        <a:cs typeface="Times New Roman" panose="02020603050405020304" pitchFamily="18" charset="0"/>
+                        <a:cs typeface="Arial" panose="020B0604020202020204" pitchFamily="34" charset="0"/>
                       </a:endParaRPr>
                     </a:p>
                     <a:p>
@@ -9716,15 +9712,15 @@
                           <a:effectLst/>
                           <a:latin typeface="Arial" panose="020B0604020202020204" pitchFamily="34" charset="0"/>
                           <a:ea typeface="Gulim" panose="020B0600000101010101" pitchFamily="34" charset="-127"/>
-                          <a:cs typeface="Times New Roman" panose="02020603050405020304" pitchFamily="18" charset="0"/>
+                          <a:cs typeface="Arial" panose="020B0604020202020204" pitchFamily="34" charset="0"/>
                         </a:rPr>
                         <a:t>(EUR Female)</a:t>
                       </a:r>
                       <a:endParaRPr lang="en-US" sz="1200" dirty="0">
                         <a:effectLst/>
-                        <a:latin typeface="Calibri" panose="020F0502020204030204" pitchFamily="34" charset="0"/>
+                        <a:latin typeface="Arial" panose="020B0604020202020204" pitchFamily="34" charset="0"/>
                         <a:ea typeface="Malgun Gothic" panose="020B0503020000020004" pitchFamily="34" charset="-127"/>
-                        <a:cs typeface="Times New Roman" panose="02020603050405020304" pitchFamily="18" charset="0"/>
+                        <a:cs typeface="Arial" panose="020B0604020202020204" pitchFamily="34" charset="0"/>
                       </a:endParaRPr>
                     </a:p>
                   </a:txBody>
@@ -9849,15 +9845,15 @@
                           <a:effectLst/>
                           <a:latin typeface="Arial" panose="020B0604020202020204" pitchFamily="34" charset="0"/>
                           <a:ea typeface="Gulim" panose="020B0600000101010101" pitchFamily="34" charset="-127"/>
-                          <a:cs typeface="Times New Roman" panose="02020603050405020304" pitchFamily="18" charset="0"/>
+                          <a:cs typeface="Arial" panose="020B0604020202020204" pitchFamily="34" charset="0"/>
                         </a:rPr>
                         <a:t>792</a:t>
                       </a:r>
                       <a:endParaRPr lang="en-US" sz="1200" dirty="0">
                         <a:effectLst/>
-                        <a:latin typeface="Calibri" panose="020F0502020204030204" pitchFamily="34" charset="0"/>
+                        <a:latin typeface="Arial" panose="020B0604020202020204" pitchFamily="34" charset="0"/>
                         <a:ea typeface="Malgun Gothic" panose="020B0503020000020004" pitchFamily="34" charset="-127"/>
-                        <a:cs typeface="Times New Roman" panose="02020603050405020304" pitchFamily="18" charset="0"/>
+                        <a:cs typeface="Arial" panose="020B0604020202020204" pitchFamily="34" charset="0"/>
                       </a:endParaRPr>
                     </a:p>
                   </a:txBody>
@@ -9982,15 +9978,15 @@
                           <a:effectLst/>
                           <a:latin typeface="Arial" panose="020B0604020202020204" pitchFamily="34" charset="0"/>
                           <a:ea typeface="Gulim" panose="020B0600000101010101" pitchFamily="34" charset="-127"/>
-                          <a:cs typeface="Times New Roman" panose="02020603050405020304" pitchFamily="18" charset="0"/>
+                          <a:cs typeface="Arial" panose="020B0604020202020204" pitchFamily="34" charset="0"/>
                         </a:rPr>
                         <a:t>0.2563</a:t>
                       </a:r>
                       <a:endParaRPr lang="en-US" sz="1200" dirty="0">
                         <a:effectLst/>
-                        <a:latin typeface="Calibri" panose="020F0502020204030204" pitchFamily="34" charset="0"/>
+                        <a:latin typeface="Arial" panose="020B0604020202020204" pitchFamily="34" charset="0"/>
                         <a:ea typeface="Malgun Gothic" panose="020B0503020000020004" pitchFamily="34" charset="-127"/>
-                        <a:cs typeface="Times New Roman" panose="02020603050405020304" pitchFamily="18" charset="0"/>
+                        <a:cs typeface="Arial" panose="020B0604020202020204" pitchFamily="34" charset="0"/>
                       </a:endParaRPr>
                     </a:p>
                     <a:p>
@@ -10013,15 +10009,15 @@
                           <a:effectLst/>
                           <a:latin typeface="Arial" panose="020B0604020202020204" pitchFamily="34" charset="0"/>
                           <a:ea typeface="Gulim" panose="020B0600000101010101" pitchFamily="34" charset="-127"/>
-                          <a:cs typeface="Times New Roman" panose="02020603050405020304" pitchFamily="18" charset="0"/>
+                          <a:cs typeface="Arial" panose="020B0604020202020204" pitchFamily="34" charset="0"/>
                         </a:rPr>
                         <a:t>(0.235 – 0.278)</a:t>
                       </a:r>
                       <a:endParaRPr lang="en-US" sz="1200" dirty="0">
                         <a:effectLst/>
-                        <a:latin typeface="Calibri" panose="020F0502020204030204" pitchFamily="34" charset="0"/>
+                        <a:latin typeface="Arial" panose="020B0604020202020204" pitchFamily="34" charset="0"/>
                         <a:ea typeface="Malgun Gothic" panose="020B0503020000020004" pitchFamily="34" charset="-127"/>
-                        <a:cs typeface="Times New Roman" panose="02020603050405020304" pitchFamily="18" charset="0"/>
+                        <a:cs typeface="Arial" panose="020B0604020202020204" pitchFamily="34" charset="0"/>
                       </a:endParaRPr>
                     </a:p>
                   </a:txBody>
@@ -10197,7 +10193,7 @@
                 </a:tc>
                 <a:extLst>
                   <a:ext uri="{0D108BD9-81ED-4DB2-BD59-A6C34878D82A}">
-                    <a16:rowId xmlns:a16="http://schemas.microsoft.com/office/drawing/2014/main" val="762562684"/>
+                    <a16:rowId xmlns:a16="http://schemas.microsoft.com/office/drawing/2014/main" xmlns="" val="762562684"/>
                   </a:ext>
                 </a:extLst>
               </a:tr>
@@ -10339,15 +10335,15 @@
                           <a:effectLst/>
                           <a:latin typeface="Arial" panose="020B0604020202020204" pitchFamily="34" charset="0"/>
                           <a:ea typeface="Gulim" panose="020B0600000101010101" pitchFamily="34" charset="-127"/>
-                          <a:cs typeface="Times New Roman" panose="02020603050405020304" pitchFamily="18" charset="0"/>
+                          <a:cs typeface="Arial" panose="020B0604020202020204" pitchFamily="34" charset="0"/>
                         </a:rPr>
                         <a:t>UKBiobank</a:t>
                       </a:r>
                       <a:endParaRPr lang="en-US" sz="1200" dirty="0" smtClean="0">
                         <a:effectLst/>
-                        <a:latin typeface="Calibri" panose="020F0502020204030204" pitchFamily="34" charset="0"/>
+                        <a:latin typeface="Arial" panose="020B0604020202020204" pitchFamily="34" charset="0"/>
                         <a:ea typeface="Malgun Gothic" panose="020B0503020000020004" pitchFamily="34" charset="-127"/>
-                        <a:cs typeface="Times New Roman" panose="02020603050405020304" pitchFamily="18" charset="0"/>
+                        <a:cs typeface="Arial" panose="020B0604020202020204" pitchFamily="34" charset="0"/>
                       </a:endParaRPr>
                     </a:p>
                     <a:p>
@@ -10370,15 +10366,15 @@
                           <a:effectLst/>
                           <a:latin typeface="Arial" panose="020B0604020202020204" pitchFamily="34" charset="0"/>
                           <a:ea typeface="Gulim" panose="020B0600000101010101" pitchFamily="34" charset="-127"/>
-                          <a:cs typeface="Times New Roman" panose="02020603050405020304" pitchFamily="18" charset="0"/>
+                          <a:cs typeface="Arial" panose="020B0604020202020204" pitchFamily="34" charset="0"/>
                         </a:rPr>
                         <a:t>(EUR)</a:t>
                       </a:r>
                       <a:endParaRPr lang="en-US" sz="1200" dirty="0">
                         <a:effectLst/>
-                        <a:latin typeface="Calibri" panose="020F0502020204030204" pitchFamily="34" charset="0"/>
+                        <a:latin typeface="Arial" panose="020B0604020202020204" pitchFamily="34" charset="0"/>
                         <a:ea typeface="Malgun Gothic" panose="020B0503020000020004" pitchFamily="34" charset="-127"/>
-                        <a:cs typeface="Times New Roman" panose="02020603050405020304" pitchFamily="18" charset="0"/>
+                        <a:cs typeface="Arial" panose="020B0604020202020204" pitchFamily="34" charset="0"/>
                       </a:endParaRPr>
                     </a:p>
                   </a:txBody>
@@ -10489,10 +10485,18 @@
                           <a:spcPct val="107000"/>
                         </a:lnSpc>
                       </a:pPr>
-                      <a:endParaRPr lang="en-US" sz="1200">
+                      <a:r>
+                        <a:rPr lang="en-US" sz="1200" dirty="0" smtClean="0">
+                          <a:effectLst/>
+                          <a:latin typeface="Arial" panose="020B0604020202020204" pitchFamily="34" charset="0"/>
+                          <a:cs typeface="Arial" panose="020B0604020202020204" pitchFamily="34" charset="0"/>
+                        </a:rPr>
+                        <a:t>337,199</a:t>
+                      </a:r>
+                      <a:endParaRPr lang="en-US" sz="1200" dirty="0">
                         <a:effectLst/>
-                        <a:latin typeface="Calibri" panose="020F0502020204030204" pitchFamily="34" charset="0"/>
-                        <a:cs typeface="Times New Roman" panose="02020603050405020304" pitchFamily="18" charset="0"/>
+                        <a:latin typeface="Arial" panose="020B0604020202020204" pitchFamily="34" charset="0"/>
+                        <a:cs typeface="Arial" panose="020B0604020202020204" pitchFamily="34" charset="0"/>
                       </a:endParaRPr>
                     </a:p>
                   </a:txBody>
@@ -10598,15 +10602,58 @@
                       </a:lvl9pPr>
                     </a:lstStyle>
                     <a:p>
-                      <a:pPr>
+                      <a:pPr algn="ctr">
                         <a:lnSpc>
                           <a:spcPct val="107000"/>
                         </a:lnSpc>
                       </a:pPr>
+                      <a:r>
+                        <a:rPr lang="en-US" sz="1200" dirty="0" smtClean="0">
+                          <a:effectLst/>
+                          <a:latin typeface="Arial" panose="020B0604020202020204" pitchFamily="34" charset="0"/>
+                          <a:cs typeface="Arial" panose="020B0604020202020204" pitchFamily="34" charset="0"/>
+                        </a:rPr>
+                        <a:t>0.2605</a:t>
+                      </a:r>
+                    </a:p>
+                    <a:p>
+                      <a:pPr algn="ctr">
+                        <a:lnSpc>
+                          <a:spcPct val="107000"/>
+                        </a:lnSpc>
+                      </a:pPr>
+                      <a:r>
+                        <a:rPr lang="en-US" sz="1200" dirty="0" smtClean="0">
+                          <a:effectLst/>
+                          <a:latin typeface="Arial" panose="020B0604020202020204" pitchFamily="34" charset="0"/>
+                          <a:cs typeface="Arial" panose="020B0604020202020204" pitchFamily="34" charset="0"/>
+                        </a:rPr>
+                        <a:t>(0.259 </a:t>
+                      </a:r>
+                      <a:r>
+                        <a:rPr lang="en-US" altLang="ko-KR" sz="1200" kern="1200" dirty="0" smtClean="0">
+                          <a:solidFill>
+                            <a:srgbClr val="000000"/>
+                          </a:solidFill>
+                          <a:effectLst/>
+                          <a:latin typeface="Arial" panose="020B0604020202020204" pitchFamily="34" charset="0"/>
+                          <a:ea typeface="Gulim" panose="020B0600000101010101" pitchFamily="34" charset="-127"/>
+                          <a:cs typeface="Arial" panose="020B0604020202020204" pitchFamily="34" charset="0"/>
+                        </a:rPr>
+                        <a:t>–</a:t>
+                      </a:r>
+                      <a:r>
+                        <a:rPr lang="en-US" sz="1200" dirty="0" smtClean="0">
+                          <a:effectLst/>
+                          <a:latin typeface="Arial" panose="020B0604020202020204" pitchFamily="34" charset="0"/>
+                          <a:cs typeface="Arial" panose="020B0604020202020204" pitchFamily="34" charset="0"/>
+                        </a:rPr>
+                        <a:t> 0.262)</a:t>
+                      </a:r>
                       <a:endParaRPr lang="en-US" sz="1200" dirty="0">
                         <a:effectLst/>
-                        <a:latin typeface="Calibri" panose="020F0502020204030204" pitchFamily="34" charset="0"/>
-                        <a:cs typeface="Times New Roman" panose="02020603050405020304" pitchFamily="18" charset="0"/>
+                        <a:latin typeface="Arial" panose="020B0604020202020204" pitchFamily="34" charset="0"/>
+                        <a:cs typeface="Arial" panose="020B0604020202020204" pitchFamily="34" charset="0"/>
                       </a:endParaRPr>
                     </a:p>
                   </a:txBody>
@@ -10712,12 +10759,60 @@
                       </a:lvl9pPr>
                     </a:lstStyle>
                     <a:p>
-                      <a:pPr algn="ctr">
+                      <a:pPr marL="0" marR="0" indent="0" algn="ctr" defTabSz="914400" rtl="0" eaLnBrk="1" fontAlgn="auto" latinLnBrk="1" hangingPunct="1">
                         <a:lnSpc>
                           <a:spcPct val="107000"/>
                         </a:lnSpc>
+                        <a:spcBef>
+                          <a:spcPts val="0"/>
+                        </a:spcBef>
+                        <a:spcAft>
+                          <a:spcPts val="0"/>
+                        </a:spcAft>
+                        <a:buClrTx/>
+                        <a:buSzTx/>
+                        <a:buFontTx/>
+                        <a:buNone/>
+                        <a:tabLst/>
+                        <a:defRPr/>
                       </a:pPr>
-                      <a:endParaRPr lang="en-US" sz="1200" dirty="0">
+                      <a:r>
+                        <a:rPr lang="en-US" altLang="ko-KR" sz="1200" b="0" i="0" u="none" strike="noStrike" dirty="0" smtClean="0">
+                          <a:solidFill>
+                            <a:schemeClr val="tx1"/>
+                          </a:solidFill>
+                          <a:effectLst/>
+                          <a:latin typeface="Arial" panose="020B0604020202020204" pitchFamily="34" charset="0"/>
+                          <a:ea typeface="+mn-ea"/>
+                          <a:cs typeface="Arial" panose="020B0604020202020204" pitchFamily="34" charset="0"/>
+                        </a:rPr>
+                        <a:t>9.28</a:t>
+                      </a:r>
+                      <a:r>
+                        <a:rPr lang="en-US" altLang="ko-KR" sz="1200" b="0" i="0" u="none" strike="noStrike" dirty="0" smtClean="0">
+                          <a:solidFill>
+                            <a:srgbClr val="000000"/>
+                          </a:solidFill>
+                          <a:effectLst/>
+                          <a:latin typeface="Arial" panose="020B0604020202020204" pitchFamily="34" charset="0"/>
+                          <a:ea typeface="맑은 고딕" panose="020B0503020000020004" pitchFamily="50" charset="-127"/>
+                          <a:cs typeface="Arial" panose="020B0604020202020204" pitchFamily="34" charset="0"/>
+                        </a:rPr>
+                        <a:t>×10</a:t>
+                      </a:r>
+                      <a:r>
+                        <a:rPr lang="en-US" altLang="ko-KR" sz="1200" b="0" i="0" u="none" strike="noStrike" baseline="30000" dirty="0" smtClean="0">
+                          <a:solidFill>
+                            <a:srgbClr val="000000"/>
+                          </a:solidFill>
+                          <a:effectLst/>
+                          <a:latin typeface="Arial" panose="020B0604020202020204" pitchFamily="34" charset="0"/>
+                          <a:ea typeface="맑은 고딕" panose="020B0503020000020004" pitchFamily="50" charset="-127"/>
+                          <a:cs typeface="Arial" panose="020B0604020202020204" pitchFamily="34" charset="0"/>
+                        </a:rPr>
+                        <a:t>-11</a:t>
+                      </a:r>
+                      <a:endParaRPr lang="en-US" altLang="ko-KR" sz="1200" dirty="0" smtClean="0">
                         <a:effectLst/>
                         <a:latin typeface="Arial" panose="020B0604020202020204" pitchFamily="34" charset="0"/>
                         <a:cs typeface="Arial" panose="020B0604020202020204" pitchFamily="34" charset="0"/>
@@ -10750,7 +10845,7 @@
                 </a:tc>
                 <a:extLst>
                   <a:ext uri="{0D108BD9-81ED-4DB2-BD59-A6C34878D82A}">
-                    <a16:rowId xmlns:a16="http://schemas.microsoft.com/office/drawing/2014/main" val="2336757687"/>
+                    <a16:rowId xmlns:a16="http://schemas.microsoft.com/office/drawing/2014/main" xmlns="" val="2336757687"/>
                   </a:ext>
                 </a:extLst>
               </a:tr>
@@ -10892,15 +10987,15 @@
                           <a:effectLst/>
                           <a:latin typeface="Arial" panose="020B0604020202020204" pitchFamily="34" charset="0"/>
                           <a:ea typeface="Gulim" panose="020B0600000101010101" pitchFamily="34" charset="-127"/>
-                          <a:cs typeface="Times New Roman" panose="02020603050405020304" pitchFamily="18" charset="0"/>
+                          <a:cs typeface="Arial" panose="020B0604020202020204" pitchFamily="34" charset="0"/>
                         </a:rPr>
                         <a:t>GnomAD</a:t>
                       </a:r>
                       <a:endParaRPr lang="en-US" sz="1200" dirty="0" smtClean="0">
                         <a:effectLst/>
-                        <a:latin typeface="Calibri" panose="020F0502020204030204" pitchFamily="34" charset="0"/>
+                        <a:latin typeface="Arial" panose="020B0604020202020204" pitchFamily="34" charset="0"/>
                         <a:ea typeface="Malgun Gothic" panose="020B0503020000020004" pitchFamily="34" charset="-127"/>
-                        <a:cs typeface="Times New Roman" panose="02020603050405020304" pitchFamily="18" charset="0"/>
+                        <a:cs typeface="Arial" panose="020B0604020202020204" pitchFamily="34" charset="0"/>
                       </a:endParaRPr>
                     </a:p>
                     <a:p>
@@ -10923,15 +11018,15 @@
                           <a:effectLst/>
                           <a:latin typeface="Arial" panose="020B0604020202020204" pitchFamily="34" charset="0"/>
                           <a:ea typeface="Gulim" panose="020B0600000101010101" pitchFamily="34" charset="-127"/>
-                          <a:cs typeface="Times New Roman" panose="02020603050405020304" pitchFamily="18" charset="0"/>
+                          <a:cs typeface="Arial" panose="020B0604020202020204" pitchFamily="34" charset="0"/>
                         </a:rPr>
                         <a:t>(EUR)</a:t>
                       </a:r>
                       <a:endParaRPr lang="en-US" sz="1200" dirty="0">
                         <a:effectLst/>
-                        <a:latin typeface="Calibri" panose="020F0502020204030204" pitchFamily="34" charset="0"/>
+                        <a:latin typeface="Arial" panose="020B0604020202020204" pitchFamily="34" charset="0"/>
                         <a:ea typeface="Malgun Gothic" panose="020B0503020000020004" pitchFamily="34" charset="-127"/>
-                        <a:cs typeface="Times New Roman" panose="02020603050405020304" pitchFamily="18" charset="0"/>
+                        <a:cs typeface="Arial" panose="020B0604020202020204" pitchFamily="34" charset="0"/>
                       </a:endParaRPr>
                     </a:p>
                   </a:txBody>
@@ -11062,15 +11157,15 @@
                           <a:effectLst/>
                           <a:latin typeface="Arial" panose="020B0604020202020204" pitchFamily="34" charset="0"/>
                           <a:ea typeface="Gulim" panose="020B0600000101010101" pitchFamily="34" charset="-127"/>
-                          <a:cs typeface="Times New Roman" panose="02020603050405020304" pitchFamily="18" charset="0"/>
+                          <a:cs typeface="Arial" panose="020B0604020202020204" pitchFamily="34" charset="0"/>
                         </a:rPr>
                         <a:t>1,745</a:t>
                       </a:r>
                       <a:endParaRPr lang="en-US" sz="1200" dirty="0">
                         <a:effectLst/>
-                        <a:latin typeface="Calibri" panose="020F0502020204030204" pitchFamily="34" charset="0"/>
+                        <a:latin typeface="Arial" panose="020B0604020202020204" pitchFamily="34" charset="0"/>
                         <a:ea typeface="Malgun Gothic" panose="020B0503020000020004" pitchFamily="34" charset="-127"/>
-                        <a:cs typeface="Times New Roman" panose="02020603050405020304" pitchFamily="18" charset="0"/>
+                        <a:cs typeface="Arial" panose="020B0604020202020204" pitchFamily="34" charset="0"/>
                       </a:endParaRPr>
                     </a:p>
                   </a:txBody>
@@ -11201,15 +11296,15 @@
                           <a:effectLst/>
                           <a:latin typeface="Arial" panose="020B0604020202020204" pitchFamily="34" charset="0"/>
                           <a:ea typeface="Gulim" panose="020B0600000101010101" pitchFamily="34" charset="-127"/>
-                          <a:cs typeface="Times New Roman" panose="02020603050405020304" pitchFamily="18" charset="0"/>
+                          <a:cs typeface="Arial" panose="020B0604020202020204" pitchFamily="34" charset="0"/>
                         </a:rPr>
                         <a:t>0.3424</a:t>
                       </a:r>
                       <a:endParaRPr lang="en-US" sz="1200" dirty="0">
                         <a:effectLst/>
-                        <a:latin typeface="Calibri" panose="020F0502020204030204" pitchFamily="34" charset="0"/>
+                        <a:latin typeface="Arial" panose="020B0604020202020204" pitchFamily="34" charset="0"/>
                         <a:ea typeface="Malgun Gothic" panose="020B0503020000020004" pitchFamily="34" charset="-127"/>
-                        <a:cs typeface="Times New Roman" panose="02020603050405020304" pitchFamily="18" charset="0"/>
+                        <a:cs typeface="Arial" panose="020B0604020202020204" pitchFamily="34" charset="0"/>
                       </a:endParaRPr>
                     </a:p>
                     <a:p>
@@ -11232,15 +11327,15 @@
                           <a:effectLst/>
                           <a:latin typeface="Arial" panose="020B0604020202020204" pitchFamily="34" charset="0"/>
                           <a:ea typeface="Gulim" panose="020B0600000101010101" pitchFamily="34" charset="-127"/>
-                          <a:cs typeface="Times New Roman" panose="02020603050405020304" pitchFamily="18" charset="0"/>
+                          <a:cs typeface="Arial" panose="020B0604020202020204" pitchFamily="34" charset="0"/>
                         </a:rPr>
                         <a:t>(0.327 – 0.358)</a:t>
                       </a:r>
                       <a:endParaRPr lang="en-US" sz="1200" dirty="0">
                         <a:effectLst/>
-                        <a:latin typeface="Calibri" panose="020F0502020204030204" pitchFamily="34" charset="0"/>
+                        <a:latin typeface="Arial" panose="020B0604020202020204" pitchFamily="34" charset="0"/>
                         <a:ea typeface="Malgun Gothic" panose="020B0503020000020004" pitchFamily="34" charset="-127"/>
-                        <a:cs typeface="Times New Roman" panose="02020603050405020304" pitchFamily="18" charset="0"/>
+                        <a:cs typeface="Arial" panose="020B0604020202020204" pitchFamily="34" charset="0"/>
                       </a:endParaRPr>
                     </a:p>
                   </a:txBody>
@@ -11428,7 +11523,7 @@
                 </a:tc>
                 <a:extLst>
                   <a:ext uri="{0D108BD9-81ED-4DB2-BD59-A6C34878D82A}">
-                    <a16:rowId xmlns:a16="http://schemas.microsoft.com/office/drawing/2014/main" val="739462245"/>
+                    <a16:rowId xmlns:a16="http://schemas.microsoft.com/office/drawing/2014/main" xmlns="" val="739462245"/>
                   </a:ext>
                 </a:extLst>
               </a:tr>
@@ -11530,15 +11625,15 @@
                           <a:effectLst/>
                           <a:latin typeface="Arial" panose="020B0604020202020204" pitchFamily="34" charset="0"/>
                           <a:ea typeface="Gulim" panose="020B0600000101010101" pitchFamily="34" charset="-127"/>
-                          <a:cs typeface="Times New Roman" panose="02020603050405020304" pitchFamily="18" charset="0"/>
+                          <a:cs typeface="Arial" panose="020B0604020202020204" pitchFamily="34" charset="0"/>
                         </a:rPr>
                         <a:t>rs2006950</a:t>
                       </a:r>
                       <a:endParaRPr lang="en-US" sz="1200" dirty="0">
                         <a:effectLst/>
-                        <a:latin typeface="Calibri" panose="020F0502020204030204" pitchFamily="34" charset="0"/>
+                        <a:latin typeface="Arial" panose="020B0604020202020204" pitchFamily="34" charset="0"/>
                         <a:ea typeface="Malgun Gothic" panose="020B0503020000020004" pitchFamily="34" charset="-127"/>
-                        <a:cs typeface="Times New Roman" panose="02020603050405020304" pitchFamily="18" charset="0"/>
+                        <a:cs typeface="Arial" panose="020B0604020202020204" pitchFamily="34" charset="0"/>
                       </a:endParaRPr>
                     </a:p>
                   </a:txBody>
@@ -11675,7 +11770,7 @@
                           <a:effectLst/>
                           <a:latin typeface="Arial" panose="020B0604020202020204" pitchFamily="34" charset="0"/>
                           <a:ea typeface="Gulim" panose="020B0600000101010101" pitchFamily="34" charset="-127"/>
-                          <a:cs typeface="Times New Roman" panose="02020603050405020304" pitchFamily="18" charset="0"/>
+                          <a:cs typeface="Arial" panose="020B0604020202020204" pitchFamily="34" charset="0"/>
                         </a:rPr>
                         <a:t>LAM </a:t>
                       </a:r>
@@ -11687,7 +11782,7 @@
                           <a:effectLst/>
                           <a:latin typeface="Arial" panose="020B0604020202020204" pitchFamily="34" charset="0"/>
                           <a:ea typeface="Gulim" panose="020B0600000101010101" pitchFamily="34" charset="-127"/>
-                          <a:cs typeface="Times New Roman" panose="02020603050405020304" pitchFamily="18" charset="0"/>
+                          <a:cs typeface="Arial" panose="020B0604020202020204" pitchFamily="34" charset="0"/>
                         </a:rPr>
                         <a:t/>
                       </a:r>
@@ -11699,7 +11794,7 @@
                           <a:effectLst/>
                           <a:latin typeface="Arial" panose="020B0604020202020204" pitchFamily="34" charset="0"/>
                           <a:ea typeface="Gulim" panose="020B0600000101010101" pitchFamily="34" charset="-127"/>
-                          <a:cs typeface="Times New Roman" panose="02020603050405020304" pitchFamily="18" charset="0"/>
+                          <a:cs typeface="Arial" panose="020B0604020202020204" pitchFamily="34" charset="0"/>
                         </a:rPr>
                       </a:br>
                       <a:r>
@@ -11710,15 +11805,15 @@
                           <a:effectLst/>
                           <a:latin typeface="Arial" panose="020B0604020202020204" pitchFamily="34" charset="0"/>
                           <a:ea typeface="Gulim" panose="020B0600000101010101" pitchFamily="34" charset="-127"/>
-                          <a:cs typeface="Times New Roman" panose="02020603050405020304" pitchFamily="18" charset="0"/>
+                          <a:cs typeface="Arial" panose="020B0604020202020204" pitchFamily="34" charset="0"/>
                         </a:rPr>
                         <a:t>Replication</a:t>
                       </a:r>
                       <a:endParaRPr lang="en-US" sz="1200" dirty="0">
                         <a:effectLst/>
-                        <a:latin typeface="Calibri" panose="020F0502020204030204" pitchFamily="34" charset="0"/>
+                        <a:latin typeface="Arial" panose="020B0604020202020204" pitchFamily="34" charset="0"/>
                         <a:ea typeface="Malgun Gothic" panose="020B0503020000020004" pitchFamily="34" charset="-127"/>
-                        <a:cs typeface="Times New Roman" panose="02020603050405020304" pitchFamily="18" charset="0"/>
+                        <a:cs typeface="Arial" panose="020B0604020202020204" pitchFamily="34" charset="0"/>
                       </a:endParaRPr>
                     </a:p>
                   </a:txBody>
@@ -11855,15 +11950,15 @@
                           <a:effectLst/>
                           <a:latin typeface="Arial" panose="020B0604020202020204" pitchFamily="34" charset="0"/>
                           <a:ea typeface="Gulim" panose="020B0600000101010101" pitchFamily="34" charset="-127"/>
-                          <a:cs typeface="Times New Roman" panose="02020603050405020304" pitchFamily="18" charset="0"/>
+                          <a:cs typeface="Arial" panose="020B0604020202020204" pitchFamily="34" charset="0"/>
                         </a:rPr>
                         <a:t>186</a:t>
                       </a:r>
                       <a:endParaRPr lang="en-US" sz="1200" dirty="0">
                         <a:effectLst/>
-                        <a:latin typeface="Calibri" panose="020F0502020204030204" pitchFamily="34" charset="0"/>
+                        <a:latin typeface="Arial" panose="020B0604020202020204" pitchFamily="34" charset="0"/>
                         <a:ea typeface="Malgun Gothic" panose="020B0503020000020004" pitchFamily="34" charset="-127"/>
-                        <a:cs typeface="Times New Roman" panose="02020603050405020304" pitchFamily="18" charset="0"/>
+                        <a:cs typeface="Arial" panose="020B0604020202020204" pitchFamily="34" charset="0"/>
                       </a:endParaRPr>
                     </a:p>
                   </a:txBody>
@@ -12000,15 +12095,15 @@
                           <a:effectLst/>
                           <a:latin typeface="Arial" panose="020B0604020202020204" pitchFamily="34" charset="0"/>
                           <a:ea typeface="Gulim" panose="020B0600000101010101" pitchFamily="34" charset="-127"/>
-                          <a:cs typeface="Times New Roman" panose="02020603050405020304" pitchFamily="18" charset="0"/>
+                          <a:cs typeface="Arial" panose="020B0604020202020204" pitchFamily="34" charset="0"/>
                         </a:rPr>
                         <a:t>0.1148</a:t>
                       </a:r>
                       <a:endParaRPr lang="en-US" sz="1200">
                         <a:effectLst/>
-                        <a:latin typeface="Calibri" panose="020F0502020204030204" pitchFamily="34" charset="0"/>
+                        <a:latin typeface="Arial" panose="020B0604020202020204" pitchFamily="34" charset="0"/>
                         <a:ea typeface="Malgun Gothic" panose="020B0503020000020004" pitchFamily="34" charset="-127"/>
-                        <a:cs typeface="Times New Roman" panose="02020603050405020304" pitchFamily="18" charset="0"/>
+                        <a:cs typeface="Arial" panose="020B0604020202020204" pitchFamily="34" charset="0"/>
                       </a:endParaRPr>
                     </a:p>
                     <a:p>
@@ -12024,22 +12119,22 @@
                         </a:spcAft>
                       </a:pPr>
                       <a:r>
-                        <a:rPr lang="en-US" sz="1200" kern="1200">
+                        <a:rPr lang="en-US" sz="1200" kern="1200" dirty="0">
                           <a:solidFill>
                             <a:srgbClr val="000000"/>
                           </a:solidFill>
                           <a:effectLst/>
                           <a:latin typeface="Arial" panose="020B0604020202020204" pitchFamily="34" charset="0"/>
                           <a:ea typeface="Gulim" panose="020B0600000101010101" pitchFamily="34" charset="-127"/>
-                          <a:cs typeface="Times New Roman" panose="02020603050405020304" pitchFamily="18" charset="0"/>
+                          <a:cs typeface="Arial" panose="020B0604020202020204" pitchFamily="34" charset="0"/>
                         </a:rPr>
                         <a:t>(0.082– 0.147)</a:t>
                       </a:r>
-                      <a:endParaRPr lang="en-US" sz="1200">
+                      <a:endParaRPr lang="en-US" sz="1200" dirty="0">
                         <a:effectLst/>
-                        <a:latin typeface="Calibri" panose="020F0502020204030204" pitchFamily="34" charset="0"/>
+                        <a:latin typeface="Arial" panose="020B0604020202020204" pitchFamily="34" charset="0"/>
                         <a:ea typeface="Malgun Gothic" panose="020B0503020000020004" pitchFamily="34" charset="-127"/>
-                        <a:cs typeface="Times New Roman" panose="02020603050405020304" pitchFamily="18" charset="0"/>
+                        <a:cs typeface="Arial" panose="020B0604020202020204" pitchFamily="34" charset="0"/>
                       </a:endParaRPr>
                     </a:p>
                   </a:txBody>
@@ -12176,15 +12271,15 @@
                           <a:effectLst/>
                           <a:latin typeface="Arial" panose="020B0604020202020204" pitchFamily="34" charset="0"/>
                           <a:ea typeface="Gulim" panose="020B0600000101010101" pitchFamily="34" charset="-127"/>
-                          <a:cs typeface="Times New Roman" panose="02020603050405020304" pitchFamily="18" charset="0"/>
+                          <a:cs typeface="Arial" panose="020B0604020202020204" pitchFamily="34" charset="0"/>
                         </a:rPr>
                         <a:t>COPDGene</a:t>
                       </a:r>
                       <a:endParaRPr lang="en-US" sz="1200" dirty="0">
                         <a:effectLst/>
-                        <a:latin typeface="Calibri" panose="020F0502020204030204" pitchFamily="34" charset="0"/>
+                        <a:latin typeface="Arial" panose="020B0604020202020204" pitchFamily="34" charset="0"/>
                         <a:ea typeface="Malgun Gothic" panose="020B0503020000020004" pitchFamily="34" charset="-127"/>
-                        <a:cs typeface="Times New Roman" panose="02020603050405020304" pitchFamily="18" charset="0"/>
+                        <a:cs typeface="Arial" panose="020B0604020202020204" pitchFamily="34" charset="0"/>
                       </a:endParaRPr>
                     </a:p>
                     <a:p>
@@ -12207,15 +12302,15 @@
                           <a:effectLst/>
                           <a:latin typeface="Arial" panose="020B0604020202020204" pitchFamily="34" charset="0"/>
                           <a:ea typeface="Gulim" panose="020B0600000101010101" pitchFamily="34" charset="-127"/>
-                          <a:cs typeface="Times New Roman" panose="02020603050405020304" pitchFamily="18" charset="0"/>
+                          <a:cs typeface="Arial" panose="020B0604020202020204" pitchFamily="34" charset="0"/>
                         </a:rPr>
                         <a:t>(NHW Male)</a:t>
                       </a:r>
                       <a:endParaRPr lang="en-US" sz="1200" dirty="0">
                         <a:effectLst/>
-                        <a:latin typeface="Calibri" panose="020F0502020204030204" pitchFamily="34" charset="0"/>
+                        <a:latin typeface="Arial" panose="020B0604020202020204" pitchFamily="34" charset="0"/>
                         <a:ea typeface="Malgun Gothic" panose="020B0503020000020004" pitchFamily="34" charset="-127"/>
-                        <a:cs typeface="Times New Roman" panose="02020603050405020304" pitchFamily="18" charset="0"/>
+                        <a:cs typeface="Arial" panose="020B0604020202020204" pitchFamily="34" charset="0"/>
                       </a:endParaRPr>
                     </a:p>
                   </a:txBody>
@@ -12346,15 +12441,15 @@
                           <a:effectLst/>
                           <a:latin typeface="Arial" panose="020B0604020202020204" pitchFamily="34" charset="0"/>
                           <a:ea typeface="Gulim" panose="020B0600000101010101" pitchFamily="34" charset="-127"/>
-                          <a:cs typeface="Times New Roman" panose="02020603050405020304" pitchFamily="18" charset="0"/>
+                          <a:cs typeface="Arial" panose="020B0604020202020204" pitchFamily="34" charset="0"/>
                         </a:rPr>
                         <a:t>1,226</a:t>
                       </a:r>
                       <a:endParaRPr lang="en-US" sz="1200">
                         <a:effectLst/>
-                        <a:latin typeface="Calibri" panose="020F0502020204030204" pitchFamily="34" charset="0"/>
+                        <a:latin typeface="Arial" panose="020B0604020202020204" pitchFamily="34" charset="0"/>
                         <a:ea typeface="Malgun Gothic" panose="020B0503020000020004" pitchFamily="34" charset="-127"/>
-                        <a:cs typeface="Times New Roman" panose="02020603050405020304" pitchFamily="18" charset="0"/>
+                        <a:cs typeface="Arial" panose="020B0604020202020204" pitchFamily="34" charset="0"/>
                       </a:endParaRPr>
                     </a:p>
                   </a:txBody>
@@ -12485,15 +12580,15 @@
                           <a:effectLst/>
                           <a:latin typeface="Arial" panose="020B0604020202020204" pitchFamily="34" charset="0"/>
                           <a:ea typeface="Gulim" panose="020B0600000101010101" pitchFamily="34" charset="-127"/>
-                          <a:cs typeface="Times New Roman" panose="02020603050405020304" pitchFamily="18" charset="0"/>
+                          <a:cs typeface="Arial" panose="020B0604020202020204" pitchFamily="34" charset="0"/>
                         </a:rPr>
                         <a:t>0.2557</a:t>
                       </a:r>
                       <a:endParaRPr lang="en-US" sz="1200" dirty="0">
                         <a:effectLst/>
-                        <a:latin typeface="Calibri" panose="020F0502020204030204" pitchFamily="34" charset="0"/>
+                        <a:latin typeface="Arial" panose="020B0604020202020204" pitchFamily="34" charset="0"/>
                         <a:ea typeface="Malgun Gothic" panose="020B0503020000020004" pitchFamily="34" charset="-127"/>
-                        <a:cs typeface="Times New Roman" panose="02020603050405020304" pitchFamily="18" charset="0"/>
+                        <a:cs typeface="Arial" panose="020B0604020202020204" pitchFamily="34" charset="0"/>
                       </a:endParaRPr>
                     </a:p>
                     <a:p>
@@ -12516,15 +12611,15 @@
                           <a:effectLst/>
                           <a:latin typeface="Arial" panose="020B0604020202020204" pitchFamily="34" charset="0"/>
                           <a:ea typeface="Gulim" panose="020B0600000101010101" pitchFamily="34" charset="-127"/>
-                          <a:cs typeface="Times New Roman" panose="02020603050405020304" pitchFamily="18" charset="0"/>
+                          <a:cs typeface="Arial" panose="020B0604020202020204" pitchFamily="34" charset="0"/>
                         </a:rPr>
                         <a:t>(0.238 – 0.273)</a:t>
                       </a:r>
                       <a:endParaRPr lang="en-US" sz="1200" dirty="0">
                         <a:effectLst/>
-                        <a:latin typeface="Calibri" panose="020F0502020204030204" pitchFamily="34" charset="0"/>
+                        <a:latin typeface="Arial" panose="020B0604020202020204" pitchFamily="34" charset="0"/>
                         <a:ea typeface="Malgun Gothic" panose="020B0503020000020004" pitchFamily="34" charset="-127"/>
-                        <a:cs typeface="Times New Roman" panose="02020603050405020304" pitchFamily="18" charset="0"/>
+                        <a:cs typeface="Arial" panose="020B0604020202020204" pitchFamily="34" charset="0"/>
                       </a:endParaRPr>
                     </a:p>
                   </a:txBody>
@@ -12712,7 +12807,7 @@
                 </a:tc>
                 <a:extLst>
                   <a:ext uri="{0D108BD9-81ED-4DB2-BD59-A6C34878D82A}">
-                    <a16:rowId xmlns:a16="http://schemas.microsoft.com/office/drawing/2014/main" val="2285249298"/>
+                    <a16:rowId xmlns:a16="http://schemas.microsoft.com/office/drawing/2014/main" xmlns="" val="2285249298"/>
                   </a:ext>
                 </a:extLst>
               </a:tr>
@@ -12854,15 +12949,15 @@
                           <a:effectLst/>
                           <a:latin typeface="Arial" panose="020B0604020202020204" pitchFamily="34" charset="0"/>
                           <a:ea typeface="Gulim" panose="020B0600000101010101" pitchFamily="34" charset="-127"/>
-                          <a:cs typeface="Times New Roman" panose="02020603050405020304" pitchFamily="18" charset="0"/>
+                          <a:cs typeface="Arial" panose="020B0604020202020204" pitchFamily="34" charset="0"/>
                         </a:rPr>
                         <a:t>MESA</a:t>
                       </a:r>
                       <a:endParaRPr lang="en-US" sz="1200" dirty="0">
                         <a:effectLst/>
-                        <a:latin typeface="Calibri" panose="020F0502020204030204" pitchFamily="34" charset="0"/>
+                        <a:latin typeface="Arial" panose="020B0604020202020204" pitchFamily="34" charset="0"/>
                         <a:ea typeface="Malgun Gothic" panose="020B0503020000020004" pitchFamily="34" charset="-127"/>
-                        <a:cs typeface="Times New Roman" panose="02020603050405020304" pitchFamily="18" charset="0"/>
+                        <a:cs typeface="Arial" panose="020B0604020202020204" pitchFamily="34" charset="0"/>
                       </a:endParaRPr>
                     </a:p>
                     <a:p>
@@ -12885,15 +12980,15 @@
                           <a:effectLst/>
                           <a:latin typeface="Arial" panose="020B0604020202020204" pitchFamily="34" charset="0"/>
                           <a:ea typeface="Gulim" panose="020B0600000101010101" pitchFamily="34" charset="-127"/>
-                          <a:cs typeface="Times New Roman" panose="02020603050405020304" pitchFamily="18" charset="0"/>
+                          <a:cs typeface="Arial" panose="020B0604020202020204" pitchFamily="34" charset="0"/>
                         </a:rPr>
                         <a:t>(EUR Female)</a:t>
                       </a:r>
                       <a:endParaRPr lang="en-US" sz="1200" dirty="0">
                         <a:effectLst/>
-                        <a:latin typeface="Calibri" panose="020F0502020204030204" pitchFamily="34" charset="0"/>
+                        <a:latin typeface="Arial" panose="020B0604020202020204" pitchFamily="34" charset="0"/>
                         <a:ea typeface="Malgun Gothic" panose="020B0503020000020004" pitchFamily="34" charset="-127"/>
-                        <a:cs typeface="Times New Roman" panose="02020603050405020304" pitchFamily="18" charset="0"/>
+                        <a:cs typeface="Arial" panose="020B0604020202020204" pitchFamily="34" charset="0"/>
                       </a:endParaRPr>
                     </a:p>
                   </a:txBody>
@@ -13018,15 +13113,15 @@
                           <a:effectLst/>
                           <a:latin typeface="Arial" panose="020B0604020202020204" pitchFamily="34" charset="0"/>
                           <a:ea typeface="Gulim" panose="020B0600000101010101" pitchFamily="34" charset="-127"/>
-                          <a:cs typeface="Times New Roman" panose="02020603050405020304" pitchFamily="18" charset="0"/>
+                          <a:cs typeface="Arial" panose="020B0604020202020204" pitchFamily="34" charset="0"/>
                         </a:rPr>
                         <a:t>1,128</a:t>
                       </a:r>
                       <a:endParaRPr lang="en-US" sz="1200">
                         <a:effectLst/>
-                        <a:latin typeface="Calibri" panose="020F0502020204030204" pitchFamily="34" charset="0"/>
+                        <a:latin typeface="Arial" panose="020B0604020202020204" pitchFamily="34" charset="0"/>
                         <a:ea typeface="Malgun Gothic" panose="020B0503020000020004" pitchFamily="34" charset="-127"/>
-                        <a:cs typeface="Times New Roman" panose="02020603050405020304" pitchFamily="18" charset="0"/>
+                        <a:cs typeface="Arial" panose="020B0604020202020204" pitchFamily="34" charset="0"/>
                       </a:endParaRPr>
                     </a:p>
                   </a:txBody>
@@ -13144,22 +13239,22 @@
                         </a:spcAft>
                       </a:pPr>
                       <a:r>
-                        <a:rPr lang="en-US" sz="1200" kern="1200">
+                        <a:rPr lang="en-US" sz="1200" kern="1200" dirty="0">
                           <a:solidFill>
                             <a:srgbClr val="000000"/>
                           </a:solidFill>
                           <a:effectLst/>
                           <a:latin typeface="Arial" panose="020B0604020202020204" pitchFamily="34" charset="0"/>
                           <a:ea typeface="Gulim" panose="020B0600000101010101" pitchFamily="34" charset="-127"/>
-                          <a:cs typeface="Times New Roman" panose="02020603050405020304" pitchFamily="18" charset="0"/>
+                          <a:cs typeface="Arial" panose="020B0604020202020204" pitchFamily="34" charset="0"/>
                         </a:rPr>
                         <a:t>0.2283</a:t>
                       </a:r>
-                      <a:endParaRPr lang="en-US" sz="1200">
+                      <a:endParaRPr lang="en-US" sz="1200" dirty="0">
                         <a:effectLst/>
-                        <a:latin typeface="Calibri" panose="020F0502020204030204" pitchFamily="34" charset="0"/>
+                        <a:latin typeface="Arial" panose="020B0604020202020204" pitchFamily="34" charset="0"/>
                         <a:ea typeface="Malgun Gothic" panose="020B0503020000020004" pitchFamily="34" charset="-127"/>
-                        <a:cs typeface="Times New Roman" panose="02020603050405020304" pitchFamily="18" charset="0"/>
+                        <a:cs typeface="Arial" panose="020B0604020202020204" pitchFamily="34" charset="0"/>
                       </a:endParaRPr>
                     </a:p>
                     <a:p>
@@ -13175,22 +13270,22 @@
                         </a:spcAft>
                       </a:pPr>
                       <a:r>
-                        <a:rPr lang="en-US" sz="1200" kern="1200">
+                        <a:rPr lang="en-US" sz="1200" kern="1200" dirty="0">
                           <a:solidFill>
                             <a:srgbClr val="000000"/>
                           </a:solidFill>
                           <a:effectLst/>
                           <a:latin typeface="Arial" panose="020B0604020202020204" pitchFamily="34" charset="0"/>
                           <a:ea typeface="Gulim" panose="020B0600000101010101" pitchFamily="34" charset="-127"/>
-                          <a:cs typeface="Times New Roman" panose="02020603050405020304" pitchFamily="18" charset="0"/>
+                          <a:cs typeface="Arial" panose="020B0604020202020204" pitchFamily="34" charset="0"/>
                         </a:rPr>
                         <a:t>(0.211 – 0.246)</a:t>
                       </a:r>
-                      <a:endParaRPr lang="en-US" sz="1200">
+                      <a:endParaRPr lang="en-US" sz="1200" dirty="0">
                         <a:effectLst/>
-                        <a:latin typeface="Calibri" panose="020F0502020204030204" pitchFamily="34" charset="0"/>
+                        <a:latin typeface="Arial" panose="020B0604020202020204" pitchFamily="34" charset="0"/>
                         <a:ea typeface="Malgun Gothic" panose="020B0503020000020004" pitchFamily="34" charset="-127"/>
-                        <a:cs typeface="Times New Roman" panose="02020603050405020304" pitchFamily="18" charset="0"/>
+                        <a:cs typeface="Arial" panose="020B0604020202020204" pitchFamily="34" charset="0"/>
                       </a:endParaRPr>
                     </a:p>
                   </a:txBody>
@@ -13366,7 +13461,7 @@
                 </a:tc>
                 <a:extLst>
                   <a:ext uri="{0D108BD9-81ED-4DB2-BD59-A6C34878D82A}">
-                    <a16:rowId xmlns:a16="http://schemas.microsoft.com/office/drawing/2014/main" val="605521000"/>
+                    <a16:rowId xmlns:a16="http://schemas.microsoft.com/office/drawing/2014/main" xmlns="" val="605521000"/>
                   </a:ext>
                 </a:extLst>
               </a:tr>
@@ -13508,7 +13603,7 @@
                           <a:effectLst/>
                           <a:latin typeface="Arial" panose="020B0604020202020204" pitchFamily="34" charset="0"/>
                           <a:ea typeface="Gulim" panose="020B0600000101010101" pitchFamily="34" charset="-127"/>
-                          <a:cs typeface="Times New Roman" panose="02020603050405020304" pitchFamily="18" charset="0"/>
+                          <a:cs typeface="Arial" panose="020B0604020202020204" pitchFamily="34" charset="0"/>
                         </a:rPr>
                         <a:t>1000GP</a:t>
                       </a:r>
@@ -13520,7 +13615,7 @@
                           <a:effectLst/>
                           <a:latin typeface="Arial" panose="020B0604020202020204" pitchFamily="34" charset="0"/>
                           <a:ea typeface="Gulim" panose="020B0600000101010101" pitchFamily="34" charset="-127"/>
-                          <a:cs typeface="Times New Roman" panose="02020603050405020304" pitchFamily="18" charset="0"/>
+                          <a:cs typeface="Arial" panose="020B0604020202020204" pitchFamily="34" charset="0"/>
                         </a:rPr>
                       </a:br>
                       <a:r>
@@ -13531,15 +13626,15 @@
                           <a:effectLst/>
                           <a:latin typeface="Arial" panose="020B0604020202020204" pitchFamily="34" charset="0"/>
                           <a:ea typeface="Gulim" panose="020B0600000101010101" pitchFamily="34" charset="-127"/>
-                          <a:cs typeface="Times New Roman" panose="02020603050405020304" pitchFamily="18" charset="0"/>
+                          <a:cs typeface="Arial" panose="020B0604020202020204" pitchFamily="34" charset="0"/>
                         </a:rPr>
                         <a:t>(EUR Female)</a:t>
                       </a:r>
                       <a:endParaRPr lang="en-US" sz="1200" dirty="0">
                         <a:effectLst/>
-                        <a:latin typeface="Calibri" panose="020F0502020204030204" pitchFamily="34" charset="0"/>
+                        <a:latin typeface="Arial" panose="020B0604020202020204" pitchFamily="34" charset="0"/>
                         <a:ea typeface="Malgun Gothic" panose="020B0503020000020004" pitchFamily="34" charset="-127"/>
-                        <a:cs typeface="Times New Roman" panose="02020603050405020304" pitchFamily="18" charset="0"/>
+                        <a:cs typeface="Arial" panose="020B0604020202020204" pitchFamily="34" charset="0"/>
                       </a:endParaRPr>
                     </a:p>
                   </a:txBody>
@@ -13664,15 +13759,15 @@
                           <a:effectLst/>
                           <a:latin typeface="Arial" panose="020B0604020202020204" pitchFamily="34" charset="0"/>
                           <a:ea typeface="Gulim" panose="020B0600000101010101" pitchFamily="34" charset="-127"/>
-                          <a:cs typeface="Times New Roman" panose="02020603050405020304" pitchFamily="18" charset="0"/>
+                          <a:cs typeface="Arial" panose="020B0604020202020204" pitchFamily="34" charset="0"/>
                         </a:rPr>
                         <a:t>263</a:t>
                       </a:r>
                       <a:endParaRPr lang="en-US" sz="1200">
                         <a:effectLst/>
-                        <a:latin typeface="Calibri" panose="020F0502020204030204" pitchFamily="34" charset="0"/>
+                        <a:latin typeface="Arial" panose="020B0604020202020204" pitchFamily="34" charset="0"/>
                         <a:ea typeface="Malgun Gothic" panose="020B0503020000020004" pitchFamily="34" charset="-127"/>
-                        <a:cs typeface="Times New Roman" panose="02020603050405020304" pitchFamily="18" charset="0"/>
+                        <a:cs typeface="Arial" panose="020B0604020202020204" pitchFamily="34" charset="0"/>
                       </a:endParaRPr>
                     </a:p>
                   </a:txBody>
@@ -13790,22 +13885,22 @@
                         </a:spcAft>
                       </a:pPr>
                       <a:r>
-                        <a:rPr lang="en-US" sz="1200" kern="1200">
+                        <a:rPr lang="en-US" sz="1200" kern="1200" dirty="0">
                           <a:solidFill>
                             <a:srgbClr val="000000"/>
                           </a:solidFill>
                           <a:effectLst/>
                           <a:latin typeface="Arial" panose="020B0604020202020204" pitchFamily="34" charset="0"/>
                           <a:ea typeface="Gulim" panose="020B0600000101010101" pitchFamily="34" charset="-127"/>
-                          <a:cs typeface="Times New Roman" panose="02020603050405020304" pitchFamily="18" charset="0"/>
+                          <a:cs typeface="Arial" panose="020B0604020202020204" pitchFamily="34" charset="0"/>
                         </a:rPr>
                         <a:t>0.2186</a:t>
                       </a:r>
-                      <a:endParaRPr lang="en-US" sz="1200">
+                      <a:endParaRPr lang="en-US" sz="1200" dirty="0">
                         <a:effectLst/>
-                        <a:latin typeface="Calibri" panose="020F0502020204030204" pitchFamily="34" charset="0"/>
+                        <a:latin typeface="Arial" panose="020B0604020202020204" pitchFamily="34" charset="0"/>
                         <a:ea typeface="Malgun Gothic" panose="020B0503020000020004" pitchFamily="34" charset="-127"/>
-                        <a:cs typeface="Times New Roman" panose="02020603050405020304" pitchFamily="18" charset="0"/>
+                        <a:cs typeface="Arial" panose="020B0604020202020204" pitchFamily="34" charset="0"/>
                       </a:endParaRPr>
                     </a:p>
                     <a:p>
@@ -13821,22 +13916,22 @@
                         </a:spcAft>
                       </a:pPr>
                       <a:r>
-                        <a:rPr lang="en-US" sz="1200" kern="1200">
+                        <a:rPr lang="en-US" sz="1200" kern="1200" dirty="0">
                           <a:solidFill>
                             <a:srgbClr val="000000"/>
                           </a:solidFill>
                           <a:effectLst/>
                           <a:latin typeface="Arial" panose="020B0604020202020204" pitchFamily="34" charset="0"/>
                           <a:ea typeface="Gulim" panose="020B0600000101010101" pitchFamily="34" charset="-127"/>
-                          <a:cs typeface="Times New Roman" panose="02020603050405020304" pitchFamily="18" charset="0"/>
+                          <a:cs typeface="Arial" panose="020B0604020202020204" pitchFamily="34" charset="0"/>
                         </a:rPr>
                         <a:t>(0.198 – 0.239)</a:t>
                       </a:r>
-                      <a:endParaRPr lang="en-US" sz="1200">
+                      <a:endParaRPr lang="en-US" sz="1200" dirty="0">
                         <a:effectLst/>
-                        <a:latin typeface="Calibri" panose="020F0502020204030204" pitchFamily="34" charset="0"/>
+                        <a:latin typeface="Arial" panose="020B0604020202020204" pitchFamily="34" charset="0"/>
                         <a:ea typeface="Malgun Gothic" panose="020B0503020000020004" pitchFamily="34" charset="-127"/>
-                        <a:cs typeface="Times New Roman" panose="02020603050405020304" pitchFamily="18" charset="0"/>
+                        <a:cs typeface="Arial" panose="020B0604020202020204" pitchFamily="34" charset="0"/>
                       </a:endParaRPr>
                     </a:p>
                   </a:txBody>
@@ -14012,7 +14107,7 @@
                 </a:tc>
                 <a:extLst>
                   <a:ext uri="{0D108BD9-81ED-4DB2-BD59-A6C34878D82A}">
-                    <a16:rowId xmlns:a16="http://schemas.microsoft.com/office/drawing/2014/main" val="3873839538"/>
+                    <a16:rowId xmlns:a16="http://schemas.microsoft.com/office/drawing/2014/main" xmlns="" val="3873839538"/>
                   </a:ext>
                 </a:extLst>
               </a:tr>
@@ -14154,15 +14249,15 @@
                           <a:effectLst/>
                           <a:latin typeface="Arial" panose="020B0604020202020204" pitchFamily="34" charset="0"/>
                           <a:ea typeface="Gulim" panose="020B0600000101010101" pitchFamily="34" charset="-127"/>
-                          <a:cs typeface="Times New Roman" panose="02020603050405020304" pitchFamily="18" charset="0"/>
+                          <a:cs typeface="Arial" panose="020B0604020202020204" pitchFamily="34" charset="0"/>
                         </a:rPr>
                         <a:t>ECLIPSE</a:t>
                       </a:r>
                       <a:endParaRPr lang="en-US" sz="1200" dirty="0">
                         <a:effectLst/>
-                        <a:latin typeface="Calibri" panose="020F0502020204030204" pitchFamily="34" charset="0"/>
+                        <a:latin typeface="Arial" panose="020B0604020202020204" pitchFamily="34" charset="0"/>
                         <a:ea typeface="Malgun Gothic" panose="020B0503020000020004" pitchFamily="34" charset="-127"/>
-                        <a:cs typeface="Times New Roman" panose="02020603050405020304" pitchFamily="18" charset="0"/>
+                        <a:cs typeface="Arial" panose="020B0604020202020204" pitchFamily="34" charset="0"/>
                       </a:endParaRPr>
                     </a:p>
                     <a:p>
@@ -14185,15 +14280,15 @@
                           <a:effectLst/>
                           <a:latin typeface="Arial" panose="020B0604020202020204" pitchFamily="34" charset="0"/>
                           <a:ea typeface="Gulim" panose="020B0600000101010101" pitchFamily="34" charset="-127"/>
-                          <a:cs typeface="Times New Roman" panose="02020603050405020304" pitchFamily="18" charset="0"/>
+                          <a:cs typeface="Arial" panose="020B0604020202020204" pitchFamily="34" charset="0"/>
                         </a:rPr>
                         <a:t>(EUR Female)</a:t>
                       </a:r>
                       <a:endParaRPr lang="en-US" sz="1200" dirty="0">
                         <a:effectLst/>
-                        <a:latin typeface="Calibri" panose="020F0502020204030204" pitchFamily="34" charset="0"/>
+                        <a:latin typeface="Arial" panose="020B0604020202020204" pitchFamily="34" charset="0"/>
                         <a:ea typeface="Malgun Gothic" panose="020B0503020000020004" pitchFamily="34" charset="-127"/>
-                        <a:cs typeface="Times New Roman" panose="02020603050405020304" pitchFamily="18" charset="0"/>
+                        <a:cs typeface="Arial" panose="020B0604020202020204" pitchFamily="34" charset="0"/>
                       </a:endParaRPr>
                     </a:p>
                   </a:txBody>
@@ -14318,15 +14413,15 @@
                           <a:effectLst/>
                           <a:latin typeface="Arial" panose="020B0604020202020204" pitchFamily="34" charset="0"/>
                           <a:ea typeface="Gulim" panose="020B0600000101010101" pitchFamily="34" charset="-127"/>
-                          <a:cs typeface="Times New Roman" panose="02020603050405020304" pitchFamily="18" charset="0"/>
+                          <a:cs typeface="Arial" panose="020B0604020202020204" pitchFamily="34" charset="0"/>
                         </a:rPr>
                         <a:t>792</a:t>
                       </a:r>
                       <a:endParaRPr lang="en-US" sz="1200">
                         <a:effectLst/>
-                        <a:latin typeface="Calibri" panose="020F0502020204030204" pitchFamily="34" charset="0"/>
+                        <a:latin typeface="Arial" panose="020B0604020202020204" pitchFamily="34" charset="0"/>
                         <a:ea typeface="Malgun Gothic" panose="020B0503020000020004" pitchFamily="34" charset="-127"/>
-                        <a:cs typeface="Times New Roman" panose="02020603050405020304" pitchFamily="18" charset="0"/>
+                        <a:cs typeface="Arial" panose="020B0604020202020204" pitchFamily="34" charset="0"/>
                       </a:endParaRPr>
                     </a:p>
                   </a:txBody>
@@ -14451,15 +14546,15 @@
                           <a:effectLst/>
                           <a:latin typeface="Arial" panose="020B0604020202020204" pitchFamily="34" charset="0"/>
                           <a:ea typeface="Gulim" panose="020B0600000101010101" pitchFamily="34" charset="-127"/>
-                          <a:cs typeface="Times New Roman" panose="02020603050405020304" pitchFamily="18" charset="0"/>
+                          <a:cs typeface="Arial" panose="020B0604020202020204" pitchFamily="34" charset="0"/>
                         </a:rPr>
                         <a:t>0.2431</a:t>
                       </a:r>
                       <a:endParaRPr lang="en-US" sz="1200" dirty="0">
                         <a:effectLst/>
-                        <a:latin typeface="Calibri" panose="020F0502020204030204" pitchFamily="34" charset="0"/>
+                        <a:latin typeface="Arial" panose="020B0604020202020204" pitchFamily="34" charset="0"/>
                         <a:ea typeface="Malgun Gothic" panose="020B0503020000020004" pitchFamily="34" charset="-127"/>
-                        <a:cs typeface="Times New Roman" panose="02020603050405020304" pitchFamily="18" charset="0"/>
+                        <a:cs typeface="Arial" panose="020B0604020202020204" pitchFamily="34" charset="0"/>
                       </a:endParaRPr>
                     </a:p>
                     <a:p>
@@ -14482,15 +14577,15 @@
                           <a:effectLst/>
                           <a:latin typeface="Arial" panose="020B0604020202020204" pitchFamily="34" charset="0"/>
                           <a:ea typeface="Gulim" panose="020B0600000101010101" pitchFamily="34" charset="-127"/>
-                          <a:cs typeface="Times New Roman" panose="02020603050405020304" pitchFamily="18" charset="0"/>
+                          <a:cs typeface="Arial" panose="020B0604020202020204" pitchFamily="34" charset="0"/>
                         </a:rPr>
                         <a:t>(0.222 – 0.264)</a:t>
                       </a:r>
                       <a:endParaRPr lang="en-US" sz="1200" dirty="0">
                         <a:effectLst/>
-                        <a:latin typeface="Calibri" panose="020F0502020204030204" pitchFamily="34" charset="0"/>
+                        <a:latin typeface="Arial" panose="020B0604020202020204" pitchFamily="34" charset="0"/>
                         <a:ea typeface="Malgun Gothic" panose="020B0503020000020004" pitchFamily="34" charset="-127"/>
-                        <a:cs typeface="Times New Roman" panose="02020603050405020304" pitchFamily="18" charset="0"/>
+                        <a:cs typeface="Arial" panose="020B0604020202020204" pitchFamily="34" charset="0"/>
                       </a:endParaRPr>
                     </a:p>
                   </a:txBody>
@@ -14666,7 +14761,7 @@
                 </a:tc>
                 <a:extLst>
                   <a:ext uri="{0D108BD9-81ED-4DB2-BD59-A6C34878D82A}">
-                    <a16:rowId xmlns:a16="http://schemas.microsoft.com/office/drawing/2014/main" val="121681536"/>
+                    <a16:rowId xmlns:a16="http://schemas.microsoft.com/office/drawing/2014/main" xmlns="" val="121681536"/>
                   </a:ext>
                 </a:extLst>
               </a:tr>
@@ -14808,15 +14903,15 @@
                           <a:effectLst/>
                           <a:latin typeface="Arial" panose="020B0604020202020204" pitchFamily="34" charset="0"/>
                           <a:ea typeface="Gulim" panose="020B0600000101010101" pitchFamily="34" charset="-127"/>
-                          <a:cs typeface="Times New Roman" panose="02020603050405020304" pitchFamily="18" charset="0"/>
+                          <a:cs typeface="Arial" panose="020B0604020202020204" pitchFamily="34" charset="0"/>
                         </a:rPr>
                         <a:t>UKBiobank</a:t>
                       </a:r>
                       <a:endParaRPr lang="en-US" sz="1200" dirty="0">
                         <a:effectLst/>
-                        <a:latin typeface="Calibri" panose="020F0502020204030204" pitchFamily="34" charset="0"/>
+                        <a:latin typeface="Arial" panose="020B0604020202020204" pitchFamily="34" charset="0"/>
                         <a:ea typeface="Malgun Gothic" panose="020B0503020000020004" pitchFamily="34" charset="-127"/>
-                        <a:cs typeface="Times New Roman" panose="02020603050405020304" pitchFamily="18" charset="0"/>
+                        <a:cs typeface="Arial" panose="020B0604020202020204" pitchFamily="34" charset="0"/>
                       </a:endParaRPr>
                     </a:p>
                     <a:p>
@@ -14839,15 +14934,15 @@
                           <a:effectLst/>
                           <a:latin typeface="Arial" panose="020B0604020202020204" pitchFamily="34" charset="0"/>
                           <a:ea typeface="Gulim" panose="020B0600000101010101" pitchFamily="34" charset="-127"/>
-                          <a:cs typeface="Times New Roman" panose="02020603050405020304" pitchFamily="18" charset="0"/>
+                          <a:cs typeface="Arial" panose="020B0604020202020204" pitchFamily="34" charset="0"/>
                         </a:rPr>
                         <a:t>(EUR)</a:t>
                       </a:r>
                       <a:endParaRPr lang="en-US" sz="1200" dirty="0">
                         <a:effectLst/>
-                        <a:latin typeface="Calibri" panose="020F0502020204030204" pitchFamily="34" charset="0"/>
+                        <a:latin typeface="Arial" panose="020B0604020202020204" pitchFamily="34" charset="0"/>
                         <a:ea typeface="Malgun Gothic" panose="020B0503020000020004" pitchFamily="34" charset="-127"/>
-                        <a:cs typeface="Times New Roman" panose="02020603050405020304" pitchFamily="18" charset="0"/>
+                        <a:cs typeface="Arial" panose="020B0604020202020204" pitchFamily="34" charset="0"/>
                       </a:endParaRPr>
                     </a:p>
                   </a:txBody>
@@ -14953,16 +15048,31 @@
                       </a:lvl9pPr>
                     </a:lstStyle>
                     <a:p>
-                      <a:pPr>
+                      <a:pPr marL="0" marR="0" indent="0" algn="l" defTabSz="914400" rtl="0" eaLnBrk="1" fontAlgn="auto" latinLnBrk="1" hangingPunct="1">
                         <a:lnSpc>
                           <a:spcPct val="107000"/>
                         </a:lnSpc>
+                        <a:spcBef>
+                          <a:spcPts val="0"/>
+                        </a:spcBef>
+                        <a:spcAft>
+                          <a:spcPts val="0"/>
+                        </a:spcAft>
+                        <a:buClrTx/>
+                        <a:buSzTx/>
+                        <a:buFontTx/>
+                        <a:buNone/>
+                        <a:tabLst/>
+                        <a:defRPr/>
                       </a:pPr>
-                      <a:endParaRPr lang="en-US" sz="1200">
-                        <a:effectLst/>
-                        <a:latin typeface="Calibri" panose="020F0502020204030204" pitchFamily="34" charset="0"/>
-                        <a:cs typeface="Times New Roman" panose="02020603050405020304" pitchFamily="18" charset="0"/>
-                      </a:endParaRPr>
+                      <a:r>
+                        <a:rPr lang="en-US" altLang="ko-KR" sz="1200" dirty="0" smtClean="0">
+                          <a:effectLst/>
+                          <a:latin typeface="Arial" panose="020B0604020202020204" pitchFamily="34" charset="0"/>
+                          <a:cs typeface="Arial" panose="020B0604020202020204" pitchFamily="34" charset="0"/>
+                        </a:rPr>
+                        <a:t>337,199</a:t>
+                      </a:r>
                     </a:p>
                   </a:txBody>
                   <a:tcPr marL="54403" marR="54403" marT="27202" marB="27202" anchor="ctr">
@@ -15067,15 +15177,58 @@
                       </a:lvl9pPr>
                     </a:lstStyle>
                     <a:p>
-                      <a:pPr>
+                      <a:pPr algn="ctr">
                         <a:lnSpc>
                           <a:spcPct val="107000"/>
                         </a:lnSpc>
                       </a:pPr>
+                      <a:r>
+                        <a:rPr lang="en-US" sz="1200" dirty="0" smtClean="0">
+                          <a:effectLst/>
+                          <a:latin typeface="Arial" panose="020B0604020202020204" pitchFamily="34" charset="0"/>
+                          <a:cs typeface="Arial" panose="020B0604020202020204" pitchFamily="34" charset="0"/>
+                        </a:rPr>
+                        <a:t>0.2432</a:t>
+                      </a:r>
+                    </a:p>
+                    <a:p>
+                      <a:pPr algn="ctr">
+                        <a:lnSpc>
+                          <a:spcPct val="107000"/>
+                        </a:lnSpc>
+                      </a:pPr>
+                      <a:r>
+                        <a:rPr lang="en-US" altLang="ko-KR" sz="1200" dirty="0" smtClean="0">
+                          <a:effectLst/>
+                          <a:latin typeface="Arial" panose="020B0604020202020204" pitchFamily="34" charset="0"/>
+                          <a:cs typeface="Arial" panose="020B0604020202020204" pitchFamily="34" charset="0"/>
+                        </a:rPr>
+                        <a:t>(0.242</a:t>
+                      </a:r>
+                      <a:r>
+                        <a:rPr lang="en-US" altLang="ko-KR" sz="1200" kern="1200" dirty="0" smtClean="0">
+                          <a:solidFill>
+                            <a:srgbClr val="000000"/>
+                          </a:solidFill>
+                          <a:effectLst/>
+                          <a:latin typeface="Arial" panose="020B0604020202020204" pitchFamily="34" charset="0"/>
+                          <a:ea typeface="Gulim" panose="020B0600000101010101" pitchFamily="34" charset="-127"/>
+                          <a:cs typeface="Arial" panose="020B0604020202020204" pitchFamily="34" charset="0"/>
+                        </a:rPr>
+                        <a:t>–</a:t>
+                      </a:r>
+                      <a:r>
+                        <a:rPr lang="en-US" altLang="ko-KR" sz="1200" dirty="0" smtClean="0">
+                          <a:effectLst/>
+                          <a:latin typeface="Arial" panose="020B0604020202020204" pitchFamily="34" charset="0"/>
+                          <a:cs typeface="Arial" panose="020B0604020202020204" pitchFamily="34" charset="0"/>
+                        </a:rPr>
+                        <a:t> 0.244)</a:t>
+                      </a:r>
                       <a:endParaRPr lang="en-US" sz="1200" dirty="0">
                         <a:effectLst/>
-                        <a:latin typeface="Calibri" panose="020F0502020204030204" pitchFamily="34" charset="0"/>
-                        <a:cs typeface="Times New Roman" panose="02020603050405020304" pitchFamily="18" charset="0"/>
+                        <a:latin typeface="Arial" panose="020B0604020202020204" pitchFamily="34" charset="0"/>
+                        <a:cs typeface="Arial" panose="020B0604020202020204" pitchFamily="34" charset="0"/>
                       </a:endParaRPr>
                     </a:p>
                   </a:txBody>
@@ -15186,6 +15339,42 @@
                           <a:spcPct val="107000"/>
                         </a:lnSpc>
                       </a:pPr>
+                      <a:r>
+                        <a:rPr lang="en-US" altLang="ko-KR" sz="1200" b="0" i="0" u="none" strike="noStrike" dirty="0" smtClean="0">
+                          <a:solidFill>
+                            <a:schemeClr val="tx1"/>
+                          </a:solidFill>
+                          <a:effectLst/>
+                          <a:latin typeface="Arial" panose="020B0604020202020204" pitchFamily="34" charset="0"/>
+                          <a:ea typeface="+mn-ea"/>
+                          <a:cs typeface="Arial" panose="020B0604020202020204" pitchFamily="34" charset="0"/>
+                        </a:rPr>
+                        <a:t>8.18</a:t>
+                      </a:r>
+                      <a:r>
+                        <a:rPr lang="en-US" altLang="ko-KR" sz="1200" b="0" i="0" u="none" strike="noStrike" dirty="0" smtClean="0">
+                          <a:solidFill>
+                            <a:srgbClr val="000000"/>
+                          </a:solidFill>
+                          <a:effectLst/>
+                          <a:latin typeface="Arial" panose="020B0604020202020204" pitchFamily="34" charset="0"/>
+                          <a:ea typeface="맑은 고딕" panose="020B0503020000020004" pitchFamily="50" charset="-127"/>
+                          <a:cs typeface="Arial" panose="020B0604020202020204" pitchFamily="34" charset="0"/>
+                        </a:rPr>
+                        <a:t>×10</a:t>
+                      </a:r>
+                      <a:r>
+                        <a:rPr lang="en-US" altLang="ko-KR" sz="1200" b="0" i="0" u="none" strike="noStrike" baseline="30000" dirty="0" smtClean="0">
+                          <a:solidFill>
+                            <a:srgbClr val="000000"/>
+                          </a:solidFill>
+                          <a:effectLst/>
+                          <a:latin typeface="Arial" panose="020B0604020202020204" pitchFamily="34" charset="0"/>
+                          <a:ea typeface="맑은 고딕" panose="020B0503020000020004" pitchFamily="50" charset="-127"/>
+                          <a:cs typeface="Arial" panose="020B0604020202020204" pitchFamily="34" charset="0"/>
+                        </a:rPr>
+                        <a:t>-15</a:t>
+                      </a:r>
                       <a:endParaRPr lang="en-US" sz="1200" dirty="0">
                         <a:effectLst/>
                         <a:latin typeface="Arial" panose="020B0604020202020204" pitchFamily="34" charset="0"/>
@@ -15219,7 +15408,7 @@
                 </a:tc>
                 <a:extLst>
                   <a:ext uri="{0D108BD9-81ED-4DB2-BD59-A6C34878D82A}">
-                    <a16:rowId xmlns:a16="http://schemas.microsoft.com/office/drawing/2014/main" val="71002534"/>
+                    <a16:rowId xmlns:a16="http://schemas.microsoft.com/office/drawing/2014/main" xmlns="" val="71002534"/>
                   </a:ext>
                 </a:extLst>
               </a:tr>
@@ -15361,15 +15550,15 @@
                           <a:effectLst/>
                           <a:latin typeface="Arial" panose="020B0604020202020204" pitchFamily="34" charset="0"/>
                           <a:ea typeface="Gulim" panose="020B0600000101010101" pitchFamily="34" charset="-127"/>
-                          <a:cs typeface="Times New Roman" panose="02020603050405020304" pitchFamily="18" charset="0"/>
+                          <a:cs typeface="Arial" panose="020B0604020202020204" pitchFamily="34" charset="0"/>
                         </a:rPr>
                         <a:t>GnomAD</a:t>
                       </a:r>
                       <a:endParaRPr lang="en-US" sz="1200" dirty="0">
                         <a:effectLst/>
-                        <a:latin typeface="Calibri" panose="020F0502020204030204" pitchFamily="34" charset="0"/>
+                        <a:latin typeface="Arial" panose="020B0604020202020204" pitchFamily="34" charset="0"/>
                         <a:ea typeface="Malgun Gothic" panose="020B0503020000020004" pitchFamily="34" charset="-127"/>
-                        <a:cs typeface="Times New Roman" panose="02020603050405020304" pitchFamily="18" charset="0"/>
+                        <a:cs typeface="Arial" panose="020B0604020202020204" pitchFamily="34" charset="0"/>
                       </a:endParaRPr>
                     </a:p>
                     <a:p>
@@ -15392,15 +15581,15 @@
                           <a:effectLst/>
                           <a:latin typeface="Arial" panose="020B0604020202020204" pitchFamily="34" charset="0"/>
                           <a:ea typeface="Gulim" panose="020B0600000101010101" pitchFamily="34" charset="-127"/>
-                          <a:cs typeface="Times New Roman" panose="02020603050405020304" pitchFamily="18" charset="0"/>
+                          <a:cs typeface="Arial" panose="020B0604020202020204" pitchFamily="34" charset="0"/>
                         </a:rPr>
                         <a:t>(EUR)</a:t>
                       </a:r>
                       <a:endParaRPr lang="en-US" sz="1200" dirty="0">
                         <a:effectLst/>
-                        <a:latin typeface="Calibri" panose="020F0502020204030204" pitchFamily="34" charset="0"/>
+                        <a:latin typeface="Arial" panose="020B0604020202020204" pitchFamily="34" charset="0"/>
                         <a:ea typeface="Malgun Gothic" panose="020B0503020000020004" pitchFamily="34" charset="-127"/>
-                        <a:cs typeface="Times New Roman" panose="02020603050405020304" pitchFamily="18" charset="0"/>
+                        <a:cs typeface="Arial" panose="020B0604020202020204" pitchFamily="34" charset="0"/>
                       </a:endParaRPr>
                     </a:p>
                   </a:txBody>
@@ -15531,15 +15720,15 @@
                           <a:effectLst/>
                           <a:latin typeface="Arial" panose="020B0604020202020204" pitchFamily="34" charset="0"/>
                           <a:ea typeface="Gulim" panose="020B0600000101010101" pitchFamily="34" charset="-127"/>
-                          <a:cs typeface="Times New Roman" panose="02020603050405020304" pitchFamily="18" charset="0"/>
+                          <a:cs typeface="Arial" panose="020B0604020202020204" pitchFamily="34" charset="0"/>
                         </a:rPr>
                         <a:t>1,747</a:t>
                       </a:r>
                       <a:endParaRPr lang="en-US" sz="1200" dirty="0">
                         <a:effectLst/>
-                        <a:latin typeface="Calibri" panose="020F0502020204030204" pitchFamily="34" charset="0"/>
+                        <a:latin typeface="Arial" panose="020B0604020202020204" pitchFamily="34" charset="0"/>
                         <a:ea typeface="Malgun Gothic" panose="020B0503020000020004" pitchFamily="34" charset="-127"/>
-                        <a:cs typeface="Times New Roman" panose="02020603050405020304" pitchFamily="18" charset="0"/>
+                        <a:cs typeface="Arial" panose="020B0604020202020204" pitchFamily="34" charset="0"/>
                       </a:endParaRPr>
                     </a:p>
                   </a:txBody>
@@ -15670,15 +15859,15 @@
                           <a:effectLst/>
                           <a:latin typeface="Arial" panose="020B0604020202020204" pitchFamily="34" charset="0"/>
                           <a:ea typeface="Gulim" panose="020B0600000101010101" pitchFamily="34" charset="-127"/>
-                          <a:cs typeface="Times New Roman" panose="02020603050405020304" pitchFamily="18" charset="0"/>
+                          <a:cs typeface="Arial" panose="020B0604020202020204" pitchFamily="34" charset="0"/>
                         </a:rPr>
                         <a:t>0.3060</a:t>
                       </a:r>
                       <a:endParaRPr lang="en-US" sz="1200" dirty="0">
                         <a:effectLst/>
-                        <a:latin typeface="Calibri" panose="020F0502020204030204" pitchFamily="34" charset="0"/>
+                        <a:latin typeface="Arial" panose="020B0604020202020204" pitchFamily="34" charset="0"/>
                         <a:ea typeface="Malgun Gothic" panose="020B0503020000020004" pitchFamily="34" charset="-127"/>
-                        <a:cs typeface="Times New Roman" panose="02020603050405020304" pitchFamily="18" charset="0"/>
+                        <a:cs typeface="Arial" panose="020B0604020202020204" pitchFamily="34" charset="0"/>
                       </a:endParaRPr>
                     </a:p>
                     <a:p>
@@ -15701,15 +15890,15 @@
                           <a:effectLst/>
                           <a:latin typeface="Arial" panose="020B0604020202020204" pitchFamily="34" charset="0"/>
                           <a:ea typeface="Gulim" panose="020B0600000101010101" pitchFamily="34" charset="-127"/>
-                          <a:cs typeface="Times New Roman" panose="02020603050405020304" pitchFamily="18" charset="0"/>
+                          <a:cs typeface="Arial" panose="020B0604020202020204" pitchFamily="34" charset="0"/>
                         </a:rPr>
                         <a:t>(0.289 – 0.323)</a:t>
                       </a:r>
                       <a:endParaRPr lang="en-US" sz="1200" dirty="0">
                         <a:effectLst/>
-                        <a:latin typeface="Calibri" panose="020F0502020204030204" pitchFamily="34" charset="0"/>
+                        <a:latin typeface="Arial" panose="020B0604020202020204" pitchFamily="34" charset="0"/>
                         <a:ea typeface="Malgun Gothic" panose="020B0503020000020004" pitchFamily="34" charset="-127"/>
-                        <a:cs typeface="Times New Roman" panose="02020603050405020304" pitchFamily="18" charset="0"/>
+                        <a:cs typeface="Arial" panose="020B0604020202020204" pitchFamily="34" charset="0"/>
                       </a:endParaRPr>
                     </a:p>
                   </a:txBody>
@@ -15897,7 +16086,7 @@
                 </a:tc>
                 <a:extLst>
                   <a:ext uri="{0D108BD9-81ED-4DB2-BD59-A6C34878D82A}">
-                    <a16:rowId xmlns:a16="http://schemas.microsoft.com/office/drawing/2014/main" val="273795730"/>
+                    <a16:rowId xmlns:a16="http://schemas.microsoft.com/office/drawing/2014/main" xmlns="" val="273795730"/>
                   </a:ext>
                 </a:extLst>
               </a:tr>
@@ -15986,42 +16175,42 @@
                 <a:gridCol w="900000">
                   <a:extLst>
                     <a:ext uri="{9D8B030D-6E8A-4147-A177-3AD203B41FA5}">
-                      <a16:colId xmlns:a16="http://schemas.microsoft.com/office/drawing/2014/main" val="4272160771"/>
+                      <a16:colId xmlns:a16="http://schemas.microsoft.com/office/drawing/2014/main" xmlns="" val="4272160771"/>
                     </a:ext>
                   </a:extLst>
                 </a:gridCol>
                 <a:gridCol w="768085">
                   <a:extLst>
                     <a:ext uri="{9D8B030D-6E8A-4147-A177-3AD203B41FA5}">
-                      <a16:colId xmlns:a16="http://schemas.microsoft.com/office/drawing/2014/main" val="309721779"/>
+                      <a16:colId xmlns:a16="http://schemas.microsoft.com/office/drawing/2014/main" xmlns="" val="309721779"/>
                     </a:ext>
                   </a:extLst>
                 </a:gridCol>
                 <a:gridCol w="1440000">
                   <a:extLst>
                     <a:ext uri="{9D8B030D-6E8A-4147-A177-3AD203B41FA5}">
-                      <a16:colId xmlns:a16="http://schemas.microsoft.com/office/drawing/2014/main" val="373633616"/>
+                      <a16:colId xmlns:a16="http://schemas.microsoft.com/office/drawing/2014/main" xmlns="" val="373633616"/>
                     </a:ext>
                   </a:extLst>
                 </a:gridCol>
                 <a:gridCol w="768085">
                   <a:extLst>
                     <a:ext uri="{9D8B030D-6E8A-4147-A177-3AD203B41FA5}">
-                      <a16:colId xmlns:a16="http://schemas.microsoft.com/office/drawing/2014/main" val="2540930814"/>
+                      <a16:colId xmlns:a16="http://schemas.microsoft.com/office/drawing/2014/main" xmlns="" val="2540930814"/>
                     </a:ext>
                   </a:extLst>
                 </a:gridCol>
                 <a:gridCol w="1440000">
                   <a:extLst>
                     <a:ext uri="{9D8B030D-6E8A-4147-A177-3AD203B41FA5}">
-                      <a16:colId xmlns:a16="http://schemas.microsoft.com/office/drawing/2014/main" val="1660113903"/>
+                      <a16:colId xmlns:a16="http://schemas.microsoft.com/office/drawing/2014/main" xmlns="" val="1660113903"/>
                     </a:ext>
                   </a:extLst>
                 </a:gridCol>
                 <a:gridCol w="768085">
                   <a:extLst>
                     <a:ext uri="{9D8B030D-6E8A-4147-A177-3AD203B41FA5}">
-                      <a16:colId xmlns:a16="http://schemas.microsoft.com/office/drawing/2014/main" val="20005"/>
+                      <a16:colId xmlns:a16="http://schemas.microsoft.com/office/drawing/2014/main" xmlns="" val="20005"/>
                     </a:ext>
                   </a:extLst>
                 </a:gridCol>
@@ -16213,7 +16402,7 @@
                 </a:tc>
                 <a:extLst>
                   <a:ext uri="{0D108BD9-81ED-4DB2-BD59-A6C34878D82A}">
-                    <a16:rowId xmlns:a16="http://schemas.microsoft.com/office/drawing/2014/main" val="369884696"/>
+                    <a16:rowId xmlns:a16="http://schemas.microsoft.com/office/drawing/2014/main" xmlns="" val="369884696"/>
                   </a:ext>
                 </a:extLst>
               </a:tr>
@@ -16431,7 +16620,7 @@
                 </a:tc>
                 <a:extLst>
                   <a:ext uri="{0D108BD9-81ED-4DB2-BD59-A6C34878D82A}">
-                    <a16:rowId xmlns:a16="http://schemas.microsoft.com/office/drawing/2014/main" val="1095125848"/>
+                    <a16:rowId xmlns:a16="http://schemas.microsoft.com/office/drawing/2014/main" xmlns="" val="1095125848"/>
                   </a:ext>
                 </a:extLst>
               </a:tr>
@@ -16502,7 +16691,6 @@
                         <a:rPr lang="en-US" sz="1100" dirty="0" smtClean="0"/>
                         <a:t>0.1684</a:t>
                       </a:r>
-                      <a:endParaRPr lang="en-US" sz="1100" dirty="0" smtClean="0"/>
                     </a:p>
                     <a:p>
                       <a:pPr algn="ctr"/>
@@ -16511,28 +16699,7 @@
                           <a:latin typeface="Arial" panose="020B0604020202020204" pitchFamily="34" charset="0"/>
                           <a:cs typeface="Arial" panose="020B0604020202020204" pitchFamily="34" charset="0"/>
                         </a:rPr>
-                        <a:t>(</a:t>
-                      </a:r>
-                      <a:r>
-                        <a:rPr lang="en-US" sz="1100" dirty="0" smtClean="0">
-                          <a:latin typeface="Arial" panose="020B0604020202020204" pitchFamily="34" charset="0"/>
-                          <a:cs typeface="Arial" panose="020B0604020202020204" pitchFamily="34" charset="0"/>
-                        </a:rPr>
-                        <a:t>0.131 </a:t>
-                      </a:r>
-                      <a:r>
-                        <a:rPr lang="en-US" sz="1100" dirty="0" smtClean="0">
-                          <a:latin typeface="Arial" panose="020B0604020202020204" pitchFamily="34" charset="0"/>
-                          <a:cs typeface="Arial" panose="020B0604020202020204" pitchFamily="34" charset="0"/>
-                        </a:rPr>
-                        <a:t>- </a:t>
-                      </a:r>
-                      <a:r>
-                        <a:rPr lang="en-US" sz="1100" dirty="0" smtClean="0">
-                          <a:latin typeface="Arial" panose="020B0604020202020204" pitchFamily="34" charset="0"/>
-                          <a:cs typeface="Arial" panose="020B0604020202020204" pitchFamily="34" charset="0"/>
-                        </a:rPr>
-                        <a:t>0.206)</a:t>
+                        <a:t>(0.131 - 0.206)</a:t>
                       </a:r>
                       <a:endParaRPr lang="en-US" sz="1100" dirty="0">
                         <a:latin typeface="Arial" panose="020B0604020202020204" pitchFamily="34" charset="0"/>
@@ -16590,7 +16757,6 @@
                         <a:rPr lang="en-US" sz="1100" dirty="0" smtClean="0"/>
                         <a:t>0.1631</a:t>
                       </a:r>
-                      <a:endParaRPr lang="en-US" sz="1100" dirty="0" smtClean="0"/>
                     </a:p>
                     <a:p>
                       <a:pPr algn="ctr"/>
@@ -16599,28 +16765,7 @@
                           <a:latin typeface="Arial" panose="020B0604020202020204" pitchFamily="34" charset="0"/>
                           <a:cs typeface="Arial" panose="020B0604020202020204" pitchFamily="34" charset="0"/>
                         </a:rPr>
-                        <a:t>(</a:t>
-                      </a:r>
-                      <a:r>
-                        <a:rPr lang="en-US" sz="1100" dirty="0" smtClean="0">
-                          <a:latin typeface="Arial" panose="020B0604020202020204" pitchFamily="34" charset="0"/>
-                          <a:cs typeface="Arial" panose="020B0604020202020204" pitchFamily="34" charset="0"/>
-                        </a:rPr>
-                        <a:t>0.130 </a:t>
-                      </a:r>
-                      <a:r>
-                        <a:rPr lang="en-US" sz="1100" dirty="0" smtClean="0">
-                          <a:latin typeface="Arial" panose="020B0604020202020204" pitchFamily="34" charset="0"/>
-                          <a:cs typeface="Arial" panose="020B0604020202020204" pitchFamily="34" charset="0"/>
-                        </a:rPr>
-                        <a:t>- </a:t>
-                      </a:r>
-                      <a:r>
-                        <a:rPr lang="en-US" sz="1100" dirty="0" smtClean="0">
-                          <a:latin typeface="Arial" panose="020B0604020202020204" pitchFamily="34" charset="0"/>
-                          <a:cs typeface="Arial" panose="020B0604020202020204" pitchFamily="34" charset="0"/>
-                        </a:rPr>
-                        <a:t>0.197)</a:t>
+                        <a:t>(0.130 - 0.197)</a:t>
                       </a:r>
                       <a:endParaRPr lang="en-US" sz="1100" dirty="0">
                         <a:latin typeface="Arial" panose="020B0604020202020204" pitchFamily="34" charset="0"/>
@@ -16673,7 +16818,7 @@
                 </a:tc>
                 <a:extLst>
                   <a:ext uri="{0D108BD9-81ED-4DB2-BD59-A6C34878D82A}">
-                    <a16:rowId xmlns:a16="http://schemas.microsoft.com/office/drawing/2014/main" val="3552934910"/>
+                    <a16:rowId xmlns:a16="http://schemas.microsoft.com/office/drawing/2014/main" xmlns="" val="3552934910"/>
                   </a:ext>
                 </a:extLst>
               </a:tr>
@@ -16744,7 +16889,6 @@
                         <a:rPr lang="en-US" sz="1100" dirty="0" smtClean="0"/>
                         <a:t>0.1474</a:t>
                       </a:r>
-                      <a:endParaRPr lang="en-US" sz="1100" dirty="0" smtClean="0"/>
                     </a:p>
                     <a:p>
                       <a:pPr algn="ctr"/>
@@ -16753,28 +16897,7 @@
                           <a:latin typeface="Arial" panose="020B0604020202020204" pitchFamily="34" charset="0"/>
                           <a:cs typeface="Arial" panose="020B0604020202020204" pitchFamily="34" charset="0"/>
                         </a:rPr>
-                        <a:t>(</a:t>
-                      </a:r>
-                      <a:r>
-                        <a:rPr lang="en-US" sz="1100" dirty="0" smtClean="0">
-                          <a:latin typeface="Arial" panose="020B0604020202020204" pitchFamily="34" charset="0"/>
-                          <a:cs typeface="Arial" panose="020B0604020202020204" pitchFamily="34" charset="0"/>
-                        </a:rPr>
-                        <a:t>0.112 </a:t>
-                      </a:r>
-                      <a:r>
-                        <a:rPr lang="en-US" sz="1100" dirty="0" smtClean="0">
-                          <a:latin typeface="Arial" panose="020B0604020202020204" pitchFamily="34" charset="0"/>
-                          <a:cs typeface="Arial" panose="020B0604020202020204" pitchFamily="34" charset="0"/>
-                        </a:rPr>
-                        <a:t>- </a:t>
-                      </a:r>
-                      <a:r>
-                        <a:rPr lang="en-US" sz="1100" dirty="0" smtClean="0">
-                          <a:latin typeface="Arial" panose="020B0604020202020204" pitchFamily="34" charset="0"/>
-                          <a:cs typeface="Arial" panose="020B0604020202020204" pitchFamily="34" charset="0"/>
-                        </a:rPr>
-                        <a:t>0.183)</a:t>
+                        <a:t>(0.112 - 0.183)</a:t>
                       </a:r>
                       <a:endParaRPr lang="en-US" sz="1100" dirty="0">
                         <a:latin typeface="Arial" panose="020B0604020202020204" pitchFamily="34" charset="0"/>
@@ -16832,7 +16955,6 @@
                         <a:rPr lang="en-US" sz="1100" dirty="0" smtClean="0"/>
                         <a:t>0.1377</a:t>
                       </a:r>
-                      <a:endParaRPr lang="en-US" sz="1100" dirty="0" smtClean="0"/>
                     </a:p>
                     <a:p>
                       <a:pPr algn="ctr"/>
@@ -16841,28 +16963,7 @@
                           <a:latin typeface="Arial" panose="020B0604020202020204" pitchFamily="34" charset="0"/>
                           <a:cs typeface="Arial" panose="020B0604020202020204" pitchFamily="34" charset="0"/>
                         </a:rPr>
-                        <a:t>(</a:t>
-                      </a:r>
-                      <a:r>
-                        <a:rPr lang="en-US" sz="1100" dirty="0" smtClean="0">
-                          <a:latin typeface="Arial" panose="020B0604020202020204" pitchFamily="34" charset="0"/>
-                          <a:cs typeface="Arial" panose="020B0604020202020204" pitchFamily="34" charset="0"/>
-                        </a:rPr>
-                        <a:t>0.107 </a:t>
-                      </a:r>
-                      <a:r>
-                        <a:rPr lang="en-US" sz="1100" dirty="0" smtClean="0">
-                          <a:latin typeface="Arial" panose="020B0604020202020204" pitchFamily="34" charset="0"/>
-                          <a:cs typeface="Arial" panose="020B0604020202020204" pitchFamily="34" charset="0"/>
-                        </a:rPr>
-                        <a:t>- </a:t>
-                      </a:r>
-                      <a:r>
-                        <a:rPr lang="en-US" sz="1100" dirty="0" smtClean="0">
-                          <a:latin typeface="Arial" panose="020B0604020202020204" pitchFamily="34" charset="0"/>
-                          <a:cs typeface="Arial" panose="020B0604020202020204" pitchFamily="34" charset="0"/>
-                        </a:rPr>
-                        <a:t>0.169)</a:t>
+                        <a:t>(0.107 - 0.169)</a:t>
                       </a:r>
                       <a:endParaRPr lang="en-US" sz="1100" dirty="0">
                         <a:latin typeface="Arial" panose="020B0604020202020204" pitchFamily="34" charset="0"/>
@@ -16915,7 +17016,7 @@
                 </a:tc>
                 <a:extLst>
                   <a:ext uri="{0D108BD9-81ED-4DB2-BD59-A6C34878D82A}">
-                    <a16:rowId xmlns:a16="http://schemas.microsoft.com/office/drawing/2014/main" val="2393445760"/>
+                    <a16:rowId xmlns:a16="http://schemas.microsoft.com/office/drawing/2014/main" xmlns="" val="2393445760"/>
                   </a:ext>
                 </a:extLst>
               </a:tr>

</xml_diff>